<commit_message>
Added images to navigation, moved some footnotes to bib
</commit_message>
<xml_diff>
--- a/imgs/created_images.pptx
+++ b/imgs/created_images.pptx
@@ -4,10 +4,16 @@
   <p:sldMasterIdLst>
     <p:sldMasterId id="2147483648" r:id="rId1"/>
   </p:sldMasterIdLst>
+  <p:notesMasterIdLst>
+    <p:notesMasterId r:id="rId8"/>
+  </p:notesMasterIdLst>
   <p:sldIdLst>
     <p:sldId id="256" r:id="rId2"/>
     <p:sldId id="257" r:id="rId3"/>
     <p:sldId id="258" r:id="rId4"/>
+    <p:sldId id="259" r:id="rId5"/>
+    <p:sldId id="260" r:id="rId6"/>
+    <p:sldId id="261" r:id="rId7"/>
   </p:sldIdLst>
   <p:sldSz cx="9144000" cy="6858000" type="screen4x3"/>
   <p:notesSz cx="6858000" cy="9144000"/>
@@ -109,6 +115,440 @@
 </p:presentation>
 </file>
 
+<file path=ppt/notesMasters/notesMaster1.xml><?xml version="1.0" encoding="utf-8"?>
+<p:notesMaster xmlns:a="http://schemas.openxmlformats.org/drawingml/2006/main" xmlns:r="http://schemas.openxmlformats.org/officeDocument/2006/relationships" xmlns:p="http://schemas.openxmlformats.org/presentationml/2006/main">
+  <p:cSld>
+    <p:bg>
+      <p:bgRef idx="1001">
+        <a:schemeClr val="bg1"/>
+      </p:bgRef>
+    </p:bg>
+    <p:spTree>
+      <p:nvGrpSpPr>
+        <p:cNvPr id="1" name=""/>
+        <p:cNvGrpSpPr/>
+        <p:nvPr/>
+      </p:nvGrpSpPr>
+      <p:grpSpPr>
+        <a:xfrm>
+          <a:off x="0" y="0"/>
+          <a:ext cx="0" cy="0"/>
+          <a:chOff x="0" y="0"/>
+          <a:chExt cx="0" cy="0"/>
+        </a:xfrm>
+      </p:grpSpPr>
+      <p:sp>
+        <p:nvSpPr>
+          <p:cNvPr id="2" name="Header Placeholder 1"/>
+          <p:cNvSpPr>
+            <a:spLocks noGrp="1"/>
+          </p:cNvSpPr>
+          <p:nvPr>
+            <p:ph type="hdr" sz="quarter"/>
+          </p:nvPr>
+        </p:nvSpPr>
+        <p:spPr>
+          <a:xfrm>
+            <a:off x="0" y="0"/>
+            <a:ext cx="2971800" cy="457200"/>
+          </a:xfrm>
+          <a:prstGeom prst="rect">
+            <a:avLst/>
+          </a:prstGeom>
+        </p:spPr>
+        <p:txBody>
+          <a:bodyPr vert="horz" lIns="91440" tIns="45720" rIns="91440" bIns="45720" rtlCol="0"/>
+          <a:lstStyle>
+            <a:lvl1pPr algn="l">
+              <a:defRPr sz="1200"/>
+            </a:lvl1pPr>
+          </a:lstStyle>
+          <a:p>
+            <a:endParaRPr lang="en-US"/>
+          </a:p>
+        </p:txBody>
+      </p:sp>
+      <p:sp>
+        <p:nvSpPr>
+          <p:cNvPr id="3" name="Date Placeholder 2"/>
+          <p:cNvSpPr>
+            <a:spLocks noGrp="1"/>
+          </p:cNvSpPr>
+          <p:nvPr>
+            <p:ph type="dt" idx="1"/>
+          </p:nvPr>
+        </p:nvSpPr>
+        <p:spPr>
+          <a:xfrm>
+            <a:off x="3884613" y="0"/>
+            <a:ext cx="2971800" cy="457200"/>
+          </a:xfrm>
+          <a:prstGeom prst="rect">
+            <a:avLst/>
+          </a:prstGeom>
+        </p:spPr>
+        <p:txBody>
+          <a:bodyPr vert="horz" lIns="91440" tIns="45720" rIns="91440" bIns="45720" rtlCol="0"/>
+          <a:lstStyle>
+            <a:lvl1pPr algn="r">
+              <a:defRPr sz="1200"/>
+            </a:lvl1pPr>
+          </a:lstStyle>
+          <a:p>
+            <a:fld id="{57AC16EC-C4E8-AF45-A64C-ED98F92568E9}" type="datetimeFigureOut">
+              <a:rPr lang="en-US" smtClean="0"/>
+              <a:t>23/10/17</a:t>
+            </a:fld>
+            <a:endParaRPr lang="en-US"/>
+          </a:p>
+        </p:txBody>
+      </p:sp>
+      <p:sp>
+        <p:nvSpPr>
+          <p:cNvPr id="4" name="Slide Image Placeholder 3"/>
+          <p:cNvSpPr>
+            <a:spLocks noGrp="1" noRot="1" noChangeAspect="1"/>
+          </p:cNvSpPr>
+          <p:nvPr>
+            <p:ph type="sldImg" idx="2"/>
+          </p:nvPr>
+        </p:nvSpPr>
+        <p:spPr>
+          <a:xfrm>
+            <a:off x="1143000" y="685800"/>
+            <a:ext cx="4572000" cy="3429000"/>
+          </a:xfrm>
+          <a:prstGeom prst="rect">
+            <a:avLst/>
+          </a:prstGeom>
+          <a:noFill/>
+          <a:ln w="12700">
+            <a:solidFill>
+              <a:prstClr val="black"/>
+            </a:solidFill>
+          </a:ln>
+        </p:spPr>
+        <p:txBody>
+          <a:bodyPr vert="horz" lIns="91440" tIns="45720" rIns="91440" bIns="45720" rtlCol="0" anchor="ctr"/>
+          <a:lstStyle/>
+          <a:p>
+            <a:endParaRPr lang="en-US"/>
+          </a:p>
+        </p:txBody>
+      </p:sp>
+      <p:sp>
+        <p:nvSpPr>
+          <p:cNvPr id="5" name="Notes Placeholder 4"/>
+          <p:cNvSpPr>
+            <a:spLocks noGrp="1"/>
+          </p:cNvSpPr>
+          <p:nvPr>
+            <p:ph type="body" sz="quarter" idx="3"/>
+          </p:nvPr>
+        </p:nvSpPr>
+        <p:spPr>
+          <a:xfrm>
+            <a:off x="685800" y="4343400"/>
+            <a:ext cx="5486400" cy="4114800"/>
+          </a:xfrm>
+          <a:prstGeom prst="rect">
+            <a:avLst/>
+          </a:prstGeom>
+        </p:spPr>
+        <p:txBody>
+          <a:bodyPr vert="horz" lIns="91440" tIns="45720" rIns="91440" bIns="45720" rtlCol="0"/>
+          <a:lstStyle/>
+          <a:p>
+            <a:pPr lvl="0"/>
+            <a:r>
+              <a:rPr lang="en-US" smtClean="0"/>
+              <a:t>Click to edit Master text styles</a:t>
+            </a:r>
+          </a:p>
+          <a:p>
+            <a:pPr lvl="1"/>
+            <a:r>
+              <a:rPr lang="en-US" smtClean="0"/>
+              <a:t>Second level</a:t>
+            </a:r>
+          </a:p>
+          <a:p>
+            <a:pPr lvl="2"/>
+            <a:r>
+              <a:rPr lang="en-US" smtClean="0"/>
+              <a:t>Third level</a:t>
+            </a:r>
+          </a:p>
+          <a:p>
+            <a:pPr lvl="3"/>
+            <a:r>
+              <a:rPr lang="en-US" smtClean="0"/>
+              <a:t>Fourth level</a:t>
+            </a:r>
+          </a:p>
+          <a:p>
+            <a:pPr lvl="4"/>
+            <a:r>
+              <a:rPr lang="en-US" smtClean="0"/>
+              <a:t>Fifth level</a:t>
+            </a:r>
+            <a:endParaRPr lang="en-US"/>
+          </a:p>
+        </p:txBody>
+      </p:sp>
+      <p:sp>
+        <p:nvSpPr>
+          <p:cNvPr id="6" name="Footer Placeholder 5"/>
+          <p:cNvSpPr>
+            <a:spLocks noGrp="1"/>
+          </p:cNvSpPr>
+          <p:nvPr>
+            <p:ph type="ftr" sz="quarter" idx="4"/>
+          </p:nvPr>
+        </p:nvSpPr>
+        <p:spPr>
+          <a:xfrm>
+            <a:off x="0" y="8685213"/>
+            <a:ext cx="2971800" cy="457200"/>
+          </a:xfrm>
+          <a:prstGeom prst="rect">
+            <a:avLst/>
+          </a:prstGeom>
+        </p:spPr>
+        <p:txBody>
+          <a:bodyPr vert="horz" lIns="91440" tIns="45720" rIns="91440" bIns="45720" rtlCol="0" anchor="b"/>
+          <a:lstStyle>
+            <a:lvl1pPr algn="l">
+              <a:defRPr sz="1200"/>
+            </a:lvl1pPr>
+          </a:lstStyle>
+          <a:p>
+            <a:endParaRPr lang="en-US"/>
+          </a:p>
+        </p:txBody>
+      </p:sp>
+      <p:sp>
+        <p:nvSpPr>
+          <p:cNvPr id="7" name="Slide Number Placeholder 6"/>
+          <p:cNvSpPr>
+            <a:spLocks noGrp="1"/>
+          </p:cNvSpPr>
+          <p:nvPr>
+            <p:ph type="sldNum" sz="quarter" idx="5"/>
+          </p:nvPr>
+        </p:nvSpPr>
+        <p:spPr>
+          <a:xfrm>
+            <a:off x="3884613" y="8685213"/>
+            <a:ext cx="2971800" cy="457200"/>
+          </a:xfrm>
+          <a:prstGeom prst="rect">
+            <a:avLst/>
+          </a:prstGeom>
+        </p:spPr>
+        <p:txBody>
+          <a:bodyPr vert="horz" lIns="91440" tIns="45720" rIns="91440" bIns="45720" rtlCol="0" anchor="b"/>
+          <a:lstStyle>
+            <a:lvl1pPr algn="r">
+              <a:defRPr sz="1200"/>
+            </a:lvl1pPr>
+          </a:lstStyle>
+          <a:p>
+            <a:fld id="{B30BD7E0-E079-F048-8718-4CAC1D3386FC}" type="slidenum">
+              <a:rPr lang="en-US" smtClean="0"/>
+              <a:t>‹#›</a:t>
+            </a:fld>
+            <a:endParaRPr lang="en-US"/>
+          </a:p>
+        </p:txBody>
+      </p:sp>
+    </p:spTree>
+    <p:extLst>
+      <p:ext uri="{BB962C8B-B14F-4D97-AF65-F5344CB8AC3E}">
+        <p14:creationId xmlns:p14="http://schemas.microsoft.com/office/powerpoint/2010/main" val="2028063395"/>
+      </p:ext>
+    </p:extLst>
+  </p:cSld>
+  <p:clrMap bg1="lt1" tx1="dk1" bg2="lt2" tx2="dk2" accent1="accent1" accent2="accent2" accent3="accent3" accent4="accent4" accent5="accent5" accent6="accent6" hlink="hlink" folHlink="folHlink"/>
+  <p:notesStyle>
+    <a:lvl1pPr marL="0" algn="l" defTabSz="457200" rtl="0" eaLnBrk="1" latinLnBrk="0" hangingPunct="1">
+      <a:defRPr sz="1200" kern="1200">
+        <a:solidFill>
+          <a:schemeClr val="tx1"/>
+        </a:solidFill>
+        <a:latin typeface="+mn-lt"/>
+        <a:ea typeface="+mn-ea"/>
+        <a:cs typeface="+mn-cs"/>
+      </a:defRPr>
+    </a:lvl1pPr>
+    <a:lvl2pPr marL="457200" algn="l" defTabSz="457200" rtl="0" eaLnBrk="1" latinLnBrk="0" hangingPunct="1">
+      <a:defRPr sz="1200" kern="1200">
+        <a:solidFill>
+          <a:schemeClr val="tx1"/>
+        </a:solidFill>
+        <a:latin typeface="+mn-lt"/>
+        <a:ea typeface="+mn-ea"/>
+        <a:cs typeface="+mn-cs"/>
+      </a:defRPr>
+    </a:lvl2pPr>
+    <a:lvl3pPr marL="914400" algn="l" defTabSz="457200" rtl="0" eaLnBrk="1" latinLnBrk="0" hangingPunct="1">
+      <a:defRPr sz="1200" kern="1200">
+        <a:solidFill>
+          <a:schemeClr val="tx1"/>
+        </a:solidFill>
+        <a:latin typeface="+mn-lt"/>
+        <a:ea typeface="+mn-ea"/>
+        <a:cs typeface="+mn-cs"/>
+      </a:defRPr>
+    </a:lvl3pPr>
+    <a:lvl4pPr marL="1371600" algn="l" defTabSz="457200" rtl="0" eaLnBrk="1" latinLnBrk="0" hangingPunct="1">
+      <a:defRPr sz="1200" kern="1200">
+        <a:solidFill>
+          <a:schemeClr val="tx1"/>
+        </a:solidFill>
+        <a:latin typeface="+mn-lt"/>
+        <a:ea typeface="+mn-ea"/>
+        <a:cs typeface="+mn-cs"/>
+      </a:defRPr>
+    </a:lvl4pPr>
+    <a:lvl5pPr marL="1828800" algn="l" defTabSz="457200" rtl="0" eaLnBrk="1" latinLnBrk="0" hangingPunct="1">
+      <a:defRPr sz="1200" kern="1200">
+        <a:solidFill>
+          <a:schemeClr val="tx1"/>
+        </a:solidFill>
+        <a:latin typeface="+mn-lt"/>
+        <a:ea typeface="+mn-ea"/>
+        <a:cs typeface="+mn-cs"/>
+      </a:defRPr>
+    </a:lvl5pPr>
+    <a:lvl6pPr marL="2286000" algn="l" defTabSz="457200" rtl="0" eaLnBrk="1" latinLnBrk="0" hangingPunct="1">
+      <a:defRPr sz="1200" kern="1200">
+        <a:solidFill>
+          <a:schemeClr val="tx1"/>
+        </a:solidFill>
+        <a:latin typeface="+mn-lt"/>
+        <a:ea typeface="+mn-ea"/>
+        <a:cs typeface="+mn-cs"/>
+      </a:defRPr>
+    </a:lvl6pPr>
+    <a:lvl7pPr marL="2743200" algn="l" defTabSz="457200" rtl="0" eaLnBrk="1" latinLnBrk="0" hangingPunct="1">
+      <a:defRPr sz="1200" kern="1200">
+        <a:solidFill>
+          <a:schemeClr val="tx1"/>
+        </a:solidFill>
+        <a:latin typeface="+mn-lt"/>
+        <a:ea typeface="+mn-ea"/>
+        <a:cs typeface="+mn-cs"/>
+      </a:defRPr>
+    </a:lvl7pPr>
+    <a:lvl8pPr marL="3200400" algn="l" defTabSz="457200" rtl="0" eaLnBrk="1" latinLnBrk="0" hangingPunct="1">
+      <a:defRPr sz="1200" kern="1200">
+        <a:solidFill>
+          <a:schemeClr val="tx1"/>
+        </a:solidFill>
+        <a:latin typeface="+mn-lt"/>
+        <a:ea typeface="+mn-ea"/>
+        <a:cs typeface="+mn-cs"/>
+      </a:defRPr>
+    </a:lvl8pPr>
+    <a:lvl9pPr marL="3657600" algn="l" defTabSz="457200" rtl="0" eaLnBrk="1" latinLnBrk="0" hangingPunct="1">
+      <a:defRPr sz="1200" kern="1200">
+        <a:solidFill>
+          <a:schemeClr val="tx1"/>
+        </a:solidFill>
+        <a:latin typeface="+mn-lt"/>
+        <a:ea typeface="+mn-ea"/>
+        <a:cs typeface="+mn-cs"/>
+      </a:defRPr>
+    </a:lvl9pPr>
+  </p:notesStyle>
+</p:notesMaster>
+</file>
+
+<file path=ppt/notesSlides/notesSlide1.xml><?xml version="1.0" encoding="utf-8"?>
+<p:notes xmlns:a="http://schemas.openxmlformats.org/drawingml/2006/main" xmlns:r="http://schemas.openxmlformats.org/officeDocument/2006/relationships" xmlns:p="http://schemas.openxmlformats.org/presentationml/2006/main">
+  <p:cSld>
+    <p:spTree>
+      <p:nvGrpSpPr>
+        <p:cNvPr id="1" name=""/>
+        <p:cNvGrpSpPr/>
+        <p:nvPr/>
+      </p:nvGrpSpPr>
+      <p:grpSpPr>
+        <a:xfrm>
+          <a:off x="0" y="0"/>
+          <a:ext cx="0" cy="0"/>
+          <a:chOff x="0" y="0"/>
+          <a:chExt cx="0" cy="0"/>
+        </a:xfrm>
+      </p:grpSpPr>
+      <p:sp>
+        <p:nvSpPr>
+          <p:cNvPr id="2" name="Slide Image Placeholder 1"/>
+          <p:cNvSpPr>
+            <a:spLocks noGrp="1" noRot="1" noChangeAspect="1"/>
+          </p:cNvSpPr>
+          <p:nvPr>
+            <p:ph type="sldImg"/>
+          </p:nvPr>
+        </p:nvSpPr>
+        <p:spPr/>
+      </p:sp>
+      <p:sp>
+        <p:nvSpPr>
+          <p:cNvPr id="3" name="Notes Placeholder 2"/>
+          <p:cNvSpPr>
+            <a:spLocks noGrp="1"/>
+          </p:cNvSpPr>
+          <p:nvPr>
+            <p:ph type="body" idx="1"/>
+          </p:nvPr>
+        </p:nvSpPr>
+        <p:spPr/>
+        <p:txBody>
+          <a:bodyPr/>
+          <a:lstStyle/>
+          <a:p>
+            <a:endParaRPr lang="en-US" dirty="0"/>
+          </a:p>
+        </p:txBody>
+      </p:sp>
+      <p:sp>
+        <p:nvSpPr>
+          <p:cNvPr id="4" name="Slide Number Placeholder 3"/>
+          <p:cNvSpPr>
+            <a:spLocks noGrp="1"/>
+          </p:cNvSpPr>
+          <p:nvPr>
+            <p:ph type="sldNum" sz="quarter" idx="10"/>
+          </p:nvPr>
+        </p:nvSpPr>
+        <p:spPr/>
+        <p:txBody>
+          <a:bodyPr/>
+          <a:lstStyle/>
+          <a:p>
+            <a:fld id="{B30BD7E0-E079-F048-8718-4CAC1D3386FC}" type="slidenum">
+              <a:rPr lang="en-US" smtClean="0"/>
+              <a:t>4</a:t>
+            </a:fld>
+            <a:endParaRPr lang="en-US"/>
+          </a:p>
+        </p:txBody>
+      </p:sp>
+    </p:spTree>
+    <p:extLst>
+      <p:ext uri="{BB962C8B-B14F-4D97-AF65-F5344CB8AC3E}">
+        <p14:creationId xmlns:p14="http://schemas.microsoft.com/office/powerpoint/2010/main" val="3265182931"/>
+      </p:ext>
+    </p:extLst>
+  </p:cSld>
+  <p:clrMapOvr>
+    <a:masterClrMapping/>
+  </p:clrMapOvr>
+</p:notes>
+</file>
+
 <file path=ppt/slideLayouts/slideLayout1.xml><?xml version="1.0" encoding="utf-8"?>
 <p:sldLayout xmlns:a="http://schemas.openxmlformats.org/drawingml/2006/main" xmlns:r="http://schemas.openxmlformats.org/officeDocument/2006/relationships" xmlns:p="http://schemas.openxmlformats.org/presentationml/2006/main" type="title" preserve="1">
   <p:cSld name="Title Slide">
@@ -290,7 +730,7 @@
           <a:p>
             <a:fld id="{BB5EAA35-4DD1-8F46-B65F-F41CC6BB8EEF}" type="datetimeFigureOut">
               <a:rPr lang="en-US" smtClean="0"/>
-              <a:t>22/10/17</a:t>
+              <a:t>23/10/17</a:t>
             </a:fld>
             <a:endParaRPr lang="en-US"/>
           </a:p>
@@ -460,7 +900,7 @@
           <a:p>
             <a:fld id="{BB5EAA35-4DD1-8F46-B65F-F41CC6BB8EEF}" type="datetimeFigureOut">
               <a:rPr lang="en-US" smtClean="0"/>
-              <a:t>22/10/17</a:t>
+              <a:t>23/10/17</a:t>
             </a:fld>
             <a:endParaRPr lang="en-US"/>
           </a:p>
@@ -640,7 +1080,7 @@
           <a:p>
             <a:fld id="{BB5EAA35-4DD1-8F46-B65F-F41CC6BB8EEF}" type="datetimeFigureOut">
               <a:rPr lang="en-US" smtClean="0"/>
-              <a:t>22/10/17</a:t>
+              <a:t>23/10/17</a:t>
             </a:fld>
             <a:endParaRPr lang="en-US"/>
           </a:p>
@@ -810,7 +1250,7 @@
           <a:p>
             <a:fld id="{BB5EAA35-4DD1-8F46-B65F-F41CC6BB8EEF}" type="datetimeFigureOut">
               <a:rPr lang="en-US" smtClean="0"/>
-              <a:t>22/10/17</a:t>
+              <a:t>23/10/17</a:t>
             </a:fld>
             <a:endParaRPr lang="en-US"/>
           </a:p>
@@ -1056,7 +1496,7 @@
           <a:p>
             <a:fld id="{BB5EAA35-4DD1-8F46-B65F-F41CC6BB8EEF}" type="datetimeFigureOut">
               <a:rPr lang="en-US" smtClean="0"/>
-              <a:t>22/10/17</a:t>
+              <a:t>23/10/17</a:t>
             </a:fld>
             <a:endParaRPr lang="en-US"/>
           </a:p>
@@ -1344,7 +1784,7 @@
           <a:p>
             <a:fld id="{BB5EAA35-4DD1-8F46-B65F-F41CC6BB8EEF}" type="datetimeFigureOut">
               <a:rPr lang="en-US" smtClean="0"/>
-              <a:t>22/10/17</a:t>
+              <a:t>23/10/17</a:t>
             </a:fld>
             <a:endParaRPr lang="en-US"/>
           </a:p>
@@ -1766,7 +2206,7 @@
           <a:p>
             <a:fld id="{BB5EAA35-4DD1-8F46-B65F-F41CC6BB8EEF}" type="datetimeFigureOut">
               <a:rPr lang="en-US" smtClean="0"/>
-              <a:t>22/10/17</a:t>
+              <a:t>23/10/17</a:t>
             </a:fld>
             <a:endParaRPr lang="en-US"/>
           </a:p>
@@ -1884,7 +2324,7 @@
           <a:p>
             <a:fld id="{BB5EAA35-4DD1-8F46-B65F-F41CC6BB8EEF}" type="datetimeFigureOut">
               <a:rPr lang="en-US" smtClean="0"/>
-              <a:t>22/10/17</a:t>
+              <a:t>23/10/17</a:t>
             </a:fld>
             <a:endParaRPr lang="en-US"/>
           </a:p>
@@ -1979,7 +2419,7 @@
           <a:p>
             <a:fld id="{BB5EAA35-4DD1-8F46-B65F-F41CC6BB8EEF}" type="datetimeFigureOut">
               <a:rPr lang="en-US" smtClean="0"/>
-              <a:t>22/10/17</a:t>
+              <a:t>23/10/17</a:t>
             </a:fld>
             <a:endParaRPr lang="en-US"/>
           </a:p>
@@ -2256,7 +2696,7 @@
           <a:p>
             <a:fld id="{BB5EAA35-4DD1-8F46-B65F-F41CC6BB8EEF}" type="datetimeFigureOut">
               <a:rPr lang="en-US" smtClean="0"/>
-              <a:t>22/10/17</a:t>
+              <a:t>23/10/17</a:t>
             </a:fld>
             <a:endParaRPr lang="en-US"/>
           </a:p>
@@ -2509,7 +2949,7 @@
           <a:p>
             <a:fld id="{BB5EAA35-4DD1-8F46-B65F-F41CC6BB8EEF}" type="datetimeFigureOut">
               <a:rPr lang="en-US" smtClean="0"/>
-              <a:t>22/10/17</a:t>
+              <a:t>23/10/17</a:t>
             </a:fld>
             <a:endParaRPr lang="en-US"/>
           </a:p>
@@ -2722,7 +3162,7 @@
           <a:p>
             <a:fld id="{BB5EAA35-4DD1-8F46-B65F-F41CC6BB8EEF}" type="datetimeFigureOut">
               <a:rPr lang="en-US" smtClean="0"/>
-              <a:t>22/10/17</a:t>
+              <a:t>23/10/17</a:t>
             </a:fld>
             <a:endParaRPr lang="en-US"/>
           </a:p>
@@ -5031,6 +5471,3477 @@
     <p:extLst>
       <p:ext uri="{BB962C8B-B14F-4D97-AF65-F5344CB8AC3E}">
         <p14:creationId xmlns:p14="http://schemas.microsoft.com/office/powerpoint/2010/main" val="2728667718"/>
+      </p:ext>
+    </p:extLst>
+  </p:cSld>
+  <p:clrMapOvr>
+    <a:masterClrMapping/>
+  </p:clrMapOvr>
+</p:sld>
+</file>
+
+<file path=ppt/slides/slide4.xml><?xml version="1.0" encoding="utf-8"?>
+<p:sld xmlns:a="http://schemas.openxmlformats.org/drawingml/2006/main" xmlns:r="http://schemas.openxmlformats.org/officeDocument/2006/relationships" xmlns:p="http://schemas.openxmlformats.org/presentationml/2006/main">
+  <p:cSld>
+    <p:spTree>
+      <p:nvGrpSpPr>
+        <p:cNvPr id="1" name=""/>
+        <p:cNvGrpSpPr/>
+        <p:nvPr/>
+      </p:nvGrpSpPr>
+      <p:grpSpPr>
+        <a:xfrm>
+          <a:off x="0" y="0"/>
+          <a:ext cx="0" cy="0"/>
+          <a:chOff x="0" y="0"/>
+          <a:chExt cx="0" cy="0"/>
+        </a:xfrm>
+      </p:grpSpPr>
+      <p:grpSp>
+        <p:nvGrpSpPr>
+          <p:cNvPr id="114" name="Group 113"/>
+          <p:cNvGrpSpPr/>
+          <p:nvPr/>
+        </p:nvGrpSpPr>
+        <p:grpSpPr>
+          <a:xfrm>
+            <a:off x="282573" y="256436"/>
+            <a:ext cx="8779031" cy="6302921"/>
+            <a:chOff x="282573" y="256436"/>
+            <a:chExt cx="8779031" cy="6302921"/>
+          </a:xfrm>
+        </p:grpSpPr>
+        <p:sp>
+          <p:nvSpPr>
+            <p:cNvPr id="4" name="Rectangle 3"/>
+            <p:cNvSpPr/>
+            <p:nvPr/>
+          </p:nvSpPr>
+          <p:spPr>
+            <a:xfrm>
+              <a:off x="3099339" y="1241524"/>
+              <a:ext cx="3775485" cy="2862590"/>
+            </a:xfrm>
+            <a:prstGeom prst="rect">
+              <a:avLst/>
+            </a:prstGeom>
+            <a:noFill/>
+            <a:ln>
+              <a:solidFill>
+                <a:srgbClr val="000000"/>
+              </a:solidFill>
+            </a:ln>
+            <a:effectLst/>
+          </p:spPr>
+          <p:style>
+            <a:lnRef idx="1">
+              <a:schemeClr val="accent1"/>
+            </a:lnRef>
+            <a:fillRef idx="3">
+              <a:schemeClr val="accent1"/>
+            </a:fillRef>
+            <a:effectRef idx="2">
+              <a:schemeClr val="accent1"/>
+            </a:effectRef>
+            <a:fontRef idx="minor">
+              <a:schemeClr val="lt1"/>
+            </a:fontRef>
+          </p:style>
+          <p:txBody>
+            <a:bodyPr rtlCol="0" anchor="ctr"/>
+            <a:lstStyle/>
+            <a:p>
+              <a:pPr algn="ctr"/>
+              <a:endParaRPr lang="en-US"/>
+            </a:p>
+          </p:txBody>
+        </p:sp>
+        <p:sp>
+          <p:nvSpPr>
+            <p:cNvPr id="5" name="Oval 4"/>
+            <p:cNvSpPr/>
+            <p:nvPr/>
+          </p:nvSpPr>
+          <p:spPr>
+            <a:xfrm>
+              <a:off x="3326714" y="1462871"/>
+              <a:ext cx="828810" cy="828810"/>
+            </a:xfrm>
+            <a:prstGeom prst="ellipse">
+              <a:avLst/>
+            </a:prstGeom>
+            <a:noFill/>
+            <a:ln>
+              <a:solidFill>
+                <a:srgbClr val="000000"/>
+              </a:solidFill>
+            </a:ln>
+            <a:effectLst/>
+          </p:spPr>
+          <p:style>
+            <a:lnRef idx="1">
+              <a:schemeClr val="accent1"/>
+            </a:lnRef>
+            <a:fillRef idx="3">
+              <a:schemeClr val="accent1"/>
+            </a:fillRef>
+            <a:effectRef idx="2">
+              <a:schemeClr val="accent1"/>
+            </a:effectRef>
+            <a:fontRef idx="minor">
+              <a:schemeClr val="lt1"/>
+            </a:fontRef>
+          </p:style>
+          <p:txBody>
+            <a:bodyPr rtlCol="0" anchor="ctr"/>
+            <a:lstStyle/>
+            <a:p>
+              <a:pPr algn="ctr"/>
+              <a:r>
+                <a:rPr lang="en-US" sz="900" dirty="0" smtClean="0">
+                  <a:solidFill>
+                    <a:schemeClr val="tx1"/>
+                  </a:solidFill>
+                </a:rPr>
+                <a:t>Global planner</a:t>
+              </a:r>
+              <a:endParaRPr lang="en-US" sz="900" dirty="0">
+                <a:solidFill>
+                  <a:schemeClr val="tx1"/>
+                </a:solidFill>
+              </a:endParaRPr>
+            </a:p>
+          </p:txBody>
+        </p:sp>
+        <p:sp>
+          <p:nvSpPr>
+            <p:cNvPr id="10" name="Rectangle 9"/>
+            <p:cNvSpPr/>
+            <p:nvPr/>
+          </p:nvSpPr>
+          <p:spPr>
+            <a:xfrm>
+              <a:off x="3099338" y="4706010"/>
+              <a:ext cx="1279545" cy="429593"/>
+            </a:xfrm>
+            <a:prstGeom prst="rect">
+              <a:avLst/>
+            </a:prstGeom>
+            <a:ln/>
+          </p:spPr>
+          <p:style>
+            <a:lnRef idx="2">
+              <a:schemeClr val="accent3">
+                <a:shade val="50000"/>
+              </a:schemeClr>
+            </a:lnRef>
+            <a:fillRef idx="1">
+              <a:schemeClr val="accent3"/>
+            </a:fillRef>
+            <a:effectRef idx="0">
+              <a:schemeClr val="accent3"/>
+            </a:effectRef>
+            <a:fontRef idx="minor">
+              <a:schemeClr val="lt1"/>
+            </a:fontRef>
+          </p:style>
+          <p:txBody>
+            <a:bodyPr rtlCol="0" anchor="ctr"/>
+            <a:lstStyle/>
+            <a:p>
+              <a:pPr algn="ctr"/>
+              <a:r>
+                <a:rPr lang="en-US" sz="1000" dirty="0" smtClean="0">
+                  <a:solidFill>
+                    <a:schemeClr val="tx1"/>
+                  </a:solidFill>
+                </a:rPr>
+                <a:t>Controller</a:t>
+              </a:r>
+              <a:endParaRPr lang="en-US" sz="1000" dirty="0">
+                <a:solidFill>
+                  <a:schemeClr val="tx1"/>
+                </a:solidFill>
+              </a:endParaRPr>
+            </a:p>
+          </p:txBody>
+        </p:sp>
+        <p:sp>
+          <p:nvSpPr>
+            <p:cNvPr id="17" name="Oval 16"/>
+            <p:cNvSpPr/>
+            <p:nvPr/>
+          </p:nvSpPr>
+          <p:spPr>
+            <a:xfrm>
+              <a:off x="3326714" y="3037192"/>
+              <a:ext cx="828810" cy="828810"/>
+            </a:xfrm>
+            <a:prstGeom prst="ellipse">
+              <a:avLst/>
+            </a:prstGeom>
+            <a:ln/>
+          </p:spPr>
+          <p:style>
+            <a:lnRef idx="2">
+              <a:schemeClr val="accent1">
+                <a:shade val="50000"/>
+              </a:schemeClr>
+            </a:lnRef>
+            <a:fillRef idx="1">
+              <a:schemeClr val="accent1"/>
+            </a:fillRef>
+            <a:effectRef idx="0">
+              <a:schemeClr val="accent1"/>
+            </a:effectRef>
+            <a:fontRef idx="minor">
+              <a:schemeClr val="lt1"/>
+            </a:fontRef>
+          </p:style>
+          <p:txBody>
+            <a:bodyPr rtlCol="0" anchor="ctr"/>
+            <a:lstStyle/>
+            <a:p>
+              <a:pPr algn="ctr"/>
+              <a:r>
+                <a:rPr lang="en-US" sz="900" dirty="0" smtClean="0">
+                  <a:solidFill>
+                    <a:schemeClr val="tx1"/>
+                  </a:solidFill>
+                </a:rPr>
+                <a:t>Local</a:t>
+              </a:r>
+            </a:p>
+            <a:p>
+              <a:pPr algn="ctr"/>
+              <a:r>
+                <a:rPr lang="en-US" sz="900" dirty="0" smtClean="0">
+                  <a:solidFill>
+                    <a:schemeClr val="tx1"/>
+                  </a:solidFill>
+                </a:rPr>
+                <a:t>planner</a:t>
+              </a:r>
+              <a:endParaRPr lang="en-US" sz="900" dirty="0">
+                <a:solidFill>
+                  <a:schemeClr val="tx1"/>
+                </a:solidFill>
+              </a:endParaRPr>
+            </a:p>
+          </p:txBody>
+        </p:sp>
+        <p:sp>
+          <p:nvSpPr>
+            <p:cNvPr id="18" name="Oval 17"/>
+            <p:cNvSpPr/>
+            <p:nvPr/>
+          </p:nvSpPr>
+          <p:spPr>
+            <a:xfrm>
+              <a:off x="5895254" y="1462871"/>
+              <a:ext cx="828810" cy="828810"/>
+            </a:xfrm>
+            <a:prstGeom prst="ellipse">
+              <a:avLst/>
+            </a:prstGeom>
+            <a:noFill/>
+            <a:ln>
+              <a:solidFill>
+                <a:srgbClr val="000000"/>
+              </a:solidFill>
+            </a:ln>
+            <a:effectLst/>
+          </p:spPr>
+          <p:style>
+            <a:lnRef idx="1">
+              <a:schemeClr val="accent1"/>
+            </a:lnRef>
+            <a:fillRef idx="3">
+              <a:schemeClr val="accent1"/>
+            </a:fillRef>
+            <a:effectRef idx="2">
+              <a:schemeClr val="accent1"/>
+            </a:effectRef>
+            <a:fontRef idx="minor">
+              <a:schemeClr val="lt1"/>
+            </a:fontRef>
+          </p:style>
+          <p:txBody>
+            <a:bodyPr rtlCol="0" anchor="ctr"/>
+            <a:lstStyle/>
+            <a:p>
+              <a:pPr algn="ctr"/>
+              <a:r>
+                <a:rPr lang="en-US" sz="900" dirty="0" smtClean="0">
+                  <a:solidFill>
+                    <a:schemeClr val="tx1"/>
+                  </a:solidFill>
+                </a:rPr>
+                <a:t>Global</a:t>
+              </a:r>
+            </a:p>
+            <a:p>
+              <a:pPr algn="ctr"/>
+              <a:r>
+                <a:rPr lang="en-US" sz="900" dirty="0" smtClean="0">
+                  <a:solidFill>
+                    <a:schemeClr val="tx1"/>
+                  </a:solidFill>
+                </a:rPr>
+                <a:t>costmap</a:t>
+              </a:r>
+              <a:endParaRPr lang="en-US" sz="900" dirty="0">
+                <a:solidFill>
+                  <a:schemeClr val="tx1"/>
+                </a:solidFill>
+              </a:endParaRPr>
+            </a:p>
+          </p:txBody>
+        </p:sp>
+        <p:sp>
+          <p:nvSpPr>
+            <p:cNvPr id="20" name="Oval 19"/>
+            <p:cNvSpPr/>
+            <p:nvPr/>
+          </p:nvSpPr>
+          <p:spPr>
+            <a:xfrm>
+              <a:off x="5895254" y="3037192"/>
+              <a:ext cx="828810" cy="828810"/>
+            </a:xfrm>
+            <a:prstGeom prst="ellipse">
+              <a:avLst/>
+            </a:prstGeom>
+            <a:ln/>
+          </p:spPr>
+          <p:style>
+            <a:lnRef idx="2">
+              <a:schemeClr val="accent1">
+                <a:shade val="50000"/>
+              </a:schemeClr>
+            </a:lnRef>
+            <a:fillRef idx="1">
+              <a:schemeClr val="accent1"/>
+            </a:fillRef>
+            <a:effectRef idx="0">
+              <a:schemeClr val="accent1"/>
+            </a:effectRef>
+            <a:fontRef idx="minor">
+              <a:schemeClr val="lt1"/>
+            </a:fontRef>
+          </p:style>
+          <p:txBody>
+            <a:bodyPr rtlCol="0" anchor="ctr"/>
+            <a:lstStyle/>
+            <a:p>
+              <a:pPr algn="ctr"/>
+              <a:r>
+                <a:rPr lang="en-US" sz="900" dirty="0" smtClean="0">
+                  <a:solidFill>
+                    <a:schemeClr val="tx1"/>
+                  </a:solidFill>
+                </a:rPr>
+                <a:t>Local</a:t>
+              </a:r>
+            </a:p>
+            <a:p>
+              <a:pPr algn="ctr"/>
+              <a:r>
+                <a:rPr lang="en-US" sz="900" dirty="0" smtClean="0">
+                  <a:solidFill>
+                    <a:schemeClr val="tx1"/>
+                  </a:solidFill>
+                </a:rPr>
+                <a:t>costmap</a:t>
+              </a:r>
+              <a:endParaRPr lang="en-US" sz="900" dirty="0">
+                <a:solidFill>
+                  <a:schemeClr val="tx1"/>
+                </a:solidFill>
+              </a:endParaRPr>
+            </a:p>
+          </p:txBody>
+        </p:sp>
+        <p:sp>
+          <p:nvSpPr>
+            <p:cNvPr id="21" name="Oval 20"/>
+            <p:cNvSpPr/>
+            <p:nvPr/>
+          </p:nvSpPr>
+          <p:spPr>
+            <a:xfrm>
+              <a:off x="4966526" y="2258235"/>
+              <a:ext cx="1004552" cy="828810"/>
+            </a:xfrm>
+            <a:prstGeom prst="ellipse">
+              <a:avLst/>
+            </a:prstGeom>
+            <a:ln/>
+          </p:spPr>
+          <p:style>
+            <a:lnRef idx="2">
+              <a:schemeClr val="accent1">
+                <a:shade val="50000"/>
+              </a:schemeClr>
+            </a:lnRef>
+            <a:fillRef idx="1">
+              <a:schemeClr val="accent1"/>
+            </a:fillRef>
+            <a:effectRef idx="0">
+              <a:schemeClr val="accent1"/>
+            </a:effectRef>
+            <a:fontRef idx="minor">
+              <a:schemeClr val="lt1"/>
+            </a:fontRef>
+          </p:style>
+          <p:txBody>
+            <a:bodyPr rtlCol="0" anchor="ctr"/>
+            <a:lstStyle/>
+            <a:p>
+              <a:pPr algn="ctr"/>
+              <a:r>
+                <a:rPr lang="en-US" sz="900" dirty="0" smtClean="0">
+                  <a:solidFill>
+                    <a:schemeClr val="tx1"/>
+                  </a:solidFill>
+                </a:rPr>
+                <a:t>Recovery</a:t>
+              </a:r>
+            </a:p>
+            <a:p>
+              <a:pPr algn="ctr"/>
+              <a:r>
+                <a:rPr lang="en-US" sz="900" dirty="0" smtClean="0">
+                  <a:solidFill>
+                    <a:schemeClr val="tx1"/>
+                  </a:solidFill>
+                </a:rPr>
+                <a:t>behaviour</a:t>
+              </a:r>
+              <a:endParaRPr lang="en-US" sz="900" dirty="0">
+                <a:solidFill>
+                  <a:schemeClr val="tx1"/>
+                </a:solidFill>
+              </a:endParaRPr>
+            </a:p>
+          </p:txBody>
+        </p:sp>
+        <p:cxnSp>
+          <p:nvCxnSpPr>
+            <p:cNvPr id="27" name="Straight Arrow Connector 26"/>
+            <p:cNvCxnSpPr>
+              <a:stCxn id="20" idx="2"/>
+              <a:endCxn id="17" idx="6"/>
+            </p:cNvCxnSpPr>
+            <p:nvPr/>
+          </p:nvCxnSpPr>
+          <p:spPr>
+            <a:xfrm flipH="1">
+              <a:off x="4155524" y="3451597"/>
+              <a:ext cx="1739730" cy="0"/>
+            </a:xfrm>
+            <a:prstGeom prst="straightConnector1">
+              <a:avLst/>
+            </a:prstGeom>
+            <a:ln>
+              <a:solidFill>
+                <a:srgbClr val="000000"/>
+              </a:solidFill>
+              <a:tailEnd type="arrow"/>
+            </a:ln>
+            <a:effectLst/>
+          </p:spPr>
+          <p:style>
+            <a:lnRef idx="2">
+              <a:schemeClr val="accent1"/>
+            </a:lnRef>
+            <a:fillRef idx="0">
+              <a:schemeClr val="accent1"/>
+            </a:fillRef>
+            <a:effectRef idx="1">
+              <a:schemeClr val="accent1"/>
+            </a:effectRef>
+            <a:fontRef idx="minor">
+              <a:schemeClr val="tx1"/>
+            </a:fontRef>
+          </p:style>
+        </p:cxnSp>
+        <p:cxnSp>
+          <p:nvCxnSpPr>
+            <p:cNvPr id="31" name="Straight Arrow Connector 30"/>
+            <p:cNvCxnSpPr>
+              <a:stCxn id="18" idx="2"/>
+              <a:endCxn id="5" idx="6"/>
+            </p:cNvCxnSpPr>
+            <p:nvPr/>
+          </p:nvCxnSpPr>
+          <p:spPr>
+            <a:xfrm flipH="1">
+              <a:off x="4155524" y="1877276"/>
+              <a:ext cx="1739730" cy="0"/>
+            </a:xfrm>
+            <a:prstGeom prst="straightConnector1">
+              <a:avLst/>
+            </a:prstGeom>
+            <a:ln>
+              <a:solidFill>
+                <a:srgbClr val="000000"/>
+              </a:solidFill>
+              <a:tailEnd type="arrow"/>
+            </a:ln>
+            <a:effectLst/>
+          </p:spPr>
+          <p:style>
+            <a:lnRef idx="2">
+              <a:schemeClr val="accent1"/>
+            </a:lnRef>
+            <a:fillRef idx="0">
+              <a:schemeClr val="accent1"/>
+            </a:fillRef>
+            <a:effectRef idx="1">
+              <a:schemeClr val="accent1"/>
+            </a:effectRef>
+            <a:fontRef idx="minor">
+              <a:schemeClr val="tx1"/>
+            </a:fontRef>
+          </p:style>
+        </p:cxnSp>
+        <p:cxnSp>
+          <p:nvCxnSpPr>
+            <p:cNvPr id="37" name="Straight Arrow Connector 36"/>
+            <p:cNvCxnSpPr>
+              <a:stCxn id="18" idx="3"/>
+              <a:endCxn id="21" idx="7"/>
+            </p:cNvCxnSpPr>
+            <p:nvPr/>
+          </p:nvCxnSpPr>
+          <p:spPr>
+            <a:xfrm flipH="1">
+              <a:off x="5823965" y="2170305"/>
+              <a:ext cx="192665" cy="209306"/>
+            </a:xfrm>
+            <a:prstGeom prst="straightConnector1">
+              <a:avLst/>
+            </a:prstGeom>
+            <a:ln>
+              <a:solidFill>
+                <a:srgbClr val="000000"/>
+              </a:solidFill>
+              <a:tailEnd type="arrow"/>
+            </a:ln>
+            <a:effectLst/>
+          </p:spPr>
+          <p:style>
+            <a:lnRef idx="2">
+              <a:schemeClr val="accent1"/>
+            </a:lnRef>
+            <a:fillRef idx="0">
+              <a:schemeClr val="accent1"/>
+            </a:fillRef>
+            <a:effectRef idx="1">
+              <a:schemeClr val="accent1"/>
+            </a:effectRef>
+            <a:fontRef idx="minor">
+              <a:schemeClr val="tx1"/>
+            </a:fontRef>
+          </p:style>
+        </p:cxnSp>
+        <p:cxnSp>
+          <p:nvCxnSpPr>
+            <p:cNvPr id="39" name="Straight Arrow Connector 38"/>
+            <p:cNvCxnSpPr>
+              <a:stCxn id="20" idx="1"/>
+              <a:endCxn id="21" idx="5"/>
+            </p:cNvCxnSpPr>
+            <p:nvPr/>
+          </p:nvCxnSpPr>
+          <p:spPr>
+            <a:xfrm flipH="1" flipV="1">
+              <a:off x="5823965" y="2965669"/>
+              <a:ext cx="192665" cy="192899"/>
+            </a:xfrm>
+            <a:prstGeom prst="straightConnector1">
+              <a:avLst/>
+            </a:prstGeom>
+            <a:ln>
+              <a:solidFill>
+                <a:srgbClr val="000000"/>
+              </a:solidFill>
+              <a:tailEnd type="arrow"/>
+            </a:ln>
+            <a:effectLst/>
+          </p:spPr>
+          <p:style>
+            <a:lnRef idx="2">
+              <a:schemeClr val="accent1"/>
+            </a:lnRef>
+            <a:fillRef idx="0">
+              <a:schemeClr val="accent1"/>
+            </a:fillRef>
+            <a:effectRef idx="1">
+              <a:schemeClr val="accent1"/>
+            </a:effectRef>
+            <a:fontRef idx="minor">
+              <a:schemeClr val="tx1"/>
+            </a:fontRef>
+          </p:style>
+        </p:cxnSp>
+        <p:cxnSp>
+          <p:nvCxnSpPr>
+            <p:cNvPr id="42" name="Straight Arrow Connector 41"/>
+            <p:cNvCxnSpPr>
+              <a:stCxn id="18" idx="4"/>
+              <a:endCxn id="20" idx="0"/>
+            </p:cNvCxnSpPr>
+            <p:nvPr/>
+          </p:nvCxnSpPr>
+          <p:spPr>
+            <a:xfrm>
+              <a:off x="6309659" y="2291681"/>
+              <a:ext cx="0" cy="745511"/>
+            </a:xfrm>
+            <a:prstGeom prst="straightConnector1">
+              <a:avLst/>
+            </a:prstGeom>
+            <a:ln>
+              <a:solidFill>
+                <a:srgbClr val="000000"/>
+              </a:solidFill>
+              <a:headEnd type="arrow"/>
+              <a:tailEnd type="arrow"/>
+            </a:ln>
+            <a:effectLst/>
+          </p:spPr>
+          <p:style>
+            <a:lnRef idx="2">
+              <a:schemeClr val="accent1"/>
+            </a:lnRef>
+            <a:fillRef idx="0">
+              <a:schemeClr val="accent1"/>
+            </a:fillRef>
+            <a:effectRef idx="1">
+              <a:schemeClr val="accent1"/>
+            </a:effectRef>
+            <a:fontRef idx="minor">
+              <a:schemeClr val="tx1"/>
+            </a:fontRef>
+          </p:style>
+        </p:cxnSp>
+        <p:cxnSp>
+          <p:nvCxnSpPr>
+            <p:cNvPr id="44" name="Straight Arrow Connector 43"/>
+            <p:cNvCxnSpPr>
+              <a:stCxn id="17" idx="4"/>
+            </p:cNvCxnSpPr>
+            <p:nvPr/>
+          </p:nvCxnSpPr>
+          <p:spPr>
+            <a:xfrm flipH="1">
+              <a:off x="3734373" y="3866002"/>
+              <a:ext cx="6746" cy="840008"/>
+            </a:xfrm>
+            <a:prstGeom prst="straightConnector1">
+              <a:avLst/>
+            </a:prstGeom>
+            <a:ln>
+              <a:solidFill>
+                <a:srgbClr val="000000"/>
+              </a:solidFill>
+              <a:tailEnd type="arrow"/>
+            </a:ln>
+            <a:effectLst/>
+          </p:spPr>
+          <p:style>
+            <a:lnRef idx="2">
+              <a:schemeClr val="accent1"/>
+            </a:lnRef>
+            <a:fillRef idx="0">
+              <a:schemeClr val="accent1"/>
+            </a:fillRef>
+            <a:effectRef idx="1">
+              <a:schemeClr val="accent1"/>
+            </a:effectRef>
+            <a:fontRef idx="minor">
+              <a:schemeClr val="tx1"/>
+            </a:fontRef>
+          </p:style>
+        </p:cxnSp>
+        <p:cxnSp>
+          <p:nvCxnSpPr>
+            <p:cNvPr id="46" name="Straight Arrow Connector 45"/>
+            <p:cNvCxnSpPr>
+              <a:stCxn id="5" idx="4"/>
+              <a:endCxn id="17" idx="0"/>
+            </p:cNvCxnSpPr>
+            <p:nvPr/>
+          </p:nvCxnSpPr>
+          <p:spPr>
+            <a:xfrm>
+              <a:off x="3741119" y="2291681"/>
+              <a:ext cx="0" cy="745511"/>
+            </a:xfrm>
+            <a:prstGeom prst="straightConnector1">
+              <a:avLst/>
+            </a:prstGeom>
+            <a:ln>
+              <a:solidFill>
+                <a:srgbClr val="000000"/>
+              </a:solidFill>
+              <a:tailEnd type="arrow"/>
+            </a:ln>
+            <a:effectLst/>
+          </p:spPr>
+          <p:style>
+            <a:lnRef idx="2">
+              <a:schemeClr val="accent1"/>
+            </a:lnRef>
+            <a:fillRef idx="0">
+              <a:schemeClr val="accent1"/>
+            </a:fillRef>
+            <a:effectRef idx="1">
+              <a:schemeClr val="accent1"/>
+            </a:effectRef>
+            <a:fontRef idx="minor">
+              <a:schemeClr val="tx1"/>
+            </a:fontRef>
+          </p:style>
+        </p:cxnSp>
+        <p:sp>
+          <p:nvSpPr>
+            <p:cNvPr id="49" name="Rectangle 48"/>
+            <p:cNvSpPr/>
+            <p:nvPr/>
+          </p:nvSpPr>
+          <p:spPr>
+            <a:xfrm>
+              <a:off x="1081253" y="4104114"/>
+              <a:ext cx="1279545" cy="429593"/>
+            </a:xfrm>
+            <a:prstGeom prst="rect">
+              <a:avLst/>
+            </a:prstGeom>
+            <a:ln/>
+          </p:spPr>
+          <p:style>
+            <a:lnRef idx="2">
+              <a:schemeClr val="accent3">
+                <a:shade val="50000"/>
+              </a:schemeClr>
+            </a:lnRef>
+            <a:fillRef idx="1">
+              <a:schemeClr val="accent3"/>
+            </a:fillRef>
+            <a:effectRef idx="0">
+              <a:schemeClr val="accent3"/>
+            </a:effectRef>
+            <a:fontRef idx="minor">
+              <a:schemeClr val="lt1"/>
+            </a:fontRef>
+          </p:style>
+          <p:txBody>
+            <a:bodyPr rtlCol="0" anchor="ctr"/>
+            <a:lstStyle/>
+            <a:p>
+              <a:pPr algn="ctr"/>
+              <a:r>
+                <a:rPr lang="en-US" sz="1000" dirty="0" smtClean="0">
+                  <a:solidFill>
+                    <a:schemeClr val="tx1"/>
+                  </a:solidFill>
+                </a:rPr>
+                <a:t>Imu filter</a:t>
+              </a:r>
+              <a:endParaRPr lang="en-US" sz="1000" dirty="0">
+                <a:solidFill>
+                  <a:schemeClr val="tx1"/>
+                </a:solidFill>
+              </a:endParaRPr>
+            </a:p>
+          </p:txBody>
+        </p:sp>
+        <p:sp>
+          <p:nvSpPr>
+            <p:cNvPr id="50" name="Rectangle 49"/>
+            <p:cNvSpPr/>
+            <p:nvPr/>
+          </p:nvSpPr>
+          <p:spPr>
+            <a:xfrm>
+              <a:off x="1081253" y="4920806"/>
+              <a:ext cx="1279545" cy="429593"/>
+            </a:xfrm>
+            <a:prstGeom prst="rect">
+              <a:avLst/>
+            </a:prstGeom>
+            <a:ln/>
+          </p:spPr>
+          <p:style>
+            <a:lnRef idx="2">
+              <a:schemeClr val="accent2">
+                <a:shade val="50000"/>
+              </a:schemeClr>
+            </a:lnRef>
+            <a:fillRef idx="1">
+              <a:schemeClr val="accent2"/>
+            </a:fillRef>
+            <a:effectRef idx="0">
+              <a:schemeClr val="accent2"/>
+            </a:effectRef>
+            <a:fontRef idx="minor">
+              <a:schemeClr val="lt1"/>
+            </a:fontRef>
+          </p:style>
+          <p:txBody>
+            <a:bodyPr rtlCol="0" anchor="ctr"/>
+            <a:lstStyle/>
+            <a:p>
+              <a:pPr algn="ctr"/>
+              <a:r>
+                <a:rPr lang="en-US" sz="1000" dirty="0" smtClean="0">
+                  <a:solidFill>
+                    <a:schemeClr val="tx1"/>
+                  </a:solidFill>
+                </a:rPr>
+                <a:t>Erle brain</a:t>
+              </a:r>
+              <a:endParaRPr lang="en-US" sz="1000" dirty="0">
+                <a:solidFill>
+                  <a:schemeClr val="tx1"/>
+                </a:solidFill>
+              </a:endParaRPr>
+            </a:p>
+          </p:txBody>
+        </p:sp>
+        <p:sp>
+          <p:nvSpPr>
+            <p:cNvPr id="52" name="Rectangle 51"/>
+            <p:cNvSpPr/>
+            <p:nvPr/>
+          </p:nvSpPr>
+          <p:spPr>
+            <a:xfrm>
+              <a:off x="440010" y="442599"/>
+              <a:ext cx="1279545" cy="429593"/>
+            </a:xfrm>
+            <a:prstGeom prst="rect">
+              <a:avLst/>
+            </a:prstGeom>
+            <a:noFill/>
+            <a:ln>
+              <a:solidFill>
+                <a:srgbClr val="000000"/>
+              </a:solidFill>
+            </a:ln>
+            <a:effectLst/>
+          </p:spPr>
+          <p:style>
+            <a:lnRef idx="1">
+              <a:schemeClr val="accent1"/>
+            </a:lnRef>
+            <a:fillRef idx="3">
+              <a:schemeClr val="accent1"/>
+            </a:fillRef>
+            <a:effectRef idx="2">
+              <a:schemeClr val="accent1"/>
+            </a:effectRef>
+            <a:fontRef idx="minor">
+              <a:schemeClr val="lt1"/>
+            </a:fontRef>
+          </p:style>
+          <p:txBody>
+            <a:bodyPr rtlCol="0" anchor="ctr"/>
+            <a:lstStyle/>
+            <a:p>
+              <a:pPr algn="ctr"/>
+              <a:r>
+                <a:rPr lang="en-US" sz="1000" dirty="0" smtClean="0">
+                  <a:solidFill>
+                    <a:schemeClr val="tx1"/>
+                  </a:solidFill>
+                </a:rPr>
+                <a:t>Transform frames</a:t>
+              </a:r>
+              <a:endParaRPr lang="en-US" sz="1000" dirty="0">
+                <a:solidFill>
+                  <a:schemeClr val="tx1"/>
+                </a:solidFill>
+              </a:endParaRPr>
+            </a:p>
+          </p:txBody>
+        </p:sp>
+        <p:cxnSp>
+          <p:nvCxnSpPr>
+            <p:cNvPr id="60" name="Elbow Connector 59"/>
+            <p:cNvCxnSpPr>
+              <a:stCxn id="49" idx="0"/>
+            </p:cNvCxnSpPr>
+            <p:nvPr/>
+          </p:nvCxnSpPr>
+          <p:spPr>
+            <a:xfrm rot="5400000" flipH="1" flipV="1">
+              <a:off x="2178657" y="2956057"/>
+              <a:ext cx="690426" cy="1605688"/>
+            </a:xfrm>
+            <a:prstGeom prst="bentConnector2">
+              <a:avLst/>
+            </a:prstGeom>
+            <a:ln>
+              <a:solidFill>
+                <a:srgbClr val="000000"/>
+              </a:solidFill>
+              <a:tailEnd type="arrow"/>
+            </a:ln>
+            <a:effectLst/>
+          </p:spPr>
+          <p:style>
+            <a:lnRef idx="2">
+              <a:schemeClr val="accent1"/>
+            </a:lnRef>
+            <a:fillRef idx="0">
+              <a:schemeClr val="accent1"/>
+            </a:fillRef>
+            <a:effectRef idx="1">
+              <a:schemeClr val="accent1"/>
+            </a:effectRef>
+            <a:fontRef idx="minor">
+              <a:schemeClr val="tx1"/>
+            </a:fontRef>
+          </p:style>
+        </p:cxnSp>
+        <p:sp>
+          <p:nvSpPr>
+            <p:cNvPr id="62" name="Rectangle 61"/>
+            <p:cNvSpPr/>
+            <p:nvPr/>
+          </p:nvSpPr>
+          <p:spPr>
+            <a:xfrm>
+              <a:off x="3101346" y="256436"/>
+              <a:ext cx="1279545" cy="429593"/>
+            </a:xfrm>
+            <a:prstGeom prst="rect">
+              <a:avLst/>
+            </a:prstGeom>
+            <a:ln/>
+          </p:spPr>
+          <p:style>
+            <a:lnRef idx="2">
+              <a:schemeClr val="accent1">
+                <a:shade val="50000"/>
+              </a:schemeClr>
+            </a:lnRef>
+            <a:fillRef idx="1">
+              <a:schemeClr val="accent1"/>
+            </a:fillRef>
+            <a:effectRef idx="0">
+              <a:schemeClr val="accent1"/>
+            </a:effectRef>
+            <a:fontRef idx="minor">
+              <a:schemeClr val="lt1"/>
+            </a:fontRef>
+          </p:style>
+          <p:txBody>
+            <a:bodyPr rtlCol="0" anchor="ctr"/>
+            <a:lstStyle/>
+            <a:p>
+              <a:pPr algn="ctr"/>
+              <a:r>
+                <a:rPr lang="en-US" sz="1000" dirty="0" smtClean="0">
+                  <a:solidFill>
+                    <a:schemeClr val="tx1"/>
+                  </a:solidFill>
+                </a:rPr>
+                <a:t>RVIZ</a:t>
+              </a:r>
+              <a:endParaRPr lang="en-US" sz="1000" dirty="0">
+                <a:solidFill>
+                  <a:schemeClr val="tx1"/>
+                </a:solidFill>
+              </a:endParaRPr>
+            </a:p>
+          </p:txBody>
+        </p:sp>
+        <p:cxnSp>
+          <p:nvCxnSpPr>
+            <p:cNvPr id="64" name="Straight Arrow Connector 63"/>
+            <p:cNvCxnSpPr>
+              <a:stCxn id="62" idx="2"/>
+              <a:endCxn id="5" idx="0"/>
+            </p:cNvCxnSpPr>
+            <p:nvPr/>
+          </p:nvCxnSpPr>
+          <p:spPr>
+            <a:xfrm>
+              <a:off x="3741119" y="686029"/>
+              <a:ext cx="0" cy="776842"/>
+            </a:xfrm>
+            <a:prstGeom prst="straightConnector1">
+              <a:avLst/>
+            </a:prstGeom>
+            <a:ln>
+              <a:solidFill>
+                <a:srgbClr val="000000"/>
+              </a:solidFill>
+              <a:tailEnd type="arrow"/>
+            </a:ln>
+            <a:effectLst/>
+          </p:spPr>
+          <p:style>
+            <a:lnRef idx="2">
+              <a:schemeClr val="accent1"/>
+            </a:lnRef>
+            <a:fillRef idx="0">
+              <a:schemeClr val="accent1"/>
+            </a:fillRef>
+            <a:effectRef idx="1">
+              <a:schemeClr val="accent1"/>
+            </a:effectRef>
+            <a:fontRef idx="minor">
+              <a:schemeClr val="tx1"/>
+            </a:fontRef>
+          </p:style>
+        </p:cxnSp>
+        <p:sp>
+          <p:nvSpPr>
+            <p:cNvPr id="65" name="Rectangle 64"/>
+            <p:cNvSpPr/>
+            <p:nvPr/>
+          </p:nvSpPr>
+          <p:spPr>
+            <a:xfrm>
+              <a:off x="7623152" y="1662479"/>
+              <a:ext cx="1279545" cy="429593"/>
+            </a:xfrm>
+            <a:prstGeom prst="rect">
+              <a:avLst/>
+            </a:prstGeom>
+            <a:noFill/>
+            <a:ln>
+              <a:solidFill>
+                <a:srgbClr val="000000"/>
+              </a:solidFill>
+            </a:ln>
+            <a:effectLst/>
+          </p:spPr>
+          <p:style>
+            <a:lnRef idx="1">
+              <a:schemeClr val="accent1"/>
+            </a:lnRef>
+            <a:fillRef idx="3">
+              <a:schemeClr val="accent1"/>
+            </a:fillRef>
+            <a:effectRef idx="2">
+              <a:schemeClr val="accent1"/>
+            </a:effectRef>
+            <a:fontRef idx="minor">
+              <a:schemeClr val="lt1"/>
+            </a:fontRef>
+          </p:style>
+          <p:txBody>
+            <a:bodyPr rtlCol="0" anchor="ctr"/>
+            <a:lstStyle/>
+            <a:p>
+              <a:pPr algn="ctr"/>
+              <a:r>
+                <a:rPr lang="en-US" sz="1000" dirty="0" smtClean="0">
+                  <a:solidFill>
+                    <a:schemeClr val="tx1"/>
+                  </a:solidFill>
+                </a:rPr>
+                <a:t>Cartographer</a:t>
+              </a:r>
+              <a:endParaRPr lang="en-US" sz="1000" dirty="0">
+                <a:solidFill>
+                  <a:schemeClr val="tx1"/>
+                </a:solidFill>
+              </a:endParaRPr>
+            </a:p>
+          </p:txBody>
+        </p:sp>
+        <p:sp>
+          <p:nvSpPr>
+            <p:cNvPr id="67" name="Rectangle 66"/>
+            <p:cNvSpPr/>
+            <p:nvPr/>
+          </p:nvSpPr>
+          <p:spPr>
+            <a:xfrm>
+              <a:off x="7623152" y="3236800"/>
+              <a:ext cx="1279545" cy="429593"/>
+            </a:xfrm>
+            <a:prstGeom prst="rect">
+              <a:avLst/>
+            </a:prstGeom>
+            <a:ln/>
+          </p:spPr>
+          <p:style>
+            <a:lnRef idx="2">
+              <a:schemeClr val="accent3">
+                <a:shade val="50000"/>
+              </a:schemeClr>
+            </a:lnRef>
+            <a:fillRef idx="1">
+              <a:schemeClr val="accent3"/>
+            </a:fillRef>
+            <a:effectRef idx="0">
+              <a:schemeClr val="accent3"/>
+            </a:effectRef>
+            <a:fontRef idx="minor">
+              <a:schemeClr val="lt1"/>
+            </a:fontRef>
+          </p:style>
+          <p:txBody>
+            <a:bodyPr rtlCol="0" anchor="ctr"/>
+            <a:lstStyle/>
+            <a:p>
+              <a:pPr algn="ctr"/>
+              <a:r>
+                <a:rPr lang="en-US" sz="1000" dirty="0" smtClean="0">
+                  <a:solidFill>
+                    <a:schemeClr val="tx1"/>
+                  </a:solidFill>
+                </a:rPr>
+                <a:t>Scan filter</a:t>
+              </a:r>
+              <a:endParaRPr lang="en-US" sz="1000" dirty="0">
+                <a:solidFill>
+                  <a:schemeClr val="tx1"/>
+                </a:solidFill>
+              </a:endParaRPr>
+            </a:p>
+          </p:txBody>
+        </p:sp>
+        <p:sp>
+          <p:nvSpPr>
+            <p:cNvPr id="68" name="Rectangle 67"/>
+            <p:cNvSpPr/>
+            <p:nvPr/>
+          </p:nvSpPr>
+          <p:spPr>
+            <a:xfrm>
+              <a:off x="7623152" y="4104115"/>
+              <a:ext cx="1279545" cy="429593"/>
+            </a:xfrm>
+            <a:prstGeom prst="rect">
+              <a:avLst/>
+            </a:prstGeom>
+            <a:ln/>
+          </p:spPr>
+          <p:style>
+            <a:lnRef idx="2">
+              <a:schemeClr val="accent2">
+                <a:shade val="50000"/>
+              </a:schemeClr>
+            </a:lnRef>
+            <a:fillRef idx="1">
+              <a:schemeClr val="accent2"/>
+            </a:fillRef>
+            <a:effectRef idx="0">
+              <a:schemeClr val="accent2"/>
+            </a:effectRef>
+            <a:fontRef idx="minor">
+              <a:schemeClr val="lt1"/>
+            </a:fontRef>
+          </p:style>
+          <p:txBody>
+            <a:bodyPr rtlCol="0" anchor="ctr"/>
+            <a:lstStyle/>
+            <a:p>
+              <a:pPr algn="ctr"/>
+              <a:r>
+                <a:rPr lang="en-US" sz="1000" dirty="0" smtClean="0">
+                  <a:solidFill>
+                    <a:schemeClr val="tx1"/>
+                  </a:solidFill>
+                </a:rPr>
+                <a:t>Hokuyo Laser Scanner</a:t>
+              </a:r>
+              <a:endParaRPr lang="en-US" sz="1000" dirty="0">
+                <a:solidFill>
+                  <a:schemeClr val="tx1"/>
+                </a:solidFill>
+              </a:endParaRPr>
+            </a:p>
+          </p:txBody>
+        </p:sp>
+        <p:cxnSp>
+          <p:nvCxnSpPr>
+            <p:cNvPr id="70" name="Straight Arrow Connector 69"/>
+            <p:cNvCxnSpPr>
+              <a:stCxn id="50" idx="0"/>
+              <a:endCxn id="49" idx="2"/>
+            </p:cNvCxnSpPr>
+            <p:nvPr/>
+          </p:nvCxnSpPr>
+          <p:spPr>
+            <a:xfrm flipV="1">
+              <a:off x="1721026" y="4533707"/>
+              <a:ext cx="0" cy="387099"/>
+            </a:xfrm>
+            <a:prstGeom prst="straightConnector1">
+              <a:avLst/>
+            </a:prstGeom>
+            <a:ln>
+              <a:solidFill>
+                <a:srgbClr val="000000"/>
+              </a:solidFill>
+              <a:tailEnd type="arrow"/>
+            </a:ln>
+            <a:effectLst/>
+          </p:spPr>
+          <p:style>
+            <a:lnRef idx="2">
+              <a:schemeClr val="accent1"/>
+            </a:lnRef>
+            <a:fillRef idx="0">
+              <a:schemeClr val="accent1"/>
+            </a:fillRef>
+            <a:effectRef idx="1">
+              <a:schemeClr val="accent1"/>
+            </a:effectRef>
+            <a:fontRef idx="minor">
+              <a:schemeClr val="tx1"/>
+            </a:fontRef>
+          </p:style>
+        </p:cxnSp>
+        <p:cxnSp>
+          <p:nvCxnSpPr>
+            <p:cNvPr id="72" name="Straight Arrow Connector 71"/>
+            <p:cNvCxnSpPr>
+              <a:stCxn id="68" idx="0"/>
+              <a:endCxn id="67" idx="2"/>
+            </p:cNvCxnSpPr>
+            <p:nvPr/>
+          </p:nvCxnSpPr>
+          <p:spPr>
+            <a:xfrm flipV="1">
+              <a:off x="8262925" y="3666393"/>
+              <a:ext cx="0" cy="437722"/>
+            </a:xfrm>
+            <a:prstGeom prst="straightConnector1">
+              <a:avLst/>
+            </a:prstGeom>
+            <a:ln>
+              <a:solidFill>
+                <a:srgbClr val="000000"/>
+              </a:solidFill>
+              <a:tailEnd type="arrow"/>
+            </a:ln>
+            <a:effectLst/>
+          </p:spPr>
+          <p:style>
+            <a:lnRef idx="2">
+              <a:schemeClr val="accent1"/>
+            </a:lnRef>
+            <a:fillRef idx="0">
+              <a:schemeClr val="accent1"/>
+            </a:fillRef>
+            <a:effectRef idx="1">
+              <a:schemeClr val="accent1"/>
+            </a:effectRef>
+            <a:fontRef idx="minor">
+              <a:schemeClr val="tx1"/>
+            </a:fontRef>
+          </p:style>
+        </p:cxnSp>
+        <p:cxnSp>
+          <p:nvCxnSpPr>
+            <p:cNvPr id="74" name="Elbow Connector 73"/>
+            <p:cNvCxnSpPr>
+              <a:stCxn id="67" idx="0"/>
+            </p:cNvCxnSpPr>
+            <p:nvPr/>
+          </p:nvCxnSpPr>
+          <p:spPr>
+            <a:xfrm rot="16200000" flipV="1">
+              <a:off x="6999451" y="1973326"/>
+              <a:ext cx="573683" cy="1953266"/>
+            </a:xfrm>
+            <a:prstGeom prst="bentConnector2">
+              <a:avLst/>
+            </a:prstGeom>
+            <a:ln>
+              <a:solidFill>
+                <a:srgbClr val="000000"/>
+              </a:solidFill>
+            </a:ln>
+            <a:effectLst/>
+          </p:spPr>
+          <p:style>
+            <a:lnRef idx="2">
+              <a:schemeClr val="accent1"/>
+            </a:lnRef>
+            <a:fillRef idx="0">
+              <a:schemeClr val="accent1"/>
+            </a:fillRef>
+            <a:effectRef idx="1">
+              <a:schemeClr val="accent1"/>
+            </a:effectRef>
+            <a:fontRef idx="minor">
+              <a:schemeClr val="tx1"/>
+            </a:fontRef>
+          </p:style>
+        </p:cxnSp>
+        <p:cxnSp>
+          <p:nvCxnSpPr>
+            <p:cNvPr id="76" name="Straight Arrow Connector 75"/>
+            <p:cNvCxnSpPr>
+              <a:stCxn id="65" idx="1"/>
+              <a:endCxn id="18" idx="6"/>
+            </p:cNvCxnSpPr>
+            <p:nvPr/>
+          </p:nvCxnSpPr>
+          <p:spPr>
+            <a:xfrm flipH="1">
+              <a:off x="6724064" y="1877276"/>
+              <a:ext cx="899088" cy="0"/>
+            </a:xfrm>
+            <a:prstGeom prst="straightConnector1">
+              <a:avLst/>
+            </a:prstGeom>
+            <a:ln>
+              <a:solidFill>
+                <a:srgbClr val="000000"/>
+              </a:solidFill>
+              <a:tailEnd type="arrow"/>
+            </a:ln>
+            <a:effectLst/>
+          </p:spPr>
+          <p:style>
+            <a:lnRef idx="2">
+              <a:schemeClr val="accent1"/>
+            </a:lnRef>
+            <a:fillRef idx="0">
+              <a:schemeClr val="accent1"/>
+            </a:fillRef>
+            <a:effectRef idx="1">
+              <a:schemeClr val="accent1"/>
+            </a:effectRef>
+            <a:fontRef idx="minor">
+              <a:schemeClr val="tx1"/>
+            </a:fontRef>
+          </p:style>
+        </p:cxnSp>
+        <p:sp>
+          <p:nvSpPr>
+            <p:cNvPr id="77" name="Rectangle 76"/>
+            <p:cNvSpPr/>
+            <p:nvPr/>
+          </p:nvSpPr>
+          <p:spPr>
+            <a:xfrm>
+              <a:off x="8262926" y="3798929"/>
+              <a:ext cx="467383" cy="246221"/>
+            </a:xfrm>
+            <a:prstGeom prst="rect">
+              <a:avLst/>
+            </a:prstGeom>
+          </p:spPr>
+          <p:txBody>
+            <a:bodyPr wrap="none">
+              <a:spAutoFit/>
+            </a:bodyPr>
+            <a:lstStyle/>
+            <a:p>
+              <a:r>
+                <a:rPr lang="en-US" sz="1000" dirty="0" smtClean="0"/>
+                <a:t>\scan</a:t>
+              </a:r>
+              <a:endParaRPr lang="en-US" sz="1000" dirty="0"/>
+            </a:p>
+          </p:txBody>
+        </p:sp>
+        <p:sp>
+          <p:nvSpPr>
+            <p:cNvPr id="78" name="Rectangle 77"/>
+            <p:cNvSpPr/>
+            <p:nvPr/>
+          </p:nvSpPr>
+          <p:spPr>
+            <a:xfrm>
+              <a:off x="7145763" y="2414710"/>
+              <a:ext cx="1221421" cy="246221"/>
+            </a:xfrm>
+            <a:prstGeom prst="rect">
+              <a:avLst/>
+            </a:prstGeom>
+          </p:spPr>
+          <p:txBody>
+            <a:bodyPr wrap="none">
+              <a:spAutoFit/>
+            </a:bodyPr>
+            <a:lstStyle/>
+            <a:p>
+              <a:r>
+                <a:rPr lang="en-US" sz="1000" dirty="0" smtClean="0"/>
+                <a:t>\scan_filtered_nans</a:t>
+              </a:r>
+              <a:endParaRPr lang="en-US" sz="1000" dirty="0"/>
+            </a:p>
+          </p:txBody>
+        </p:sp>
+        <p:sp>
+          <p:nvSpPr>
+            <p:cNvPr id="79" name="Rectangle 78"/>
+            <p:cNvSpPr/>
+            <p:nvPr/>
+          </p:nvSpPr>
+          <p:spPr>
+            <a:xfrm>
+              <a:off x="6912366" y="1617377"/>
+              <a:ext cx="466794" cy="246221"/>
+            </a:xfrm>
+            <a:prstGeom prst="rect">
+              <a:avLst/>
+            </a:prstGeom>
+          </p:spPr>
+          <p:txBody>
+            <a:bodyPr wrap="none">
+              <a:spAutoFit/>
+            </a:bodyPr>
+            <a:lstStyle/>
+            <a:p>
+              <a:r>
+                <a:rPr lang="en-US" sz="1000" dirty="0" smtClean="0"/>
+                <a:t>\map</a:t>
+              </a:r>
+              <a:endParaRPr lang="en-US" sz="1000" dirty="0"/>
+            </a:p>
+          </p:txBody>
+        </p:sp>
+        <p:sp>
+          <p:nvSpPr>
+            <p:cNvPr id="80" name="Rectangle 79"/>
+            <p:cNvSpPr/>
+            <p:nvPr/>
+          </p:nvSpPr>
+          <p:spPr>
+            <a:xfrm>
+              <a:off x="5723303" y="995303"/>
+              <a:ext cx="1259868" cy="246221"/>
+            </a:xfrm>
+            <a:prstGeom prst="rect">
+              <a:avLst/>
+            </a:prstGeom>
+          </p:spPr>
+          <p:txBody>
+            <a:bodyPr wrap="none">
+              <a:spAutoFit/>
+            </a:bodyPr>
+            <a:lstStyle/>
+            <a:p>
+              <a:r>
+                <a:rPr lang="en-US" sz="1000" b="1" dirty="0" smtClean="0"/>
+                <a:t>move_base package</a:t>
+              </a:r>
+              <a:endParaRPr lang="en-US" sz="1000" b="1" dirty="0"/>
+            </a:p>
+          </p:txBody>
+        </p:sp>
+        <p:sp>
+          <p:nvSpPr>
+            <p:cNvPr id="81" name="Rectangle 80"/>
+            <p:cNvSpPr/>
+            <p:nvPr/>
+          </p:nvSpPr>
+          <p:spPr>
+            <a:xfrm>
+              <a:off x="3760373" y="872192"/>
+              <a:ext cx="1457989" cy="246221"/>
+            </a:xfrm>
+            <a:prstGeom prst="rect">
+              <a:avLst/>
+            </a:prstGeom>
+          </p:spPr>
+          <p:txBody>
+            <a:bodyPr wrap="none">
+              <a:spAutoFit/>
+            </a:bodyPr>
+            <a:lstStyle/>
+            <a:p>
+              <a:r>
+                <a:rPr lang="en-US" sz="1000" dirty="0" smtClean="0"/>
+                <a:t>move_base/simple_goal</a:t>
+              </a:r>
+              <a:endParaRPr lang="en-US" sz="1000" dirty="0"/>
+            </a:p>
+          </p:txBody>
+        </p:sp>
+        <p:sp>
+          <p:nvSpPr>
+            <p:cNvPr id="82" name="Rectangle 81"/>
+            <p:cNvSpPr/>
+            <p:nvPr/>
+          </p:nvSpPr>
+          <p:spPr>
+            <a:xfrm>
+              <a:off x="1721026" y="4582899"/>
+              <a:ext cx="433444" cy="246221"/>
+            </a:xfrm>
+            <a:prstGeom prst="rect">
+              <a:avLst/>
+            </a:prstGeom>
+          </p:spPr>
+          <p:txBody>
+            <a:bodyPr wrap="none">
+              <a:spAutoFit/>
+            </a:bodyPr>
+            <a:lstStyle/>
+            <a:p>
+              <a:r>
+                <a:rPr lang="en-US" sz="1000" dirty="0" smtClean="0"/>
+                <a:t>\imu</a:t>
+              </a:r>
+              <a:endParaRPr lang="en-US" sz="1000" dirty="0"/>
+            </a:p>
+          </p:txBody>
+        </p:sp>
+        <p:sp>
+          <p:nvSpPr>
+            <p:cNvPr id="83" name="Rectangle 82"/>
+            <p:cNvSpPr/>
+            <p:nvPr/>
+          </p:nvSpPr>
+          <p:spPr>
+            <a:xfrm>
+              <a:off x="1721026" y="3619781"/>
+              <a:ext cx="924364" cy="246221"/>
+            </a:xfrm>
+            <a:prstGeom prst="rect">
+              <a:avLst/>
+            </a:prstGeom>
+          </p:spPr>
+          <p:txBody>
+            <a:bodyPr wrap="none">
+              <a:spAutoFit/>
+            </a:bodyPr>
+            <a:lstStyle/>
+            <a:p>
+              <a:r>
+                <a:rPr lang="en-US" sz="1000" dirty="0" smtClean="0"/>
+                <a:t>\filtered_nans</a:t>
+              </a:r>
+              <a:endParaRPr lang="en-US" sz="1000" dirty="0"/>
+            </a:p>
+          </p:txBody>
+        </p:sp>
+        <p:sp>
+          <p:nvSpPr>
+            <p:cNvPr id="84" name="Rectangle 83"/>
+            <p:cNvSpPr/>
+            <p:nvPr/>
+          </p:nvSpPr>
+          <p:spPr>
+            <a:xfrm>
+              <a:off x="923816" y="3977552"/>
+              <a:ext cx="1597359" cy="1519273"/>
+            </a:xfrm>
+            <a:prstGeom prst="rect">
+              <a:avLst/>
+            </a:prstGeom>
+            <a:noFill/>
+            <a:ln>
+              <a:solidFill>
+                <a:srgbClr val="000000"/>
+              </a:solidFill>
+              <a:prstDash val="dash"/>
+            </a:ln>
+            <a:effectLst/>
+          </p:spPr>
+          <p:style>
+            <a:lnRef idx="1">
+              <a:schemeClr val="accent1"/>
+            </a:lnRef>
+            <a:fillRef idx="3">
+              <a:schemeClr val="accent1"/>
+            </a:fillRef>
+            <a:effectRef idx="2">
+              <a:schemeClr val="accent1"/>
+            </a:effectRef>
+            <a:fontRef idx="minor">
+              <a:schemeClr val="lt1"/>
+            </a:fontRef>
+          </p:style>
+          <p:txBody>
+            <a:bodyPr rtlCol="0" anchor="ctr"/>
+            <a:lstStyle/>
+            <a:p>
+              <a:pPr algn="ctr"/>
+              <a:endParaRPr lang="en-US" sz="1000" dirty="0">
+                <a:solidFill>
+                  <a:schemeClr val="tx1"/>
+                </a:solidFill>
+              </a:endParaRPr>
+            </a:p>
+          </p:txBody>
+        </p:sp>
+        <p:sp>
+          <p:nvSpPr>
+            <p:cNvPr id="85" name="Rectangle 84"/>
+            <p:cNvSpPr/>
+            <p:nvPr/>
+          </p:nvSpPr>
+          <p:spPr>
+            <a:xfrm>
+              <a:off x="7464245" y="3096523"/>
+              <a:ext cx="1597359" cy="1571842"/>
+            </a:xfrm>
+            <a:prstGeom prst="rect">
+              <a:avLst/>
+            </a:prstGeom>
+            <a:noFill/>
+            <a:ln>
+              <a:solidFill>
+                <a:srgbClr val="000000"/>
+              </a:solidFill>
+              <a:prstDash val="dash"/>
+            </a:ln>
+            <a:effectLst/>
+          </p:spPr>
+          <p:style>
+            <a:lnRef idx="1">
+              <a:schemeClr val="accent1"/>
+            </a:lnRef>
+            <a:fillRef idx="3">
+              <a:schemeClr val="accent1"/>
+            </a:fillRef>
+            <a:effectRef idx="2">
+              <a:schemeClr val="accent1"/>
+            </a:effectRef>
+            <a:fontRef idx="minor">
+              <a:schemeClr val="lt1"/>
+            </a:fontRef>
+          </p:style>
+          <p:txBody>
+            <a:bodyPr rtlCol="0" anchor="ctr"/>
+            <a:lstStyle/>
+            <a:p>
+              <a:pPr algn="ctr"/>
+              <a:endParaRPr lang="en-US" sz="1000" dirty="0">
+                <a:solidFill>
+                  <a:schemeClr val="tx1"/>
+                </a:solidFill>
+              </a:endParaRPr>
+            </a:p>
+          </p:txBody>
+        </p:sp>
+        <p:cxnSp>
+          <p:nvCxnSpPr>
+            <p:cNvPr id="87" name="Straight Arrow Connector 86"/>
+            <p:cNvCxnSpPr/>
+            <p:nvPr/>
+          </p:nvCxnSpPr>
+          <p:spPr>
+            <a:xfrm flipH="1">
+              <a:off x="3727627" y="5135603"/>
+              <a:ext cx="6746" cy="840008"/>
+            </a:xfrm>
+            <a:prstGeom prst="straightConnector1">
+              <a:avLst/>
+            </a:prstGeom>
+            <a:ln>
+              <a:solidFill>
+                <a:srgbClr val="000000"/>
+              </a:solidFill>
+              <a:prstDash val="dash"/>
+              <a:tailEnd type="arrow"/>
+            </a:ln>
+            <a:effectLst/>
+          </p:spPr>
+          <p:style>
+            <a:lnRef idx="2">
+              <a:schemeClr val="accent1"/>
+            </a:lnRef>
+            <a:fillRef idx="0">
+              <a:schemeClr val="accent1"/>
+            </a:fillRef>
+            <a:effectRef idx="1">
+              <a:schemeClr val="accent1"/>
+            </a:effectRef>
+            <a:fontRef idx="minor">
+              <a:schemeClr val="tx1"/>
+            </a:fontRef>
+          </p:style>
+        </p:cxnSp>
+        <p:sp>
+          <p:nvSpPr>
+            <p:cNvPr id="88" name="Rectangle 87"/>
+            <p:cNvSpPr/>
+            <p:nvPr/>
+          </p:nvSpPr>
+          <p:spPr>
+            <a:xfrm>
+              <a:off x="3724149" y="5350399"/>
+              <a:ext cx="654734" cy="246221"/>
+            </a:xfrm>
+            <a:prstGeom prst="rect">
+              <a:avLst/>
+            </a:prstGeom>
+          </p:spPr>
+          <p:txBody>
+            <a:bodyPr wrap="none">
+              <a:spAutoFit/>
+            </a:bodyPr>
+            <a:lstStyle/>
+            <a:p>
+              <a:r>
+                <a:rPr lang="en-US" sz="1000" dirty="0" smtClean="0"/>
+                <a:t>MAVROS</a:t>
+              </a:r>
+              <a:endParaRPr lang="en-US" sz="1000" dirty="0"/>
+            </a:p>
+          </p:txBody>
+        </p:sp>
+        <p:sp>
+          <p:nvSpPr>
+            <p:cNvPr id="89" name="Rectangle 88"/>
+            <p:cNvSpPr/>
+            <p:nvPr/>
+          </p:nvSpPr>
+          <p:spPr>
+            <a:xfrm>
+              <a:off x="3396782" y="5975611"/>
+              <a:ext cx="1341270" cy="246221"/>
+            </a:xfrm>
+            <a:prstGeom prst="rect">
+              <a:avLst/>
+            </a:prstGeom>
+          </p:spPr>
+          <p:txBody>
+            <a:bodyPr wrap="none">
+              <a:spAutoFit/>
+            </a:bodyPr>
+            <a:lstStyle/>
+            <a:p>
+              <a:r>
+                <a:rPr lang="en-US" sz="1000" dirty="0" smtClean="0"/>
+                <a:t>To px4 offboard mode</a:t>
+              </a:r>
+              <a:endParaRPr lang="en-US" sz="1000" dirty="0"/>
+            </a:p>
+          </p:txBody>
+        </p:sp>
+        <p:sp>
+          <p:nvSpPr>
+            <p:cNvPr id="90" name="Rectangle 89"/>
+            <p:cNvSpPr/>
+            <p:nvPr/>
+          </p:nvSpPr>
+          <p:spPr>
+            <a:xfrm>
+              <a:off x="6957494" y="6264475"/>
+              <a:ext cx="312211" cy="294882"/>
+            </a:xfrm>
+            <a:prstGeom prst="rect">
+              <a:avLst/>
+            </a:prstGeom>
+            <a:ln/>
+          </p:spPr>
+          <p:style>
+            <a:lnRef idx="2">
+              <a:schemeClr val="accent3">
+                <a:shade val="50000"/>
+              </a:schemeClr>
+            </a:lnRef>
+            <a:fillRef idx="1">
+              <a:schemeClr val="accent3"/>
+            </a:fillRef>
+            <a:effectRef idx="0">
+              <a:schemeClr val="accent3"/>
+            </a:effectRef>
+            <a:fontRef idx="minor">
+              <a:schemeClr val="lt1"/>
+            </a:fontRef>
+          </p:style>
+          <p:txBody>
+            <a:bodyPr rtlCol="0" anchor="ctr"/>
+            <a:lstStyle/>
+            <a:p>
+              <a:pPr algn="ctr"/>
+              <a:endParaRPr lang="en-US" sz="1000" dirty="0">
+                <a:solidFill>
+                  <a:schemeClr val="tx1"/>
+                </a:solidFill>
+              </a:endParaRPr>
+            </a:p>
+          </p:txBody>
+        </p:sp>
+        <p:sp>
+          <p:nvSpPr>
+            <p:cNvPr id="91" name="Rectangle 90"/>
+            <p:cNvSpPr/>
+            <p:nvPr/>
+          </p:nvSpPr>
+          <p:spPr>
+            <a:xfrm>
+              <a:off x="6957494" y="5834350"/>
+              <a:ext cx="312211" cy="294882"/>
+            </a:xfrm>
+            <a:prstGeom prst="rect">
+              <a:avLst/>
+            </a:prstGeom>
+            <a:ln/>
+          </p:spPr>
+          <p:style>
+            <a:lnRef idx="2">
+              <a:schemeClr val="accent1">
+                <a:shade val="50000"/>
+              </a:schemeClr>
+            </a:lnRef>
+            <a:fillRef idx="1">
+              <a:schemeClr val="accent1"/>
+            </a:fillRef>
+            <a:effectRef idx="0">
+              <a:schemeClr val="accent1"/>
+            </a:effectRef>
+            <a:fontRef idx="minor">
+              <a:schemeClr val="lt1"/>
+            </a:fontRef>
+          </p:style>
+          <p:txBody>
+            <a:bodyPr rtlCol="0" anchor="ctr"/>
+            <a:lstStyle/>
+            <a:p>
+              <a:pPr algn="ctr"/>
+              <a:endParaRPr lang="en-US" sz="1000" dirty="0">
+                <a:solidFill>
+                  <a:schemeClr val="tx1"/>
+                </a:solidFill>
+              </a:endParaRPr>
+            </a:p>
+          </p:txBody>
+        </p:sp>
+        <p:sp>
+          <p:nvSpPr>
+            <p:cNvPr id="92" name="Rectangle 91"/>
+            <p:cNvSpPr/>
+            <p:nvPr/>
+          </p:nvSpPr>
+          <p:spPr>
+            <a:xfrm>
+              <a:off x="7269706" y="5843861"/>
+              <a:ext cx="1397846" cy="246221"/>
+            </a:xfrm>
+            <a:prstGeom prst="rect">
+              <a:avLst/>
+            </a:prstGeom>
+          </p:spPr>
+          <p:txBody>
+            <a:bodyPr wrap="square">
+              <a:spAutoFit/>
+            </a:bodyPr>
+            <a:lstStyle/>
+            <a:p>
+              <a:r>
+                <a:rPr lang="en-US" sz="1000" dirty="0" smtClean="0"/>
+                <a:t>Modifications by URSA</a:t>
+              </a:r>
+              <a:endParaRPr lang="en-US" sz="1000" dirty="0"/>
+            </a:p>
+          </p:txBody>
+        </p:sp>
+        <p:sp>
+          <p:nvSpPr>
+            <p:cNvPr id="93" name="Rectangle 92"/>
+            <p:cNvSpPr/>
+            <p:nvPr/>
+          </p:nvSpPr>
+          <p:spPr>
+            <a:xfrm>
+              <a:off x="7269705" y="6286888"/>
+              <a:ext cx="1397846" cy="246221"/>
+            </a:xfrm>
+            <a:prstGeom prst="rect">
+              <a:avLst/>
+            </a:prstGeom>
+          </p:spPr>
+          <p:txBody>
+            <a:bodyPr wrap="square">
+              <a:spAutoFit/>
+            </a:bodyPr>
+            <a:lstStyle/>
+            <a:p>
+              <a:r>
+                <a:rPr lang="en-US" sz="1000" dirty="0" smtClean="0"/>
+                <a:t>Written by URSA</a:t>
+              </a:r>
+              <a:endParaRPr lang="en-US" sz="1000" dirty="0"/>
+            </a:p>
+          </p:txBody>
+        </p:sp>
+        <p:sp>
+          <p:nvSpPr>
+            <p:cNvPr id="94" name="Rectangle 93"/>
+            <p:cNvSpPr/>
+            <p:nvPr/>
+          </p:nvSpPr>
+          <p:spPr>
+            <a:xfrm>
+              <a:off x="6957495" y="5393042"/>
+              <a:ext cx="312211" cy="294882"/>
+            </a:xfrm>
+            <a:prstGeom prst="rect">
+              <a:avLst/>
+            </a:prstGeom>
+            <a:ln/>
+          </p:spPr>
+          <p:style>
+            <a:lnRef idx="2">
+              <a:schemeClr val="accent2">
+                <a:shade val="50000"/>
+              </a:schemeClr>
+            </a:lnRef>
+            <a:fillRef idx="1">
+              <a:schemeClr val="accent2"/>
+            </a:fillRef>
+            <a:effectRef idx="0">
+              <a:schemeClr val="accent2"/>
+            </a:effectRef>
+            <a:fontRef idx="minor">
+              <a:schemeClr val="lt1"/>
+            </a:fontRef>
+          </p:style>
+          <p:txBody>
+            <a:bodyPr rtlCol="0" anchor="ctr"/>
+            <a:lstStyle/>
+            <a:p>
+              <a:pPr algn="ctr"/>
+              <a:endParaRPr lang="en-US" sz="1000" dirty="0">
+                <a:solidFill>
+                  <a:schemeClr val="tx1"/>
+                </a:solidFill>
+              </a:endParaRPr>
+            </a:p>
+          </p:txBody>
+        </p:sp>
+        <p:sp>
+          <p:nvSpPr>
+            <p:cNvPr id="95" name="Rectangle 94"/>
+            <p:cNvSpPr/>
+            <p:nvPr/>
+          </p:nvSpPr>
+          <p:spPr>
+            <a:xfrm>
+              <a:off x="7269705" y="5422271"/>
+              <a:ext cx="1397846" cy="246221"/>
+            </a:xfrm>
+            <a:prstGeom prst="rect">
+              <a:avLst/>
+            </a:prstGeom>
+          </p:spPr>
+          <p:txBody>
+            <a:bodyPr wrap="square">
+              <a:spAutoFit/>
+            </a:bodyPr>
+            <a:lstStyle/>
+            <a:p>
+              <a:r>
+                <a:rPr lang="en-US" sz="1000" dirty="0" smtClean="0"/>
+                <a:t>Hardware</a:t>
+              </a:r>
+              <a:endParaRPr lang="en-US" sz="1000" dirty="0"/>
+            </a:p>
+          </p:txBody>
+        </p:sp>
+        <p:sp>
+          <p:nvSpPr>
+            <p:cNvPr id="102" name="Rectangle 101"/>
+            <p:cNvSpPr/>
+            <p:nvPr/>
+          </p:nvSpPr>
+          <p:spPr>
+            <a:xfrm>
+              <a:off x="440010" y="1765857"/>
+              <a:ext cx="1279545" cy="429593"/>
+            </a:xfrm>
+            <a:prstGeom prst="rect">
+              <a:avLst/>
+            </a:prstGeom>
+            <a:ln/>
+          </p:spPr>
+          <p:style>
+            <a:lnRef idx="2">
+              <a:schemeClr val="accent3">
+                <a:shade val="50000"/>
+              </a:schemeClr>
+            </a:lnRef>
+            <a:fillRef idx="1">
+              <a:schemeClr val="accent3"/>
+            </a:fillRef>
+            <a:effectRef idx="0">
+              <a:schemeClr val="accent3"/>
+            </a:effectRef>
+            <a:fontRef idx="minor">
+              <a:schemeClr val="lt1"/>
+            </a:fontRef>
+          </p:style>
+          <p:txBody>
+            <a:bodyPr rtlCol="0" anchor="ctr"/>
+            <a:lstStyle/>
+            <a:p>
+              <a:pPr algn="ctr"/>
+              <a:r>
+                <a:rPr lang="en-US" sz="1000" dirty="0" smtClean="0">
+                  <a:solidFill>
+                    <a:schemeClr val="tx1"/>
+                  </a:solidFill>
+                </a:rPr>
+                <a:t>Height publisher</a:t>
+              </a:r>
+              <a:endParaRPr lang="en-US" sz="1000" dirty="0">
+                <a:solidFill>
+                  <a:schemeClr val="tx1"/>
+                </a:solidFill>
+              </a:endParaRPr>
+            </a:p>
+          </p:txBody>
+        </p:sp>
+        <p:sp>
+          <p:nvSpPr>
+            <p:cNvPr id="103" name="Rectangle 102"/>
+            <p:cNvSpPr/>
+            <p:nvPr/>
+          </p:nvSpPr>
+          <p:spPr>
+            <a:xfrm>
+              <a:off x="440010" y="2582549"/>
+              <a:ext cx="1279545" cy="429593"/>
+            </a:xfrm>
+            <a:prstGeom prst="rect">
+              <a:avLst/>
+            </a:prstGeom>
+            <a:ln/>
+          </p:spPr>
+          <p:style>
+            <a:lnRef idx="2">
+              <a:schemeClr val="accent2">
+                <a:shade val="50000"/>
+              </a:schemeClr>
+            </a:lnRef>
+            <a:fillRef idx="1">
+              <a:schemeClr val="accent2"/>
+            </a:fillRef>
+            <a:effectRef idx="0">
+              <a:schemeClr val="accent2"/>
+            </a:effectRef>
+            <a:fontRef idx="minor">
+              <a:schemeClr val="lt1"/>
+            </a:fontRef>
+          </p:style>
+          <p:txBody>
+            <a:bodyPr rtlCol="0" anchor="ctr"/>
+            <a:lstStyle/>
+            <a:p>
+              <a:pPr algn="ctr"/>
+              <a:r>
+                <a:rPr lang="en-US" sz="1000" dirty="0" smtClean="0">
+                  <a:solidFill>
+                    <a:schemeClr val="tx1"/>
+                  </a:solidFill>
+                </a:rPr>
+                <a:t>Ultrasound sensor</a:t>
+              </a:r>
+              <a:endParaRPr lang="en-US" sz="1000" dirty="0">
+                <a:solidFill>
+                  <a:schemeClr val="tx1"/>
+                </a:solidFill>
+              </a:endParaRPr>
+            </a:p>
+          </p:txBody>
+        </p:sp>
+        <p:cxnSp>
+          <p:nvCxnSpPr>
+            <p:cNvPr id="104" name="Straight Arrow Connector 103"/>
+            <p:cNvCxnSpPr>
+              <a:stCxn id="103" idx="0"/>
+              <a:endCxn id="102" idx="2"/>
+            </p:cNvCxnSpPr>
+            <p:nvPr/>
+          </p:nvCxnSpPr>
+          <p:spPr>
+            <a:xfrm flipV="1">
+              <a:off x="1079783" y="2195450"/>
+              <a:ext cx="0" cy="387099"/>
+            </a:xfrm>
+            <a:prstGeom prst="straightConnector1">
+              <a:avLst/>
+            </a:prstGeom>
+            <a:ln>
+              <a:solidFill>
+                <a:srgbClr val="000000"/>
+              </a:solidFill>
+              <a:tailEnd type="arrow"/>
+            </a:ln>
+            <a:effectLst/>
+          </p:spPr>
+          <p:style>
+            <a:lnRef idx="2">
+              <a:schemeClr val="accent1"/>
+            </a:lnRef>
+            <a:fillRef idx="0">
+              <a:schemeClr val="accent1"/>
+            </a:fillRef>
+            <a:effectRef idx="1">
+              <a:schemeClr val="accent1"/>
+            </a:effectRef>
+            <a:fontRef idx="minor">
+              <a:schemeClr val="tx1"/>
+            </a:fontRef>
+          </p:style>
+        </p:cxnSp>
+        <p:sp>
+          <p:nvSpPr>
+            <p:cNvPr id="105" name="Rectangle 104"/>
+            <p:cNvSpPr/>
+            <p:nvPr/>
+          </p:nvSpPr>
+          <p:spPr>
+            <a:xfrm>
+              <a:off x="1081253" y="2291681"/>
+              <a:ext cx="531879" cy="246221"/>
+            </a:xfrm>
+            <a:prstGeom prst="rect">
+              <a:avLst/>
+            </a:prstGeom>
+          </p:spPr>
+          <p:txBody>
+            <a:bodyPr wrap="none">
+              <a:spAutoFit/>
+            </a:bodyPr>
+            <a:lstStyle/>
+            <a:p>
+              <a:r>
+                <a:rPr lang="en-US" sz="1000" dirty="0" smtClean="0"/>
+                <a:t>\range</a:t>
+              </a:r>
+              <a:endParaRPr lang="en-US" sz="1000" dirty="0"/>
+            </a:p>
+          </p:txBody>
+        </p:sp>
+        <p:sp>
+          <p:nvSpPr>
+            <p:cNvPr id="106" name="Rectangle 105"/>
+            <p:cNvSpPr/>
+            <p:nvPr/>
+          </p:nvSpPr>
+          <p:spPr>
+            <a:xfrm>
+              <a:off x="1081253" y="1216650"/>
+              <a:ext cx="684803" cy="246221"/>
+            </a:xfrm>
+            <a:prstGeom prst="rect">
+              <a:avLst/>
+            </a:prstGeom>
+          </p:spPr>
+          <p:txBody>
+            <a:bodyPr wrap="none">
+              <a:spAutoFit/>
+            </a:bodyPr>
+            <a:lstStyle/>
+            <a:p>
+              <a:r>
+                <a:rPr lang="en-US" sz="1000" dirty="0" smtClean="0"/>
+                <a:t>base_link</a:t>
+              </a:r>
+              <a:endParaRPr lang="en-US" sz="1000" dirty="0"/>
+            </a:p>
+          </p:txBody>
+        </p:sp>
+        <p:sp>
+          <p:nvSpPr>
+            <p:cNvPr id="107" name="Rectangle 106"/>
+            <p:cNvSpPr/>
+            <p:nvPr/>
+          </p:nvSpPr>
+          <p:spPr>
+            <a:xfrm>
+              <a:off x="282573" y="1639295"/>
+              <a:ext cx="1597359" cy="1519273"/>
+            </a:xfrm>
+            <a:prstGeom prst="rect">
+              <a:avLst/>
+            </a:prstGeom>
+            <a:noFill/>
+            <a:ln>
+              <a:solidFill>
+                <a:srgbClr val="000000"/>
+              </a:solidFill>
+              <a:prstDash val="dash"/>
+            </a:ln>
+            <a:effectLst/>
+          </p:spPr>
+          <p:style>
+            <a:lnRef idx="1">
+              <a:schemeClr val="accent1"/>
+            </a:lnRef>
+            <a:fillRef idx="3">
+              <a:schemeClr val="accent1"/>
+            </a:fillRef>
+            <a:effectRef idx="2">
+              <a:schemeClr val="accent1"/>
+            </a:effectRef>
+            <a:fontRef idx="minor">
+              <a:schemeClr val="lt1"/>
+            </a:fontRef>
+          </p:style>
+          <p:txBody>
+            <a:bodyPr rtlCol="0" anchor="ctr"/>
+            <a:lstStyle/>
+            <a:p>
+              <a:pPr algn="ctr"/>
+              <a:endParaRPr lang="en-US" sz="1000" dirty="0">
+                <a:solidFill>
+                  <a:schemeClr val="tx1"/>
+                </a:solidFill>
+              </a:endParaRPr>
+            </a:p>
+          </p:txBody>
+        </p:sp>
+        <p:cxnSp>
+          <p:nvCxnSpPr>
+            <p:cNvPr id="108" name="Straight Arrow Connector 107"/>
+            <p:cNvCxnSpPr>
+              <a:endCxn id="52" idx="2"/>
+            </p:cNvCxnSpPr>
+            <p:nvPr/>
+          </p:nvCxnSpPr>
+          <p:spPr>
+            <a:xfrm flipV="1">
+              <a:off x="1079783" y="872192"/>
+              <a:ext cx="0" cy="893666"/>
+            </a:xfrm>
+            <a:prstGeom prst="straightConnector1">
+              <a:avLst/>
+            </a:prstGeom>
+            <a:ln>
+              <a:solidFill>
+                <a:srgbClr val="000000"/>
+              </a:solidFill>
+              <a:tailEnd type="arrow"/>
+            </a:ln>
+            <a:effectLst/>
+          </p:spPr>
+          <p:style>
+            <a:lnRef idx="2">
+              <a:schemeClr val="accent1"/>
+            </a:lnRef>
+            <a:fillRef idx="0">
+              <a:schemeClr val="accent1"/>
+            </a:fillRef>
+            <a:effectRef idx="1">
+              <a:schemeClr val="accent1"/>
+            </a:effectRef>
+            <a:fontRef idx="minor">
+              <a:schemeClr val="tx1"/>
+            </a:fontRef>
+          </p:style>
+        </p:cxnSp>
+        <p:cxnSp>
+          <p:nvCxnSpPr>
+            <p:cNvPr id="112" name="Elbow Connector 111"/>
+            <p:cNvCxnSpPr>
+              <a:stCxn id="52" idx="3"/>
+            </p:cNvCxnSpPr>
+            <p:nvPr/>
+          </p:nvCxnSpPr>
+          <p:spPr>
+            <a:xfrm>
+              <a:off x="1719555" y="657396"/>
+              <a:ext cx="1381791" cy="1078993"/>
+            </a:xfrm>
+            <a:prstGeom prst="bentConnector3">
+              <a:avLst>
+                <a:gd name="adj1" fmla="val 50000"/>
+              </a:avLst>
+            </a:prstGeom>
+            <a:ln>
+              <a:solidFill>
+                <a:srgbClr val="000000"/>
+              </a:solidFill>
+              <a:tailEnd type="arrow"/>
+            </a:ln>
+            <a:effectLst/>
+          </p:spPr>
+          <p:style>
+            <a:lnRef idx="2">
+              <a:schemeClr val="accent1"/>
+            </a:lnRef>
+            <a:fillRef idx="0">
+              <a:schemeClr val="accent1"/>
+            </a:fillRef>
+            <a:effectRef idx="1">
+              <a:schemeClr val="accent1"/>
+            </a:effectRef>
+            <a:fontRef idx="minor">
+              <a:schemeClr val="tx1"/>
+            </a:fontRef>
+          </p:style>
+        </p:cxnSp>
+      </p:grpSp>
+    </p:spTree>
+    <p:extLst>
+      <p:ext uri="{BB962C8B-B14F-4D97-AF65-F5344CB8AC3E}">
+        <p14:creationId xmlns:p14="http://schemas.microsoft.com/office/powerpoint/2010/main" val="1582267641"/>
+      </p:ext>
+    </p:extLst>
+  </p:cSld>
+  <p:clrMapOvr>
+    <a:masterClrMapping/>
+  </p:clrMapOvr>
+</p:sld>
+</file>
+
+<file path=ppt/slides/slide5.xml><?xml version="1.0" encoding="utf-8"?>
+<p:sld xmlns:a="http://schemas.openxmlformats.org/drawingml/2006/main" xmlns:r="http://schemas.openxmlformats.org/officeDocument/2006/relationships" xmlns:p="http://schemas.openxmlformats.org/presentationml/2006/main">
+  <p:cSld>
+    <p:spTree>
+      <p:nvGrpSpPr>
+        <p:cNvPr id="1" name=""/>
+        <p:cNvGrpSpPr/>
+        <p:nvPr/>
+      </p:nvGrpSpPr>
+      <p:grpSpPr>
+        <a:xfrm>
+          <a:off x="0" y="0"/>
+          <a:ext cx="0" cy="0"/>
+          <a:chOff x="0" y="0"/>
+          <a:chExt cx="0" cy="0"/>
+        </a:xfrm>
+      </p:grpSpPr>
+      <p:sp>
+        <p:nvSpPr>
+          <p:cNvPr id="5" name="Round Same Side Corner Rectangle 4"/>
+          <p:cNvSpPr/>
+          <p:nvPr/>
+        </p:nvSpPr>
+        <p:spPr>
+          <a:xfrm>
+            <a:off x="4549800" y="2704755"/>
+            <a:ext cx="2501398" cy="2501398"/>
+          </a:xfrm>
+          <a:prstGeom prst="round2SameRect">
+            <a:avLst>
+              <a:gd name="adj1" fmla="val 24105"/>
+              <a:gd name="adj2" fmla="val 0"/>
+            </a:avLst>
+          </a:prstGeom>
+          <a:pattFill prst="ltDnDiag">
+            <a:fgClr>
+              <a:schemeClr val="tx1">
+                <a:lumMod val="75000"/>
+                <a:lumOff val="25000"/>
+              </a:schemeClr>
+            </a:fgClr>
+            <a:bgClr>
+              <a:schemeClr val="bg1">
+                <a:lumMod val="85000"/>
+              </a:schemeClr>
+            </a:bgClr>
+          </a:pattFill>
+          <a:ln>
+            <a:noFill/>
+          </a:ln>
+          <a:effectLst/>
+        </p:spPr>
+        <p:style>
+          <a:lnRef idx="1">
+            <a:schemeClr val="accent1"/>
+          </a:lnRef>
+          <a:fillRef idx="3">
+            <a:schemeClr val="accent1"/>
+          </a:fillRef>
+          <a:effectRef idx="2">
+            <a:schemeClr val="accent1"/>
+          </a:effectRef>
+          <a:fontRef idx="minor">
+            <a:schemeClr val="lt1"/>
+          </a:fontRef>
+        </p:style>
+        <p:txBody>
+          <a:bodyPr rtlCol="0" anchor="ctr"/>
+          <a:lstStyle/>
+          <a:p>
+            <a:pPr algn="ctr"/>
+            <a:endParaRPr lang="en-US"/>
+          </a:p>
+        </p:txBody>
+      </p:sp>
+      <p:sp>
+        <p:nvSpPr>
+          <p:cNvPr id="6" name="Rectangle 5"/>
+          <p:cNvSpPr/>
+          <p:nvPr/>
+        </p:nvSpPr>
+        <p:spPr>
+          <a:xfrm>
+            <a:off x="5845546" y="2693807"/>
+            <a:ext cx="1205651" cy="2507812"/>
+          </a:xfrm>
+          <a:prstGeom prst="rect">
+            <a:avLst/>
+          </a:prstGeom>
+          <a:pattFill prst="ltDnDiag">
+            <a:fgClr>
+              <a:schemeClr val="tx1">
+                <a:lumMod val="75000"/>
+                <a:lumOff val="25000"/>
+              </a:schemeClr>
+            </a:fgClr>
+            <a:bgClr>
+              <a:schemeClr val="bg1">
+                <a:lumMod val="85000"/>
+              </a:schemeClr>
+            </a:bgClr>
+          </a:pattFill>
+          <a:ln>
+            <a:noFill/>
+          </a:ln>
+          <a:effectLst/>
+        </p:spPr>
+        <p:style>
+          <a:lnRef idx="1">
+            <a:schemeClr val="accent1"/>
+          </a:lnRef>
+          <a:fillRef idx="3">
+            <a:schemeClr val="accent1"/>
+          </a:fillRef>
+          <a:effectRef idx="2">
+            <a:schemeClr val="accent1"/>
+          </a:effectRef>
+          <a:fontRef idx="minor">
+            <a:schemeClr val="lt1"/>
+          </a:fontRef>
+        </p:style>
+        <p:txBody>
+          <a:bodyPr rtlCol="0" anchor="ctr"/>
+          <a:lstStyle/>
+          <a:p>
+            <a:pPr algn="ctr"/>
+            <a:endParaRPr lang="en-US"/>
+          </a:p>
+        </p:txBody>
+      </p:sp>
+      <p:sp>
+        <p:nvSpPr>
+          <p:cNvPr id="34" name="Rectangle 33"/>
+          <p:cNvSpPr/>
+          <p:nvPr/>
+        </p:nvSpPr>
+        <p:spPr>
+          <a:xfrm>
+            <a:off x="1821281" y="1086250"/>
+            <a:ext cx="5229917" cy="4111040"/>
+          </a:xfrm>
+          <a:prstGeom prst="rect">
+            <a:avLst/>
+          </a:prstGeom>
+          <a:noFill/>
+          <a:ln>
+            <a:solidFill>
+              <a:srgbClr val="0D0D0D"/>
+            </a:solidFill>
+          </a:ln>
+        </p:spPr>
+        <p:style>
+          <a:lnRef idx="1">
+            <a:schemeClr val="accent1"/>
+          </a:lnRef>
+          <a:fillRef idx="3">
+            <a:schemeClr val="accent1"/>
+          </a:fillRef>
+          <a:effectRef idx="2">
+            <a:schemeClr val="accent1"/>
+          </a:effectRef>
+          <a:fontRef idx="minor">
+            <a:schemeClr val="lt1"/>
+          </a:fontRef>
+        </p:style>
+        <p:txBody>
+          <a:bodyPr rtlCol="0" anchor="ctr"/>
+          <a:lstStyle/>
+          <a:p>
+            <a:pPr algn="ctr"/>
+            <a:endParaRPr lang="en-US"/>
+          </a:p>
+        </p:txBody>
+      </p:sp>
+      <p:sp>
+        <p:nvSpPr>
+          <p:cNvPr id="4" name="Oval 3"/>
+          <p:cNvSpPr/>
+          <p:nvPr/>
+        </p:nvSpPr>
+        <p:spPr>
+          <a:xfrm>
+            <a:off x="2636882" y="3748656"/>
+            <a:ext cx="1049104" cy="1049104"/>
+          </a:xfrm>
+          <a:prstGeom prst="ellipse">
+            <a:avLst/>
+          </a:prstGeom>
+          <a:solidFill>
+            <a:schemeClr val="tx1">
+              <a:lumMod val="65000"/>
+              <a:lumOff val="35000"/>
+            </a:schemeClr>
+          </a:solidFill>
+          <a:ln>
+            <a:solidFill>
+              <a:srgbClr val="0D0D0D"/>
+            </a:solidFill>
+          </a:ln>
+        </p:spPr>
+        <p:style>
+          <a:lnRef idx="1">
+            <a:schemeClr val="accent1"/>
+          </a:lnRef>
+          <a:fillRef idx="3">
+            <a:schemeClr val="accent1"/>
+          </a:fillRef>
+          <a:effectRef idx="2">
+            <a:schemeClr val="accent1"/>
+          </a:effectRef>
+          <a:fontRef idx="minor">
+            <a:schemeClr val="lt1"/>
+          </a:fontRef>
+        </p:style>
+        <p:txBody>
+          <a:bodyPr rtlCol="0" anchor="ctr"/>
+          <a:lstStyle/>
+          <a:p>
+            <a:pPr algn="ctr"/>
+            <a:endParaRPr lang="en-US"/>
+          </a:p>
+        </p:txBody>
+      </p:sp>
+      <p:cxnSp>
+        <p:nvCxnSpPr>
+          <p:cNvPr id="8" name="Straight Connector 7"/>
+          <p:cNvCxnSpPr/>
+          <p:nvPr/>
+        </p:nvCxnSpPr>
+        <p:spPr>
+          <a:xfrm flipV="1">
+            <a:off x="3578549" y="3557798"/>
+            <a:ext cx="748051" cy="406572"/>
+          </a:xfrm>
+          <a:prstGeom prst="line">
+            <a:avLst/>
+          </a:prstGeom>
+          <a:ln>
+            <a:solidFill>
+              <a:schemeClr val="tx1">
+                <a:lumMod val="95000"/>
+                <a:lumOff val="5000"/>
+              </a:schemeClr>
+            </a:solidFill>
+          </a:ln>
+          <a:effectLst/>
+        </p:spPr>
+        <p:style>
+          <a:lnRef idx="2">
+            <a:schemeClr val="accent1"/>
+          </a:lnRef>
+          <a:fillRef idx="0">
+            <a:schemeClr val="accent1"/>
+          </a:fillRef>
+          <a:effectRef idx="1">
+            <a:schemeClr val="accent1"/>
+          </a:effectRef>
+          <a:fontRef idx="minor">
+            <a:schemeClr val="tx1"/>
+          </a:fontRef>
+        </p:style>
+      </p:cxnSp>
+      <p:cxnSp>
+        <p:nvCxnSpPr>
+          <p:cNvPr id="9" name="Straight Connector 8"/>
+          <p:cNvCxnSpPr/>
+          <p:nvPr/>
+        </p:nvCxnSpPr>
+        <p:spPr>
+          <a:xfrm flipV="1">
+            <a:off x="4549800" y="2339167"/>
+            <a:ext cx="1911548" cy="1103182"/>
+          </a:xfrm>
+          <a:prstGeom prst="line">
+            <a:avLst/>
+          </a:prstGeom>
+          <a:ln>
+            <a:solidFill>
+              <a:schemeClr val="tx1">
+                <a:lumMod val="95000"/>
+                <a:lumOff val="5000"/>
+              </a:schemeClr>
+            </a:solidFill>
+            <a:prstDash val="dash"/>
+          </a:ln>
+          <a:effectLst/>
+        </p:spPr>
+        <p:style>
+          <a:lnRef idx="2">
+            <a:schemeClr val="accent1"/>
+          </a:lnRef>
+          <a:fillRef idx="0">
+            <a:schemeClr val="accent1"/>
+          </a:fillRef>
+          <a:effectRef idx="1">
+            <a:schemeClr val="accent1"/>
+          </a:effectRef>
+          <a:fontRef idx="minor">
+            <a:schemeClr val="tx1"/>
+          </a:fontRef>
+        </p:style>
+      </p:cxnSp>
+      <p:sp>
+        <p:nvSpPr>
+          <p:cNvPr id="17" name="Multiply 16"/>
+          <p:cNvSpPr/>
+          <p:nvPr/>
+        </p:nvSpPr>
+        <p:spPr>
+          <a:xfrm>
+            <a:off x="4053291" y="3275587"/>
+            <a:ext cx="538763" cy="538763"/>
+          </a:xfrm>
+          <a:prstGeom prst="mathMultiply">
+            <a:avLst>
+              <a:gd name="adj1" fmla="val 9481"/>
+            </a:avLst>
+          </a:prstGeom>
+          <a:solidFill>
+            <a:schemeClr val="tx1">
+              <a:lumMod val="85000"/>
+              <a:lumOff val="15000"/>
+            </a:schemeClr>
+          </a:solidFill>
+          <a:ln>
+            <a:solidFill>
+              <a:schemeClr val="tx1">
+                <a:lumMod val="95000"/>
+                <a:lumOff val="5000"/>
+              </a:schemeClr>
+            </a:solidFill>
+          </a:ln>
+          <a:effectLst/>
+        </p:spPr>
+        <p:style>
+          <a:lnRef idx="1">
+            <a:schemeClr val="accent1"/>
+          </a:lnRef>
+          <a:fillRef idx="3">
+            <a:schemeClr val="accent1"/>
+          </a:fillRef>
+          <a:effectRef idx="2">
+            <a:schemeClr val="accent1"/>
+          </a:effectRef>
+          <a:fontRef idx="minor">
+            <a:schemeClr val="lt1"/>
+          </a:fontRef>
+        </p:style>
+        <p:txBody>
+          <a:bodyPr rtlCol="0" anchor="ctr"/>
+          <a:lstStyle/>
+          <a:p>
+            <a:pPr algn="ctr"/>
+            <a:endParaRPr lang="en-US"/>
+          </a:p>
+        </p:txBody>
+      </p:sp>
+      <p:sp>
+        <p:nvSpPr>
+          <p:cNvPr id="22" name="Multiply 21"/>
+          <p:cNvSpPr/>
+          <p:nvPr/>
+        </p:nvSpPr>
+        <p:spPr>
+          <a:xfrm>
+            <a:off x="6191966" y="2069785"/>
+            <a:ext cx="538763" cy="538763"/>
+          </a:xfrm>
+          <a:prstGeom prst="mathMultiply">
+            <a:avLst>
+              <a:gd name="adj1" fmla="val 9481"/>
+            </a:avLst>
+          </a:prstGeom>
+          <a:solidFill>
+            <a:schemeClr val="tx1">
+              <a:lumMod val="85000"/>
+              <a:lumOff val="15000"/>
+            </a:schemeClr>
+          </a:solidFill>
+          <a:ln>
+            <a:solidFill>
+              <a:schemeClr val="tx1">
+                <a:lumMod val="95000"/>
+                <a:lumOff val="5000"/>
+              </a:schemeClr>
+            </a:solidFill>
+          </a:ln>
+          <a:effectLst/>
+        </p:spPr>
+        <p:style>
+          <a:lnRef idx="1">
+            <a:schemeClr val="accent1"/>
+          </a:lnRef>
+          <a:fillRef idx="3">
+            <a:schemeClr val="accent1"/>
+          </a:fillRef>
+          <a:effectRef idx="2">
+            <a:schemeClr val="accent1"/>
+          </a:effectRef>
+          <a:fontRef idx="minor">
+            <a:schemeClr val="lt1"/>
+          </a:fontRef>
+        </p:style>
+        <p:txBody>
+          <a:bodyPr rtlCol="0" anchor="ctr"/>
+          <a:lstStyle/>
+          <a:p>
+            <a:pPr algn="ctr"/>
+            <a:endParaRPr lang="en-US"/>
+          </a:p>
+        </p:txBody>
+      </p:sp>
+      <p:sp>
+        <p:nvSpPr>
+          <p:cNvPr id="25" name="Rectangle 24"/>
+          <p:cNvSpPr/>
+          <p:nvPr/>
+        </p:nvSpPr>
+        <p:spPr>
+          <a:xfrm>
+            <a:off x="3209845" y="2957456"/>
+            <a:ext cx="1339955" cy="400110"/>
+          </a:xfrm>
+          <a:prstGeom prst="rect">
+            <a:avLst/>
+          </a:prstGeom>
+        </p:spPr>
+        <p:txBody>
+          <a:bodyPr wrap="none">
+            <a:spAutoFit/>
+          </a:bodyPr>
+          <a:lstStyle/>
+          <a:p>
+            <a:r>
+              <a:rPr lang="en-US" sz="2000" dirty="0" smtClean="0"/>
+              <a:t>Carrot goal</a:t>
+            </a:r>
+            <a:endParaRPr lang="en-US" sz="2000" dirty="0"/>
+          </a:p>
+        </p:txBody>
+      </p:sp>
+      <p:sp>
+        <p:nvSpPr>
+          <p:cNvPr id="26" name="Rectangle 25"/>
+          <p:cNvSpPr/>
+          <p:nvPr/>
+        </p:nvSpPr>
+        <p:spPr>
+          <a:xfrm>
+            <a:off x="6224301" y="1699292"/>
+            <a:ext cx="663438" cy="400110"/>
+          </a:xfrm>
+          <a:prstGeom prst="rect">
+            <a:avLst/>
+          </a:prstGeom>
+        </p:spPr>
+        <p:txBody>
+          <a:bodyPr wrap="none">
+            <a:spAutoFit/>
+          </a:bodyPr>
+          <a:lstStyle/>
+          <a:p>
+            <a:r>
+              <a:rPr lang="en-US" sz="2000" dirty="0" smtClean="0"/>
+              <a:t>Goal</a:t>
+            </a:r>
+            <a:endParaRPr lang="en-US" sz="2000" dirty="0"/>
+          </a:p>
+        </p:txBody>
+      </p:sp>
+      <p:sp>
+        <p:nvSpPr>
+          <p:cNvPr id="32" name="Rectangle 31"/>
+          <p:cNvSpPr/>
+          <p:nvPr/>
+        </p:nvSpPr>
+        <p:spPr>
+          <a:xfrm>
+            <a:off x="6376701" y="4797760"/>
+            <a:ext cx="669700" cy="400110"/>
+          </a:xfrm>
+          <a:prstGeom prst="rect">
+            <a:avLst/>
+          </a:prstGeom>
+        </p:spPr>
+        <p:txBody>
+          <a:bodyPr wrap="none">
+            <a:spAutoFit/>
+          </a:bodyPr>
+          <a:lstStyle/>
+          <a:p>
+            <a:r>
+              <a:rPr lang="en-US" sz="2000" b="1" dirty="0" smtClean="0"/>
+              <a:t>Wall</a:t>
+            </a:r>
+            <a:endParaRPr lang="en-US" sz="2000" b="1" dirty="0"/>
+          </a:p>
+        </p:txBody>
+      </p:sp>
+      <p:sp>
+        <p:nvSpPr>
+          <p:cNvPr id="33" name="Rectangle 32"/>
+          <p:cNvSpPr/>
+          <p:nvPr/>
+        </p:nvSpPr>
+        <p:spPr>
+          <a:xfrm>
+            <a:off x="2749050" y="4797180"/>
+            <a:ext cx="829499" cy="400110"/>
+          </a:xfrm>
+          <a:prstGeom prst="rect">
+            <a:avLst/>
+          </a:prstGeom>
+        </p:spPr>
+        <p:txBody>
+          <a:bodyPr wrap="none">
+            <a:spAutoFit/>
+          </a:bodyPr>
+          <a:lstStyle/>
+          <a:p>
+            <a:r>
+              <a:rPr lang="en-US" sz="2000" dirty="0" smtClean="0"/>
+              <a:t>Drone</a:t>
+            </a:r>
+            <a:endParaRPr lang="en-US" sz="2000" dirty="0"/>
+          </a:p>
+        </p:txBody>
+      </p:sp>
+    </p:spTree>
+    <p:extLst>
+      <p:ext uri="{BB962C8B-B14F-4D97-AF65-F5344CB8AC3E}">
+        <p14:creationId xmlns:p14="http://schemas.microsoft.com/office/powerpoint/2010/main" val="803025428"/>
+      </p:ext>
+    </p:extLst>
+  </p:cSld>
+  <p:clrMapOvr>
+    <a:masterClrMapping/>
+  </p:clrMapOvr>
+</p:sld>
+</file>
+
+<file path=ppt/slides/slide6.xml><?xml version="1.0" encoding="utf-8"?>
+<p:sld xmlns:a="http://schemas.openxmlformats.org/drawingml/2006/main" xmlns:r="http://schemas.openxmlformats.org/officeDocument/2006/relationships" xmlns:p="http://schemas.openxmlformats.org/presentationml/2006/main">
+  <p:cSld>
+    <p:spTree>
+      <p:nvGrpSpPr>
+        <p:cNvPr id="1" name=""/>
+        <p:cNvGrpSpPr/>
+        <p:nvPr/>
+      </p:nvGrpSpPr>
+      <p:grpSpPr>
+        <a:xfrm>
+          <a:off x="0" y="0"/>
+          <a:ext cx="0" cy="0"/>
+          <a:chOff x="0" y="0"/>
+          <a:chExt cx="0" cy="0"/>
+        </a:xfrm>
+      </p:grpSpPr>
+      <p:grpSp>
+        <p:nvGrpSpPr>
+          <p:cNvPr id="29" name="Group 28"/>
+          <p:cNvGrpSpPr/>
+          <p:nvPr/>
+        </p:nvGrpSpPr>
+        <p:grpSpPr>
+          <a:xfrm>
+            <a:off x="1821281" y="1086250"/>
+            <a:ext cx="5229917" cy="4115368"/>
+            <a:chOff x="1821281" y="1086250"/>
+            <a:chExt cx="5229917" cy="4115368"/>
+          </a:xfrm>
+        </p:grpSpPr>
+        <p:sp>
+          <p:nvSpPr>
+            <p:cNvPr id="6" name="Rectangle 5"/>
+            <p:cNvSpPr/>
+            <p:nvPr/>
+          </p:nvSpPr>
+          <p:spPr>
+            <a:xfrm>
+              <a:off x="4007146" y="3513761"/>
+              <a:ext cx="3044052" cy="1687857"/>
+            </a:xfrm>
+            <a:prstGeom prst="rect">
+              <a:avLst/>
+            </a:prstGeom>
+            <a:pattFill prst="ltDnDiag">
+              <a:fgClr>
+                <a:schemeClr val="tx1">
+                  <a:lumMod val="75000"/>
+                  <a:lumOff val="25000"/>
+                </a:schemeClr>
+              </a:fgClr>
+              <a:bgClr>
+                <a:schemeClr val="bg1">
+                  <a:lumMod val="85000"/>
+                </a:schemeClr>
+              </a:bgClr>
+            </a:pattFill>
+            <a:ln>
+              <a:noFill/>
+            </a:ln>
+            <a:effectLst/>
+          </p:spPr>
+          <p:style>
+            <a:lnRef idx="1">
+              <a:schemeClr val="accent1"/>
+            </a:lnRef>
+            <a:fillRef idx="3">
+              <a:schemeClr val="accent1"/>
+            </a:fillRef>
+            <a:effectRef idx="2">
+              <a:schemeClr val="accent1"/>
+            </a:effectRef>
+            <a:fontRef idx="minor">
+              <a:schemeClr val="lt1"/>
+            </a:fontRef>
+          </p:style>
+          <p:txBody>
+            <a:bodyPr rtlCol="0" anchor="ctr"/>
+            <a:lstStyle/>
+            <a:p>
+              <a:pPr algn="ctr"/>
+              <a:endParaRPr lang="en-US"/>
+            </a:p>
+          </p:txBody>
+        </p:sp>
+        <p:sp>
+          <p:nvSpPr>
+            <p:cNvPr id="15" name="Rectangle 14"/>
+            <p:cNvSpPr/>
+            <p:nvPr/>
+          </p:nvSpPr>
+          <p:spPr>
+            <a:xfrm>
+              <a:off x="1821281" y="1086250"/>
+              <a:ext cx="1113081" cy="2008326"/>
+            </a:xfrm>
+            <a:prstGeom prst="rect">
+              <a:avLst/>
+            </a:prstGeom>
+            <a:pattFill prst="ltDnDiag">
+              <a:fgClr>
+                <a:schemeClr val="tx1">
+                  <a:lumMod val="75000"/>
+                  <a:lumOff val="25000"/>
+                </a:schemeClr>
+              </a:fgClr>
+              <a:bgClr>
+                <a:schemeClr val="bg1">
+                  <a:lumMod val="85000"/>
+                </a:schemeClr>
+              </a:bgClr>
+            </a:pattFill>
+            <a:ln>
+              <a:noFill/>
+            </a:ln>
+            <a:effectLst/>
+          </p:spPr>
+          <p:style>
+            <a:lnRef idx="1">
+              <a:schemeClr val="accent1"/>
+            </a:lnRef>
+            <a:fillRef idx="3">
+              <a:schemeClr val="accent1"/>
+            </a:fillRef>
+            <a:effectRef idx="2">
+              <a:schemeClr val="accent1"/>
+            </a:effectRef>
+            <a:fontRef idx="minor">
+              <a:schemeClr val="lt1"/>
+            </a:fontRef>
+          </p:style>
+          <p:txBody>
+            <a:bodyPr rtlCol="0" anchor="ctr"/>
+            <a:lstStyle/>
+            <a:p>
+              <a:pPr algn="ctr"/>
+              <a:endParaRPr lang="en-US"/>
+            </a:p>
+          </p:txBody>
+        </p:sp>
+        <p:sp>
+          <p:nvSpPr>
+            <p:cNvPr id="16" name="Rectangle 15"/>
+            <p:cNvSpPr/>
+            <p:nvPr/>
+          </p:nvSpPr>
+          <p:spPr>
+            <a:xfrm>
+              <a:off x="2934362" y="1086250"/>
+              <a:ext cx="2552346" cy="1194613"/>
+            </a:xfrm>
+            <a:prstGeom prst="rect">
+              <a:avLst/>
+            </a:prstGeom>
+            <a:pattFill prst="ltDnDiag">
+              <a:fgClr>
+                <a:schemeClr val="tx1">
+                  <a:lumMod val="75000"/>
+                  <a:lumOff val="25000"/>
+                </a:schemeClr>
+              </a:fgClr>
+              <a:bgClr>
+                <a:schemeClr val="bg1">
+                  <a:lumMod val="85000"/>
+                </a:schemeClr>
+              </a:bgClr>
+            </a:pattFill>
+            <a:ln>
+              <a:noFill/>
+            </a:ln>
+            <a:effectLst/>
+          </p:spPr>
+          <p:style>
+            <a:lnRef idx="1">
+              <a:schemeClr val="accent1"/>
+            </a:lnRef>
+            <a:fillRef idx="3">
+              <a:schemeClr val="accent1"/>
+            </a:fillRef>
+            <a:effectRef idx="2">
+              <a:schemeClr val="accent1"/>
+            </a:effectRef>
+            <a:fontRef idx="minor">
+              <a:schemeClr val="lt1"/>
+            </a:fontRef>
+          </p:style>
+          <p:txBody>
+            <a:bodyPr rtlCol="0" anchor="ctr"/>
+            <a:lstStyle/>
+            <a:p>
+              <a:pPr algn="ctr"/>
+              <a:endParaRPr lang="en-US"/>
+            </a:p>
+          </p:txBody>
+        </p:sp>
+        <p:sp>
+          <p:nvSpPr>
+            <p:cNvPr id="18" name="Rectangle 17"/>
+            <p:cNvSpPr/>
+            <p:nvPr/>
+          </p:nvSpPr>
+          <p:spPr>
+            <a:xfrm>
+              <a:off x="6543601" y="1089425"/>
+              <a:ext cx="494897" cy="2427511"/>
+            </a:xfrm>
+            <a:prstGeom prst="rect">
+              <a:avLst/>
+            </a:prstGeom>
+            <a:pattFill prst="ltDnDiag">
+              <a:fgClr>
+                <a:schemeClr val="tx1">
+                  <a:lumMod val="75000"/>
+                  <a:lumOff val="25000"/>
+                </a:schemeClr>
+              </a:fgClr>
+              <a:bgClr>
+                <a:schemeClr val="bg1">
+                  <a:lumMod val="85000"/>
+                </a:schemeClr>
+              </a:bgClr>
+            </a:pattFill>
+            <a:ln>
+              <a:noFill/>
+            </a:ln>
+            <a:effectLst/>
+          </p:spPr>
+          <p:style>
+            <a:lnRef idx="1">
+              <a:schemeClr val="accent1"/>
+            </a:lnRef>
+            <a:fillRef idx="3">
+              <a:schemeClr val="accent1"/>
+            </a:fillRef>
+            <a:effectRef idx="2">
+              <a:schemeClr val="accent1"/>
+            </a:effectRef>
+            <a:fontRef idx="minor">
+              <a:schemeClr val="lt1"/>
+            </a:fontRef>
+          </p:style>
+          <p:txBody>
+            <a:bodyPr rtlCol="0" anchor="ctr"/>
+            <a:lstStyle/>
+            <a:p>
+              <a:pPr algn="ctr"/>
+              <a:endParaRPr lang="en-US"/>
+            </a:p>
+          </p:txBody>
+        </p:sp>
+        <p:sp>
+          <p:nvSpPr>
+            <p:cNvPr id="34" name="Rectangle 33"/>
+            <p:cNvSpPr/>
+            <p:nvPr/>
+          </p:nvSpPr>
+          <p:spPr>
+            <a:xfrm>
+              <a:off x="1821281" y="1086250"/>
+              <a:ext cx="5229917" cy="4111040"/>
+            </a:xfrm>
+            <a:prstGeom prst="rect">
+              <a:avLst/>
+            </a:prstGeom>
+            <a:noFill/>
+            <a:ln>
+              <a:solidFill>
+                <a:srgbClr val="0D0D0D"/>
+              </a:solidFill>
+            </a:ln>
+          </p:spPr>
+          <p:style>
+            <a:lnRef idx="1">
+              <a:schemeClr val="accent1"/>
+            </a:lnRef>
+            <a:fillRef idx="3">
+              <a:schemeClr val="accent1"/>
+            </a:fillRef>
+            <a:effectRef idx="2">
+              <a:schemeClr val="accent1"/>
+            </a:effectRef>
+            <a:fontRef idx="minor">
+              <a:schemeClr val="lt1"/>
+            </a:fontRef>
+          </p:style>
+          <p:txBody>
+            <a:bodyPr rtlCol="0" anchor="ctr"/>
+            <a:lstStyle/>
+            <a:p>
+              <a:pPr algn="ctr"/>
+              <a:endParaRPr lang="en-US"/>
+            </a:p>
+          </p:txBody>
+        </p:sp>
+        <p:sp>
+          <p:nvSpPr>
+            <p:cNvPr id="4" name="Oval 3"/>
+            <p:cNvSpPr/>
+            <p:nvPr/>
+          </p:nvSpPr>
+          <p:spPr>
+            <a:xfrm>
+              <a:off x="1995739" y="3748656"/>
+              <a:ext cx="1049104" cy="1049104"/>
+            </a:xfrm>
+            <a:prstGeom prst="ellipse">
+              <a:avLst/>
+            </a:prstGeom>
+            <a:solidFill>
+              <a:schemeClr val="tx1">
+                <a:lumMod val="65000"/>
+                <a:lumOff val="35000"/>
+              </a:schemeClr>
+            </a:solidFill>
+            <a:ln>
+              <a:solidFill>
+                <a:srgbClr val="0D0D0D"/>
+              </a:solidFill>
+            </a:ln>
+          </p:spPr>
+          <p:style>
+            <a:lnRef idx="1">
+              <a:schemeClr val="accent1"/>
+            </a:lnRef>
+            <a:fillRef idx="3">
+              <a:schemeClr val="accent1"/>
+            </a:fillRef>
+            <a:effectRef idx="2">
+              <a:schemeClr val="accent1"/>
+            </a:effectRef>
+            <a:fontRef idx="minor">
+              <a:schemeClr val="lt1"/>
+            </a:fontRef>
+          </p:style>
+          <p:txBody>
+            <a:bodyPr rtlCol="0" anchor="ctr"/>
+            <a:lstStyle/>
+            <a:p>
+              <a:pPr algn="ctr"/>
+              <a:endParaRPr lang="en-US"/>
+            </a:p>
+          </p:txBody>
+        </p:sp>
+        <p:sp>
+          <p:nvSpPr>
+            <p:cNvPr id="32" name="Rectangle 31"/>
+            <p:cNvSpPr/>
+            <p:nvPr/>
+          </p:nvSpPr>
+          <p:spPr>
+            <a:xfrm>
+              <a:off x="6376701" y="4797760"/>
+              <a:ext cx="669700" cy="400110"/>
+            </a:xfrm>
+            <a:prstGeom prst="rect">
+              <a:avLst/>
+            </a:prstGeom>
+          </p:spPr>
+          <p:txBody>
+            <a:bodyPr wrap="none">
+              <a:spAutoFit/>
+            </a:bodyPr>
+            <a:lstStyle/>
+            <a:p>
+              <a:r>
+                <a:rPr lang="en-US" sz="2000" b="1" dirty="0" smtClean="0"/>
+                <a:t>Wall</a:t>
+              </a:r>
+              <a:endParaRPr lang="en-US" sz="2000" b="1" dirty="0"/>
+            </a:p>
+          </p:txBody>
+        </p:sp>
+        <p:sp>
+          <p:nvSpPr>
+            <p:cNvPr id="33" name="Rectangle 32"/>
+            <p:cNvSpPr/>
+            <p:nvPr/>
+          </p:nvSpPr>
+          <p:spPr>
+            <a:xfrm>
+              <a:off x="2104863" y="4786634"/>
+              <a:ext cx="829499" cy="400110"/>
+            </a:xfrm>
+            <a:prstGeom prst="rect">
+              <a:avLst/>
+            </a:prstGeom>
+          </p:spPr>
+          <p:txBody>
+            <a:bodyPr wrap="none">
+              <a:spAutoFit/>
+            </a:bodyPr>
+            <a:lstStyle/>
+            <a:p>
+              <a:r>
+                <a:rPr lang="en-US" sz="2000" dirty="0" smtClean="0"/>
+                <a:t>Drone</a:t>
+              </a:r>
+              <a:endParaRPr lang="en-US" sz="2000" dirty="0"/>
+            </a:p>
+          </p:txBody>
+        </p:sp>
+        <p:cxnSp>
+          <p:nvCxnSpPr>
+            <p:cNvPr id="19" name="Straight Connector 18"/>
+            <p:cNvCxnSpPr>
+              <a:stCxn id="4" idx="7"/>
+            </p:cNvCxnSpPr>
+            <p:nvPr/>
+          </p:nvCxnSpPr>
+          <p:spPr>
+            <a:xfrm flipV="1">
+              <a:off x="2891205" y="2984383"/>
+              <a:ext cx="794650" cy="917911"/>
+            </a:xfrm>
+            <a:prstGeom prst="line">
+              <a:avLst/>
+            </a:prstGeom>
+            <a:ln>
+              <a:solidFill>
+                <a:schemeClr val="tx1">
+                  <a:lumMod val="95000"/>
+                  <a:lumOff val="5000"/>
+                </a:schemeClr>
+              </a:solidFill>
+            </a:ln>
+            <a:effectLst/>
+          </p:spPr>
+          <p:style>
+            <a:lnRef idx="2">
+              <a:schemeClr val="accent1"/>
+            </a:lnRef>
+            <a:fillRef idx="0">
+              <a:schemeClr val="accent1"/>
+            </a:fillRef>
+            <a:effectRef idx="1">
+              <a:schemeClr val="accent1"/>
+            </a:effectRef>
+            <a:fontRef idx="minor">
+              <a:schemeClr val="tx1"/>
+            </a:fontRef>
+          </p:style>
+        </p:cxnSp>
+        <p:sp>
+          <p:nvSpPr>
+            <p:cNvPr id="20" name="Multiply 19"/>
+            <p:cNvSpPr/>
+            <p:nvPr/>
+          </p:nvSpPr>
+          <p:spPr>
+            <a:xfrm>
+              <a:off x="5707567" y="1450360"/>
+              <a:ext cx="538763" cy="538763"/>
+            </a:xfrm>
+            <a:prstGeom prst="mathMultiply">
+              <a:avLst>
+                <a:gd name="adj1" fmla="val 9481"/>
+              </a:avLst>
+            </a:prstGeom>
+            <a:solidFill>
+              <a:schemeClr val="tx1">
+                <a:lumMod val="85000"/>
+                <a:lumOff val="15000"/>
+              </a:schemeClr>
+            </a:solidFill>
+            <a:ln>
+              <a:solidFill>
+                <a:schemeClr val="tx1">
+                  <a:lumMod val="95000"/>
+                  <a:lumOff val="5000"/>
+                </a:schemeClr>
+              </a:solidFill>
+            </a:ln>
+            <a:effectLst/>
+          </p:spPr>
+          <p:style>
+            <a:lnRef idx="1">
+              <a:schemeClr val="accent1"/>
+            </a:lnRef>
+            <a:fillRef idx="3">
+              <a:schemeClr val="accent1"/>
+            </a:fillRef>
+            <a:effectRef idx="2">
+              <a:schemeClr val="accent1"/>
+            </a:effectRef>
+            <a:fontRef idx="minor">
+              <a:schemeClr val="lt1"/>
+            </a:fontRef>
+          </p:style>
+          <p:txBody>
+            <a:bodyPr rtlCol="0" anchor="ctr"/>
+            <a:lstStyle/>
+            <a:p>
+              <a:pPr algn="ctr"/>
+              <a:endParaRPr lang="en-US"/>
+            </a:p>
+          </p:txBody>
+        </p:sp>
+        <p:cxnSp>
+          <p:nvCxnSpPr>
+            <p:cNvPr id="21" name="Straight Connector 20"/>
+            <p:cNvCxnSpPr/>
+            <p:nvPr/>
+          </p:nvCxnSpPr>
+          <p:spPr>
+            <a:xfrm>
+              <a:off x="3682413" y="2993973"/>
+              <a:ext cx="2297728" cy="0"/>
+            </a:xfrm>
+            <a:prstGeom prst="line">
+              <a:avLst/>
+            </a:prstGeom>
+            <a:ln>
+              <a:solidFill>
+                <a:schemeClr val="tx1">
+                  <a:lumMod val="95000"/>
+                  <a:lumOff val="5000"/>
+                </a:schemeClr>
+              </a:solidFill>
+            </a:ln>
+            <a:effectLst/>
+          </p:spPr>
+          <p:style>
+            <a:lnRef idx="2">
+              <a:schemeClr val="accent1"/>
+            </a:lnRef>
+            <a:fillRef idx="0">
+              <a:schemeClr val="accent1"/>
+            </a:fillRef>
+            <a:effectRef idx="1">
+              <a:schemeClr val="accent1"/>
+            </a:effectRef>
+            <a:fontRef idx="minor">
+              <a:schemeClr val="tx1"/>
+            </a:fontRef>
+          </p:style>
+        </p:cxnSp>
+        <p:cxnSp>
+          <p:nvCxnSpPr>
+            <p:cNvPr id="23" name="Straight Connector 22"/>
+            <p:cNvCxnSpPr/>
+            <p:nvPr/>
+          </p:nvCxnSpPr>
+          <p:spPr>
+            <a:xfrm>
+              <a:off x="5973257" y="1721388"/>
+              <a:ext cx="0" cy="1278057"/>
+            </a:xfrm>
+            <a:prstGeom prst="line">
+              <a:avLst/>
+            </a:prstGeom>
+            <a:ln>
+              <a:solidFill>
+                <a:schemeClr val="tx1">
+                  <a:lumMod val="95000"/>
+                  <a:lumOff val="5000"/>
+                </a:schemeClr>
+              </a:solidFill>
+            </a:ln>
+            <a:effectLst/>
+          </p:spPr>
+          <p:style>
+            <a:lnRef idx="2">
+              <a:schemeClr val="accent1"/>
+            </a:lnRef>
+            <a:fillRef idx="0">
+              <a:schemeClr val="accent1"/>
+            </a:fillRef>
+            <a:effectRef idx="1">
+              <a:schemeClr val="accent1"/>
+            </a:effectRef>
+            <a:fontRef idx="minor">
+              <a:schemeClr val="tx1"/>
+            </a:fontRef>
+          </p:style>
+        </p:cxnSp>
+        <p:sp>
+          <p:nvSpPr>
+            <p:cNvPr id="36" name="Rectangle 35"/>
+            <p:cNvSpPr/>
+            <p:nvPr/>
+          </p:nvSpPr>
+          <p:spPr>
+            <a:xfrm>
+              <a:off x="5648422" y="1164070"/>
+              <a:ext cx="663438" cy="400110"/>
+            </a:xfrm>
+            <a:prstGeom prst="rect">
+              <a:avLst/>
+            </a:prstGeom>
+          </p:spPr>
+          <p:txBody>
+            <a:bodyPr wrap="none">
+              <a:spAutoFit/>
+            </a:bodyPr>
+            <a:lstStyle/>
+            <a:p>
+              <a:r>
+                <a:rPr lang="en-US" sz="2000" dirty="0" smtClean="0"/>
+                <a:t>Goal</a:t>
+              </a:r>
+              <a:endParaRPr lang="en-US" sz="2000" dirty="0"/>
+            </a:p>
+          </p:txBody>
+        </p:sp>
+      </p:grpSp>
+    </p:spTree>
+    <p:extLst>
+      <p:ext uri="{BB962C8B-B14F-4D97-AF65-F5344CB8AC3E}">
+        <p14:creationId xmlns:p14="http://schemas.microsoft.com/office/powerpoint/2010/main" val="3272980189"/>
       </p:ext>
     </p:extLst>
   </p:cSld>
@@ -5358,4 +9269,324 @@
   </a:objectDefaults>
   <a:extraClrSchemeLst/>
 </a:theme>
+</file>
+
+<file path=ppt/theme/theme2.xml><?xml version="1.0" encoding="utf-8"?>
+<a:theme xmlns:a="http://schemas.openxmlformats.org/drawingml/2006/main" name="Office Theme">
+  <a:themeElements>
+    <a:clrScheme name="Office">
+      <a:dk1>
+        <a:sysClr val="windowText" lastClr="000000"/>
+      </a:dk1>
+      <a:lt1>
+        <a:sysClr val="window" lastClr="FFFFFF"/>
+      </a:lt1>
+      <a:dk2>
+        <a:srgbClr val="1F497D"/>
+      </a:dk2>
+      <a:lt2>
+        <a:srgbClr val="EEECE1"/>
+      </a:lt2>
+      <a:accent1>
+        <a:srgbClr val="4F81BD"/>
+      </a:accent1>
+      <a:accent2>
+        <a:srgbClr val="C0504D"/>
+      </a:accent2>
+      <a:accent3>
+        <a:srgbClr val="9BBB59"/>
+      </a:accent3>
+      <a:accent4>
+        <a:srgbClr val="8064A2"/>
+      </a:accent4>
+      <a:accent5>
+        <a:srgbClr val="4BACC6"/>
+      </a:accent5>
+      <a:accent6>
+        <a:srgbClr val="F79646"/>
+      </a:accent6>
+      <a:hlink>
+        <a:srgbClr val="0000FF"/>
+      </a:hlink>
+      <a:folHlink>
+        <a:srgbClr val="800080"/>
+      </a:folHlink>
+    </a:clrScheme>
+    <a:fontScheme name="Office">
+      <a:majorFont>
+        <a:latin typeface="Calibri"/>
+        <a:ea typeface=""/>
+        <a:cs typeface=""/>
+        <a:font script="Jpan" typeface="ＭＳ Ｐゴシック"/>
+        <a:font script="Hang" typeface="맑은 고딕"/>
+        <a:font script="Hans" typeface="宋体"/>
+        <a:font script="Hant" typeface="新細明體"/>
+        <a:font script="Arab" typeface="Times New Roman"/>
+        <a:font script="Hebr" typeface="Times New Roman"/>
+        <a:font script="Thai" typeface="Angsana New"/>
+        <a:font script="Ethi" typeface="Nyala"/>
+        <a:font script="Beng" typeface="Vrinda"/>
+        <a:font script="Gujr" typeface="Shruti"/>
+        <a:font script="Khmr" typeface="MoolBoran"/>
+        <a:font script="Knda" typeface="Tunga"/>
+        <a:font script="Guru" typeface="Raavi"/>
+        <a:font script="Cans" typeface="Euphemia"/>
+        <a:font script="Cher" typeface="Plantagenet Cherokee"/>
+        <a:font script="Yiii" typeface="Microsoft Yi Baiti"/>
+        <a:font script="Tibt" typeface="Microsoft Himalaya"/>
+        <a:font script="Thaa" typeface="MV Boli"/>
+        <a:font script="Deva" typeface="Mangal"/>
+        <a:font script="Telu" typeface="Gautami"/>
+        <a:font script="Taml" typeface="Latha"/>
+        <a:font script="Syrc" typeface="Estrangelo Edessa"/>
+        <a:font script="Orya" typeface="Kalinga"/>
+        <a:font script="Mlym" typeface="Kartika"/>
+        <a:font script="Laoo" typeface="DokChampa"/>
+        <a:font script="Sinh" typeface="Iskoola Pota"/>
+        <a:font script="Mong" typeface="Mongolian Baiti"/>
+        <a:font script="Viet" typeface="Times New Roman"/>
+        <a:font script="Uigh" typeface="Microsoft Uighur"/>
+        <a:font script="Geor" typeface="Sylfaen"/>
+      </a:majorFont>
+      <a:minorFont>
+        <a:latin typeface="Calibri"/>
+        <a:ea typeface=""/>
+        <a:cs typeface=""/>
+        <a:font script="Jpan" typeface="ＭＳ Ｐゴシック"/>
+        <a:font script="Hang" typeface="맑은 고딕"/>
+        <a:font script="Hans" typeface="宋体"/>
+        <a:font script="Hant" typeface="新細明體"/>
+        <a:font script="Arab" typeface="Arial"/>
+        <a:font script="Hebr" typeface="Arial"/>
+        <a:font script="Thai" typeface="Cordia New"/>
+        <a:font script="Ethi" typeface="Nyala"/>
+        <a:font script="Beng" typeface="Vrinda"/>
+        <a:font script="Gujr" typeface="Shruti"/>
+        <a:font script="Khmr" typeface="DaunPenh"/>
+        <a:font script="Knda" typeface="Tunga"/>
+        <a:font script="Guru" typeface="Raavi"/>
+        <a:font script="Cans" typeface="Euphemia"/>
+        <a:font script="Cher" typeface="Plantagenet Cherokee"/>
+        <a:font script="Yiii" typeface="Microsoft Yi Baiti"/>
+        <a:font script="Tibt" typeface="Microsoft Himalaya"/>
+        <a:font script="Thaa" typeface="MV Boli"/>
+        <a:font script="Deva" typeface="Mangal"/>
+        <a:font script="Telu" typeface="Gautami"/>
+        <a:font script="Taml" typeface="Latha"/>
+        <a:font script="Syrc" typeface="Estrangelo Edessa"/>
+        <a:font script="Orya" typeface="Kalinga"/>
+        <a:font script="Mlym" typeface="Kartika"/>
+        <a:font script="Laoo" typeface="DokChampa"/>
+        <a:font script="Sinh" typeface="Iskoola Pota"/>
+        <a:font script="Mong" typeface="Mongolian Baiti"/>
+        <a:font script="Viet" typeface="Arial"/>
+        <a:font script="Uigh" typeface="Microsoft Uighur"/>
+        <a:font script="Geor" typeface="Sylfaen"/>
+      </a:minorFont>
+    </a:fontScheme>
+    <a:fmtScheme name="Office">
+      <a:fillStyleLst>
+        <a:solidFill>
+          <a:schemeClr val="phClr"/>
+        </a:solidFill>
+        <a:gradFill rotWithShape="1">
+          <a:gsLst>
+            <a:gs pos="0">
+              <a:schemeClr val="phClr">
+                <a:tint val="50000"/>
+                <a:satMod val="300000"/>
+              </a:schemeClr>
+            </a:gs>
+            <a:gs pos="35000">
+              <a:schemeClr val="phClr">
+                <a:tint val="37000"/>
+                <a:satMod val="300000"/>
+              </a:schemeClr>
+            </a:gs>
+            <a:gs pos="100000">
+              <a:schemeClr val="phClr">
+                <a:tint val="15000"/>
+                <a:satMod val="350000"/>
+              </a:schemeClr>
+            </a:gs>
+          </a:gsLst>
+          <a:lin ang="16200000" scaled="1"/>
+        </a:gradFill>
+        <a:gradFill rotWithShape="1">
+          <a:gsLst>
+            <a:gs pos="0">
+              <a:schemeClr val="phClr">
+                <a:tint val="100000"/>
+                <a:shade val="100000"/>
+                <a:satMod val="130000"/>
+              </a:schemeClr>
+            </a:gs>
+            <a:gs pos="100000">
+              <a:schemeClr val="phClr">
+                <a:tint val="50000"/>
+                <a:shade val="100000"/>
+                <a:satMod val="350000"/>
+              </a:schemeClr>
+            </a:gs>
+          </a:gsLst>
+          <a:lin ang="16200000" scaled="0"/>
+        </a:gradFill>
+      </a:fillStyleLst>
+      <a:lnStyleLst>
+        <a:ln w="9525" cap="flat" cmpd="sng" algn="ctr">
+          <a:solidFill>
+            <a:schemeClr val="phClr">
+              <a:shade val="95000"/>
+              <a:satMod val="105000"/>
+            </a:schemeClr>
+          </a:solidFill>
+          <a:prstDash val="solid"/>
+        </a:ln>
+        <a:ln w="25400" cap="flat" cmpd="sng" algn="ctr">
+          <a:solidFill>
+            <a:schemeClr val="phClr"/>
+          </a:solidFill>
+          <a:prstDash val="solid"/>
+        </a:ln>
+        <a:ln w="38100" cap="flat" cmpd="sng" algn="ctr">
+          <a:solidFill>
+            <a:schemeClr val="phClr"/>
+          </a:solidFill>
+          <a:prstDash val="solid"/>
+        </a:ln>
+      </a:lnStyleLst>
+      <a:effectStyleLst>
+        <a:effectStyle>
+          <a:effectLst>
+            <a:outerShdw blurRad="40000" dist="20000" dir="5400000" rotWithShape="0">
+              <a:srgbClr val="000000">
+                <a:alpha val="38000"/>
+              </a:srgbClr>
+            </a:outerShdw>
+          </a:effectLst>
+        </a:effectStyle>
+        <a:effectStyle>
+          <a:effectLst>
+            <a:outerShdw blurRad="40000" dist="23000" dir="5400000" rotWithShape="0">
+              <a:srgbClr val="000000">
+                <a:alpha val="35000"/>
+              </a:srgbClr>
+            </a:outerShdw>
+          </a:effectLst>
+        </a:effectStyle>
+        <a:effectStyle>
+          <a:effectLst>
+            <a:outerShdw blurRad="40000" dist="23000" dir="5400000" rotWithShape="0">
+              <a:srgbClr val="000000">
+                <a:alpha val="35000"/>
+              </a:srgbClr>
+            </a:outerShdw>
+          </a:effectLst>
+          <a:scene3d>
+            <a:camera prst="orthographicFront">
+              <a:rot lat="0" lon="0" rev="0"/>
+            </a:camera>
+            <a:lightRig rig="threePt" dir="t">
+              <a:rot lat="0" lon="0" rev="1200000"/>
+            </a:lightRig>
+          </a:scene3d>
+          <a:sp3d>
+            <a:bevelT w="63500" h="25400"/>
+          </a:sp3d>
+        </a:effectStyle>
+      </a:effectStyleLst>
+      <a:bgFillStyleLst>
+        <a:solidFill>
+          <a:schemeClr val="phClr"/>
+        </a:solidFill>
+        <a:gradFill rotWithShape="1">
+          <a:gsLst>
+            <a:gs pos="0">
+              <a:schemeClr val="phClr">
+                <a:tint val="40000"/>
+                <a:satMod val="350000"/>
+              </a:schemeClr>
+            </a:gs>
+            <a:gs pos="40000">
+              <a:schemeClr val="phClr">
+                <a:tint val="45000"/>
+                <a:shade val="99000"/>
+                <a:satMod val="350000"/>
+              </a:schemeClr>
+            </a:gs>
+            <a:gs pos="100000">
+              <a:schemeClr val="phClr">
+                <a:shade val="20000"/>
+                <a:satMod val="255000"/>
+              </a:schemeClr>
+            </a:gs>
+          </a:gsLst>
+          <a:path path="circle">
+            <a:fillToRect l="50000" t="-80000" r="50000" b="180000"/>
+          </a:path>
+        </a:gradFill>
+        <a:gradFill rotWithShape="1">
+          <a:gsLst>
+            <a:gs pos="0">
+              <a:schemeClr val="phClr">
+                <a:tint val="80000"/>
+                <a:satMod val="300000"/>
+              </a:schemeClr>
+            </a:gs>
+            <a:gs pos="100000">
+              <a:schemeClr val="phClr">
+                <a:shade val="30000"/>
+                <a:satMod val="200000"/>
+              </a:schemeClr>
+            </a:gs>
+          </a:gsLst>
+          <a:path path="circle">
+            <a:fillToRect l="50000" t="50000" r="50000" b="50000"/>
+          </a:path>
+        </a:gradFill>
+      </a:bgFillStyleLst>
+    </a:fmtScheme>
+  </a:themeElements>
+  <a:objectDefaults>
+    <a:spDef>
+      <a:spPr/>
+      <a:bodyPr/>
+      <a:lstStyle/>
+      <a:style>
+        <a:lnRef idx="1">
+          <a:schemeClr val="accent1"/>
+        </a:lnRef>
+        <a:fillRef idx="3">
+          <a:schemeClr val="accent1"/>
+        </a:fillRef>
+        <a:effectRef idx="2">
+          <a:schemeClr val="accent1"/>
+        </a:effectRef>
+        <a:fontRef idx="minor">
+          <a:schemeClr val="lt1"/>
+        </a:fontRef>
+      </a:style>
+    </a:spDef>
+    <a:lnDef>
+      <a:spPr/>
+      <a:bodyPr/>
+      <a:lstStyle/>
+      <a:style>
+        <a:lnRef idx="2">
+          <a:schemeClr val="accent1"/>
+        </a:lnRef>
+        <a:fillRef idx="0">
+          <a:schemeClr val="accent1"/>
+        </a:fillRef>
+        <a:effectRef idx="1">
+          <a:schemeClr val="accent1"/>
+        </a:effectRef>
+        <a:fontRef idx="minor">
+          <a:schemeClr val="tx1"/>
+        </a:fontRef>
+      </a:style>
+    </a:lnDef>
+  </a:objectDefaults>
+  <a:extraClrSchemeLst/>
+</a:theme>
 </file>
</xml_diff>

<commit_message>
Updated navigation section with more discussion on selection of goal cost function params
</commit_message>
<xml_diff>
--- a/imgs/created_images.pptx
+++ b/imgs/created_images.pptx
@@ -5,7 +5,7 @@
     <p:sldMasterId id="2147483648" r:id="rId1"/>
   </p:sldMasterIdLst>
   <p:notesMasterIdLst>
-    <p:notesMasterId r:id="rId8"/>
+    <p:notesMasterId r:id="rId12"/>
   </p:notesMasterIdLst>
   <p:sldIdLst>
     <p:sldId id="256" r:id="rId2"/>
@@ -14,6 +14,10 @@
     <p:sldId id="259" r:id="rId5"/>
     <p:sldId id="260" r:id="rId6"/>
     <p:sldId id="261" r:id="rId7"/>
+    <p:sldId id="262" r:id="rId8"/>
+    <p:sldId id="263" r:id="rId9"/>
+    <p:sldId id="264" r:id="rId10"/>
+    <p:sldId id="265" r:id="rId11"/>
   </p:sldIdLst>
   <p:sldSz cx="9144000" cy="6858000" type="screen4x3"/>
   <p:notesSz cx="6858000" cy="9144000"/>
@@ -197,7 +201,7 @@
           <a:p>
             <a:fld id="{57AC16EC-C4E8-AF45-A64C-ED98F92568E9}" type="datetimeFigureOut">
               <a:rPr lang="en-US" smtClean="0"/>
-              <a:t>23/10/17</a:t>
+              <a:t>24/10/17</a:t>
             </a:fld>
             <a:endParaRPr lang="en-US"/>
           </a:p>
@@ -549,6 +553,174 @@
 </p:notes>
 </file>
 
+<file path=ppt/notesSlides/notesSlide2.xml><?xml version="1.0" encoding="utf-8"?>
+<p:notes xmlns:a="http://schemas.openxmlformats.org/drawingml/2006/main" xmlns:r="http://schemas.openxmlformats.org/officeDocument/2006/relationships" xmlns:p="http://schemas.openxmlformats.org/presentationml/2006/main">
+  <p:cSld>
+    <p:spTree>
+      <p:nvGrpSpPr>
+        <p:cNvPr id="1" name=""/>
+        <p:cNvGrpSpPr/>
+        <p:nvPr/>
+      </p:nvGrpSpPr>
+      <p:grpSpPr>
+        <a:xfrm>
+          <a:off x="0" y="0"/>
+          <a:ext cx="0" cy="0"/>
+          <a:chOff x="0" y="0"/>
+          <a:chExt cx="0" cy="0"/>
+        </a:xfrm>
+      </p:grpSpPr>
+      <p:sp>
+        <p:nvSpPr>
+          <p:cNvPr id="2" name="Slide Image Placeholder 1"/>
+          <p:cNvSpPr>
+            <a:spLocks noGrp="1" noRot="1" noChangeAspect="1"/>
+          </p:cNvSpPr>
+          <p:nvPr>
+            <p:ph type="sldImg"/>
+          </p:nvPr>
+        </p:nvSpPr>
+        <p:spPr/>
+      </p:sp>
+      <p:sp>
+        <p:nvSpPr>
+          <p:cNvPr id="3" name="Notes Placeholder 2"/>
+          <p:cNvSpPr>
+            <a:spLocks noGrp="1"/>
+          </p:cNvSpPr>
+          <p:nvPr>
+            <p:ph type="body" idx="1"/>
+          </p:nvPr>
+        </p:nvSpPr>
+        <p:spPr/>
+        <p:txBody>
+          <a:bodyPr/>
+          <a:lstStyle/>
+          <a:p>
+            <a:endParaRPr lang="en-US" dirty="0"/>
+          </a:p>
+        </p:txBody>
+      </p:sp>
+      <p:sp>
+        <p:nvSpPr>
+          <p:cNvPr id="4" name="Slide Number Placeholder 3"/>
+          <p:cNvSpPr>
+            <a:spLocks noGrp="1"/>
+          </p:cNvSpPr>
+          <p:nvPr>
+            <p:ph type="sldNum" sz="quarter" idx="10"/>
+          </p:nvPr>
+        </p:nvSpPr>
+        <p:spPr/>
+        <p:txBody>
+          <a:bodyPr/>
+          <a:lstStyle/>
+          <a:p>
+            <a:fld id="{B30BD7E0-E079-F048-8718-4CAC1D3386FC}" type="slidenum">
+              <a:rPr lang="en-US" smtClean="0"/>
+              <a:t>8</a:t>
+            </a:fld>
+            <a:endParaRPr lang="en-US"/>
+          </a:p>
+        </p:txBody>
+      </p:sp>
+    </p:spTree>
+    <p:extLst>
+      <p:ext uri="{BB962C8B-B14F-4D97-AF65-F5344CB8AC3E}">
+        <p14:creationId xmlns:p14="http://schemas.microsoft.com/office/powerpoint/2010/main" val="601072766"/>
+      </p:ext>
+    </p:extLst>
+  </p:cSld>
+  <p:clrMapOvr>
+    <a:masterClrMapping/>
+  </p:clrMapOvr>
+</p:notes>
+</file>
+
+<file path=ppt/notesSlides/notesSlide3.xml><?xml version="1.0" encoding="utf-8"?>
+<p:notes xmlns:a="http://schemas.openxmlformats.org/drawingml/2006/main" xmlns:r="http://schemas.openxmlformats.org/officeDocument/2006/relationships" xmlns:p="http://schemas.openxmlformats.org/presentationml/2006/main">
+  <p:cSld>
+    <p:spTree>
+      <p:nvGrpSpPr>
+        <p:cNvPr id="1" name=""/>
+        <p:cNvGrpSpPr/>
+        <p:nvPr/>
+      </p:nvGrpSpPr>
+      <p:grpSpPr>
+        <a:xfrm>
+          <a:off x="0" y="0"/>
+          <a:ext cx="0" cy="0"/>
+          <a:chOff x="0" y="0"/>
+          <a:chExt cx="0" cy="0"/>
+        </a:xfrm>
+      </p:grpSpPr>
+      <p:sp>
+        <p:nvSpPr>
+          <p:cNvPr id="2" name="Slide Image Placeholder 1"/>
+          <p:cNvSpPr>
+            <a:spLocks noGrp="1" noRot="1" noChangeAspect="1"/>
+          </p:cNvSpPr>
+          <p:nvPr>
+            <p:ph type="sldImg"/>
+          </p:nvPr>
+        </p:nvSpPr>
+        <p:spPr/>
+      </p:sp>
+      <p:sp>
+        <p:nvSpPr>
+          <p:cNvPr id="3" name="Notes Placeholder 2"/>
+          <p:cNvSpPr>
+            <a:spLocks noGrp="1"/>
+          </p:cNvSpPr>
+          <p:nvPr>
+            <p:ph type="body" idx="1"/>
+          </p:nvPr>
+        </p:nvSpPr>
+        <p:spPr/>
+        <p:txBody>
+          <a:bodyPr/>
+          <a:lstStyle/>
+          <a:p>
+            <a:endParaRPr lang="en-US" dirty="0"/>
+          </a:p>
+        </p:txBody>
+      </p:sp>
+      <p:sp>
+        <p:nvSpPr>
+          <p:cNvPr id="4" name="Slide Number Placeholder 3"/>
+          <p:cNvSpPr>
+            <a:spLocks noGrp="1"/>
+          </p:cNvSpPr>
+          <p:nvPr>
+            <p:ph type="sldNum" sz="quarter" idx="10"/>
+          </p:nvPr>
+        </p:nvSpPr>
+        <p:spPr/>
+        <p:txBody>
+          <a:bodyPr/>
+          <a:lstStyle/>
+          <a:p>
+            <a:fld id="{B30BD7E0-E079-F048-8718-4CAC1D3386FC}" type="slidenum">
+              <a:rPr lang="en-US" smtClean="0"/>
+              <a:t>9</a:t>
+            </a:fld>
+            <a:endParaRPr lang="en-US"/>
+          </a:p>
+        </p:txBody>
+      </p:sp>
+    </p:spTree>
+    <p:extLst>
+      <p:ext uri="{BB962C8B-B14F-4D97-AF65-F5344CB8AC3E}">
+        <p14:creationId xmlns:p14="http://schemas.microsoft.com/office/powerpoint/2010/main" val="601072766"/>
+      </p:ext>
+    </p:extLst>
+  </p:cSld>
+  <p:clrMapOvr>
+    <a:masterClrMapping/>
+  </p:clrMapOvr>
+</p:notes>
+</file>
+
 <file path=ppt/slideLayouts/slideLayout1.xml><?xml version="1.0" encoding="utf-8"?>
 <p:sldLayout xmlns:a="http://schemas.openxmlformats.org/drawingml/2006/main" xmlns:r="http://schemas.openxmlformats.org/officeDocument/2006/relationships" xmlns:p="http://schemas.openxmlformats.org/presentationml/2006/main" type="title" preserve="1">
   <p:cSld name="Title Slide">
@@ -730,7 +902,7 @@
           <a:p>
             <a:fld id="{BB5EAA35-4DD1-8F46-B65F-F41CC6BB8EEF}" type="datetimeFigureOut">
               <a:rPr lang="en-US" smtClean="0"/>
-              <a:t>23/10/17</a:t>
+              <a:t>24/10/17</a:t>
             </a:fld>
             <a:endParaRPr lang="en-US"/>
           </a:p>
@@ -900,7 +1072,7 @@
           <a:p>
             <a:fld id="{BB5EAA35-4DD1-8F46-B65F-F41CC6BB8EEF}" type="datetimeFigureOut">
               <a:rPr lang="en-US" smtClean="0"/>
-              <a:t>23/10/17</a:t>
+              <a:t>24/10/17</a:t>
             </a:fld>
             <a:endParaRPr lang="en-US"/>
           </a:p>
@@ -1080,7 +1252,7 @@
           <a:p>
             <a:fld id="{BB5EAA35-4DD1-8F46-B65F-F41CC6BB8EEF}" type="datetimeFigureOut">
               <a:rPr lang="en-US" smtClean="0"/>
-              <a:t>23/10/17</a:t>
+              <a:t>24/10/17</a:t>
             </a:fld>
             <a:endParaRPr lang="en-US"/>
           </a:p>
@@ -1250,7 +1422,7 @@
           <a:p>
             <a:fld id="{BB5EAA35-4DD1-8F46-B65F-F41CC6BB8EEF}" type="datetimeFigureOut">
               <a:rPr lang="en-US" smtClean="0"/>
-              <a:t>23/10/17</a:t>
+              <a:t>24/10/17</a:t>
             </a:fld>
             <a:endParaRPr lang="en-US"/>
           </a:p>
@@ -1496,7 +1668,7 @@
           <a:p>
             <a:fld id="{BB5EAA35-4DD1-8F46-B65F-F41CC6BB8EEF}" type="datetimeFigureOut">
               <a:rPr lang="en-US" smtClean="0"/>
-              <a:t>23/10/17</a:t>
+              <a:t>24/10/17</a:t>
             </a:fld>
             <a:endParaRPr lang="en-US"/>
           </a:p>
@@ -1784,7 +1956,7 @@
           <a:p>
             <a:fld id="{BB5EAA35-4DD1-8F46-B65F-F41CC6BB8EEF}" type="datetimeFigureOut">
               <a:rPr lang="en-US" smtClean="0"/>
-              <a:t>23/10/17</a:t>
+              <a:t>24/10/17</a:t>
             </a:fld>
             <a:endParaRPr lang="en-US"/>
           </a:p>
@@ -2206,7 +2378,7 @@
           <a:p>
             <a:fld id="{BB5EAA35-4DD1-8F46-B65F-F41CC6BB8EEF}" type="datetimeFigureOut">
               <a:rPr lang="en-US" smtClean="0"/>
-              <a:t>23/10/17</a:t>
+              <a:t>24/10/17</a:t>
             </a:fld>
             <a:endParaRPr lang="en-US"/>
           </a:p>
@@ -2324,7 +2496,7 @@
           <a:p>
             <a:fld id="{BB5EAA35-4DD1-8F46-B65F-F41CC6BB8EEF}" type="datetimeFigureOut">
               <a:rPr lang="en-US" smtClean="0"/>
-              <a:t>23/10/17</a:t>
+              <a:t>24/10/17</a:t>
             </a:fld>
             <a:endParaRPr lang="en-US"/>
           </a:p>
@@ -2419,7 +2591,7 @@
           <a:p>
             <a:fld id="{BB5EAA35-4DD1-8F46-B65F-F41CC6BB8EEF}" type="datetimeFigureOut">
               <a:rPr lang="en-US" smtClean="0"/>
-              <a:t>23/10/17</a:t>
+              <a:t>24/10/17</a:t>
             </a:fld>
             <a:endParaRPr lang="en-US"/>
           </a:p>
@@ -2696,7 +2868,7 @@
           <a:p>
             <a:fld id="{BB5EAA35-4DD1-8F46-B65F-F41CC6BB8EEF}" type="datetimeFigureOut">
               <a:rPr lang="en-US" smtClean="0"/>
-              <a:t>23/10/17</a:t>
+              <a:t>24/10/17</a:t>
             </a:fld>
             <a:endParaRPr lang="en-US"/>
           </a:p>
@@ -2949,7 +3121,7 @@
           <a:p>
             <a:fld id="{BB5EAA35-4DD1-8F46-B65F-F41CC6BB8EEF}" type="datetimeFigureOut">
               <a:rPr lang="en-US" smtClean="0"/>
-              <a:t>23/10/17</a:t>
+              <a:t>24/10/17</a:t>
             </a:fld>
             <a:endParaRPr lang="en-US"/>
           </a:p>
@@ -3162,7 +3334,7 @@
           <a:p>
             <a:fld id="{BB5EAA35-4DD1-8F46-B65F-F41CC6BB8EEF}" type="datetimeFigureOut">
               <a:rPr lang="en-US" smtClean="0"/>
-              <a:t>23/10/17</a:t>
+              <a:t>24/10/17</a:t>
             </a:fld>
             <a:endParaRPr lang="en-US"/>
           </a:p>
@@ -3738,6 +3910,1017 @@
 </p:sld>
 </file>
 
+<file path=ppt/slides/slide10.xml><?xml version="1.0" encoding="utf-8"?>
+<p:sld xmlns:a="http://schemas.openxmlformats.org/drawingml/2006/main" xmlns:r="http://schemas.openxmlformats.org/officeDocument/2006/relationships" xmlns:p="http://schemas.openxmlformats.org/presentationml/2006/main">
+  <p:cSld>
+    <p:spTree>
+      <p:nvGrpSpPr>
+        <p:cNvPr id="1" name=""/>
+        <p:cNvGrpSpPr/>
+        <p:nvPr/>
+      </p:nvGrpSpPr>
+      <p:grpSpPr>
+        <a:xfrm>
+          <a:off x="0" y="0"/>
+          <a:ext cx="0" cy="0"/>
+          <a:chOff x="0" y="0"/>
+          <a:chExt cx="0" cy="0"/>
+        </a:xfrm>
+      </p:grpSpPr>
+      <p:grpSp>
+        <p:nvGrpSpPr>
+          <p:cNvPr id="73" name="Group 72"/>
+          <p:cNvGrpSpPr/>
+          <p:nvPr/>
+        </p:nvGrpSpPr>
+        <p:grpSpPr>
+          <a:xfrm>
+            <a:off x="1059217" y="819366"/>
+            <a:ext cx="7131168" cy="6907683"/>
+            <a:chOff x="1059217" y="819366"/>
+            <a:chExt cx="7131168" cy="6907683"/>
+          </a:xfrm>
+        </p:grpSpPr>
+        <p:sp>
+          <p:nvSpPr>
+            <p:cNvPr id="15" name="Pie 14"/>
+            <p:cNvSpPr/>
+            <p:nvPr/>
+          </p:nvSpPr>
+          <p:spPr>
+            <a:xfrm>
+              <a:off x="1282702" y="819366"/>
+              <a:ext cx="6907683" cy="6907683"/>
+            </a:xfrm>
+            <a:prstGeom prst="pie">
+              <a:avLst>
+                <a:gd name="adj1" fmla="val 10791208"/>
+                <a:gd name="adj2" fmla="val 18313480"/>
+              </a:avLst>
+            </a:prstGeom>
+            <a:noFill/>
+            <a:ln>
+              <a:solidFill>
+                <a:srgbClr val="000000"/>
+              </a:solidFill>
+              <a:prstDash val="dash"/>
+            </a:ln>
+            <a:effectLst/>
+          </p:spPr>
+          <p:style>
+            <a:lnRef idx="1">
+              <a:schemeClr val="accent1"/>
+            </a:lnRef>
+            <a:fillRef idx="3">
+              <a:schemeClr val="accent1"/>
+            </a:fillRef>
+            <a:effectRef idx="2">
+              <a:schemeClr val="accent1"/>
+            </a:effectRef>
+            <a:fontRef idx="minor">
+              <a:schemeClr val="lt1"/>
+            </a:fontRef>
+          </p:style>
+          <p:txBody>
+            <a:bodyPr rtlCol="0" anchor="ctr"/>
+            <a:lstStyle/>
+            <a:p>
+              <a:pPr algn="ctr"/>
+              <a:endParaRPr lang="en-US">
+                <a:solidFill>
+                  <a:schemeClr val="tx1"/>
+                </a:solidFill>
+              </a:endParaRPr>
+            </a:p>
+          </p:txBody>
+        </p:sp>
+        <p:sp>
+          <p:nvSpPr>
+            <p:cNvPr id="30" name="Pie 29"/>
+            <p:cNvSpPr/>
+            <p:nvPr/>
+          </p:nvSpPr>
+          <p:spPr>
+            <a:xfrm>
+              <a:off x="1537126" y="1073790"/>
+              <a:ext cx="6398835" cy="6398835"/>
+            </a:xfrm>
+            <a:prstGeom prst="pie">
+              <a:avLst>
+                <a:gd name="adj1" fmla="val 10801243"/>
+                <a:gd name="adj2" fmla="val 19937626"/>
+              </a:avLst>
+            </a:prstGeom>
+            <a:noFill/>
+            <a:ln>
+              <a:solidFill>
+                <a:srgbClr val="000000"/>
+              </a:solidFill>
+            </a:ln>
+            <a:effectLst/>
+          </p:spPr>
+          <p:style>
+            <a:lnRef idx="1">
+              <a:schemeClr val="accent1"/>
+            </a:lnRef>
+            <a:fillRef idx="3">
+              <a:schemeClr val="accent1"/>
+            </a:fillRef>
+            <a:effectRef idx="2">
+              <a:schemeClr val="accent1"/>
+            </a:effectRef>
+            <a:fontRef idx="minor">
+              <a:schemeClr val="lt1"/>
+            </a:fontRef>
+          </p:style>
+          <p:txBody>
+            <a:bodyPr rtlCol="0" anchor="ctr"/>
+            <a:lstStyle/>
+            <a:p>
+              <a:pPr algn="ctr"/>
+              <a:endParaRPr lang="en-US">
+                <a:solidFill>
+                  <a:schemeClr val="tx1"/>
+                </a:solidFill>
+              </a:endParaRPr>
+            </a:p>
+          </p:txBody>
+        </p:sp>
+        <p:sp>
+          <p:nvSpPr>
+            <p:cNvPr id="31" name="Pie 30"/>
+            <p:cNvSpPr/>
+            <p:nvPr/>
+          </p:nvSpPr>
+          <p:spPr>
+            <a:xfrm>
+              <a:off x="1537126" y="1155095"/>
+              <a:ext cx="6391957" cy="6398835"/>
+            </a:xfrm>
+            <a:prstGeom prst="pie">
+              <a:avLst>
+                <a:gd name="adj1" fmla="val 9756807"/>
+                <a:gd name="adj2" fmla="val 20953935"/>
+              </a:avLst>
+            </a:prstGeom>
+            <a:solidFill>
+              <a:srgbClr val="FFFFFF"/>
+            </a:solidFill>
+            <a:ln>
+              <a:noFill/>
+            </a:ln>
+            <a:effectLst/>
+          </p:spPr>
+          <p:style>
+            <a:lnRef idx="1">
+              <a:schemeClr val="accent1"/>
+            </a:lnRef>
+            <a:fillRef idx="3">
+              <a:schemeClr val="accent1"/>
+            </a:fillRef>
+            <a:effectRef idx="2">
+              <a:schemeClr val="accent1"/>
+            </a:effectRef>
+            <a:fontRef idx="minor">
+              <a:schemeClr val="lt1"/>
+            </a:fontRef>
+          </p:style>
+          <p:txBody>
+            <a:bodyPr rtlCol="0" anchor="ctr"/>
+            <a:lstStyle/>
+            <a:p>
+              <a:pPr algn="ctr"/>
+              <a:endParaRPr lang="en-US">
+                <a:solidFill>
+                  <a:schemeClr val="tx1"/>
+                </a:solidFill>
+              </a:endParaRPr>
+            </a:p>
+          </p:txBody>
+        </p:sp>
+        <p:sp>
+          <p:nvSpPr>
+            <p:cNvPr id="4" name="Oval 3"/>
+            <p:cNvSpPr/>
+            <p:nvPr/>
+          </p:nvSpPr>
+          <p:spPr>
+            <a:xfrm>
+              <a:off x="4212572" y="3748656"/>
+              <a:ext cx="1049104" cy="1049104"/>
+            </a:xfrm>
+            <a:prstGeom prst="ellipse">
+              <a:avLst/>
+            </a:prstGeom>
+            <a:solidFill>
+              <a:srgbClr val="FFFFFF"/>
+            </a:solidFill>
+            <a:ln>
+              <a:solidFill>
+                <a:srgbClr val="0D0D0D"/>
+              </a:solidFill>
+            </a:ln>
+            <a:effectLst/>
+          </p:spPr>
+          <p:style>
+            <a:lnRef idx="1">
+              <a:schemeClr val="accent1"/>
+            </a:lnRef>
+            <a:fillRef idx="3">
+              <a:schemeClr val="accent1"/>
+            </a:fillRef>
+            <a:effectRef idx="2">
+              <a:schemeClr val="accent1"/>
+            </a:effectRef>
+            <a:fontRef idx="minor">
+              <a:schemeClr val="lt1"/>
+            </a:fontRef>
+          </p:style>
+          <p:txBody>
+            <a:bodyPr rtlCol="0" anchor="ctr"/>
+            <a:lstStyle/>
+            <a:p>
+              <a:pPr algn="ctr"/>
+              <a:endParaRPr lang="en-US"/>
+            </a:p>
+          </p:txBody>
+        </p:sp>
+        <p:cxnSp>
+          <p:nvCxnSpPr>
+            <p:cNvPr id="19" name="Straight Connector 18"/>
+            <p:cNvCxnSpPr/>
+            <p:nvPr/>
+          </p:nvCxnSpPr>
+          <p:spPr>
+            <a:xfrm flipV="1">
+              <a:off x="1544004" y="1666240"/>
+              <a:ext cx="5045507" cy="2623103"/>
+            </a:xfrm>
+            <a:prstGeom prst="line">
+              <a:avLst/>
+            </a:prstGeom>
+            <a:ln w="12700" cmpd="sng">
+              <a:solidFill>
+                <a:schemeClr val="tx1"/>
+              </a:solidFill>
+            </a:ln>
+            <a:effectLst/>
+          </p:spPr>
+          <p:style>
+            <a:lnRef idx="2">
+              <a:schemeClr val="accent1"/>
+            </a:lnRef>
+            <a:fillRef idx="0">
+              <a:schemeClr val="accent1"/>
+            </a:fillRef>
+            <a:effectRef idx="1">
+              <a:schemeClr val="accent1"/>
+            </a:effectRef>
+            <a:fontRef idx="minor">
+              <a:schemeClr val="tx1"/>
+            </a:fontRef>
+          </p:style>
+        </p:cxnSp>
+        <p:cxnSp>
+          <p:nvCxnSpPr>
+            <p:cNvPr id="29" name="Straight Connector 28"/>
+            <p:cNvCxnSpPr>
+              <a:stCxn id="4" idx="6"/>
+            </p:cNvCxnSpPr>
+            <p:nvPr/>
+          </p:nvCxnSpPr>
+          <p:spPr>
+            <a:xfrm flipH="1">
+              <a:off x="4736544" y="4273208"/>
+              <a:ext cx="525132" cy="0"/>
+            </a:xfrm>
+            <a:prstGeom prst="line">
+              <a:avLst/>
+            </a:prstGeom>
+            <a:ln w="12700" cmpd="sng">
+              <a:solidFill>
+                <a:srgbClr val="000000"/>
+              </a:solidFill>
+              <a:prstDash val="dash"/>
+            </a:ln>
+            <a:effectLst/>
+          </p:spPr>
+          <p:style>
+            <a:lnRef idx="2">
+              <a:schemeClr val="accent1"/>
+            </a:lnRef>
+            <a:fillRef idx="0">
+              <a:schemeClr val="accent1"/>
+            </a:fillRef>
+            <a:effectRef idx="1">
+              <a:schemeClr val="accent1"/>
+            </a:effectRef>
+            <a:fontRef idx="minor">
+              <a:schemeClr val="tx1"/>
+            </a:fontRef>
+          </p:style>
+        </p:cxnSp>
+        <p:cxnSp>
+          <p:nvCxnSpPr>
+            <p:cNvPr id="35" name="Straight Connector 34"/>
+            <p:cNvCxnSpPr/>
+            <p:nvPr/>
+          </p:nvCxnSpPr>
+          <p:spPr>
+            <a:xfrm flipH="1" flipV="1">
+              <a:off x="3744366" y="3119169"/>
+              <a:ext cx="517878" cy="830531"/>
+            </a:xfrm>
+            <a:prstGeom prst="line">
+              <a:avLst/>
+            </a:prstGeom>
+            <a:ln w="12700" cmpd="sng">
+              <a:solidFill>
+                <a:srgbClr val="000000"/>
+              </a:solidFill>
+              <a:prstDash val="dash"/>
+            </a:ln>
+            <a:effectLst/>
+          </p:spPr>
+          <p:style>
+            <a:lnRef idx="2">
+              <a:schemeClr val="accent1"/>
+            </a:lnRef>
+            <a:fillRef idx="0">
+              <a:schemeClr val="accent1"/>
+            </a:fillRef>
+            <a:effectRef idx="1">
+              <a:schemeClr val="accent1"/>
+            </a:effectRef>
+            <a:fontRef idx="minor">
+              <a:schemeClr val="tx1"/>
+            </a:fontRef>
+          </p:style>
+        </p:cxnSp>
+        <p:cxnSp>
+          <p:nvCxnSpPr>
+            <p:cNvPr id="38" name="Straight Connector 37"/>
+            <p:cNvCxnSpPr/>
+            <p:nvPr/>
+          </p:nvCxnSpPr>
+          <p:spPr>
+            <a:xfrm flipH="1">
+              <a:off x="4262244" y="3820160"/>
+              <a:ext cx="202720" cy="129540"/>
+            </a:xfrm>
+            <a:prstGeom prst="line">
+              <a:avLst/>
+            </a:prstGeom>
+            <a:ln w="12700" cmpd="sng">
+              <a:solidFill>
+                <a:srgbClr val="000000"/>
+              </a:solidFill>
+              <a:prstDash val="solid"/>
+            </a:ln>
+            <a:effectLst/>
+          </p:spPr>
+          <p:style>
+            <a:lnRef idx="2">
+              <a:schemeClr val="accent1"/>
+            </a:lnRef>
+            <a:fillRef idx="0">
+              <a:schemeClr val="accent1"/>
+            </a:fillRef>
+            <a:effectRef idx="1">
+              <a:schemeClr val="accent1"/>
+            </a:effectRef>
+            <a:fontRef idx="minor">
+              <a:schemeClr val="tx1"/>
+            </a:fontRef>
+          </p:style>
+        </p:cxnSp>
+        <p:sp>
+          <p:nvSpPr>
+            <p:cNvPr id="13" name="Rectangle 12"/>
+            <p:cNvSpPr/>
+            <p:nvPr/>
+          </p:nvSpPr>
+          <p:spPr>
+            <a:xfrm>
+              <a:off x="4212572" y="3119169"/>
+              <a:ext cx="969574" cy="246221"/>
+            </a:xfrm>
+            <a:prstGeom prst="rect">
+              <a:avLst/>
+            </a:prstGeom>
+          </p:spPr>
+          <p:txBody>
+            <a:bodyPr wrap="none">
+              <a:spAutoFit/>
+            </a:bodyPr>
+            <a:lstStyle/>
+            <a:p>
+              <a:r>
+                <a:rPr lang="en-US" sz="1000" dirty="0" smtClean="0"/>
+                <a:t>Inflation radius</a:t>
+              </a:r>
+              <a:endParaRPr lang="en-US" sz="1000" dirty="0"/>
+            </a:p>
+          </p:txBody>
+        </p:sp>
+        <p:sp>
+          <p:nvSpPr>
+            <p:cNvPr id="16" name="Rectangle 15"/>
+            <p:cNvSpPr/>
+            <p:nvPr/>
+          </p:nvSpPr>
+          <p:spPr>
+            <a:xfrm>
+              <a:off x="4883250" y="4205815"/>
+              <a:ext cx="257427" cy="246221"/>
+            </a:xfrm>
+            <a:prstGeom prst="rect">
+              <a:avLst/>
+            </a:prstGeom>
+          </p:spPr>
+          <p:txBody>
+            <a:bodyPr wrap="none">
+              <a:spAutoFit/>
+            </a:bodyPr>
+            <a:lstStyle/>
+            <a:p>
+              <a:r>
+                <a:rPr lang="en-US" sz="1000" dirty="0" smtClean="0"/>
+                <a:t>α</a:t>
+              </a:r>
+              <a:endParaRPr lang="en-US" sz="1000" dirty="0"/>
+            </a:p>
+          </p:txBody>
+        </p:sp>
+        <p:sp>
+          <p:nvSpPr>
+            <p:cNvPr id="18" name="Rectangle 17"/>
+            <p:cNvSpPr/>
+            <p:nvPr/>
+          </p:nvSpPr>
+          <p:spPr>
+            <a:xfrm>
+              <a:off x="3824878" y="3503170"/>
+              <a:ext cx="238893" cy="246221"/>
+            </a:xfrm>
+            <a:prstGeom prst="rect">
+              <a:avLst/>
+            </a:prstGeom>
+          </p:spPr>
+          <p:txBody>
+            <a:bodyPr wrap="none">
+              <a:spAutoFit/>
+            </a:bodyPr>
+            <a:lstStyle/>
+            <a:p>
+              <a:r>
+                <a:rPr lang="en-US" sz="1000" dirty="0"/>
+                <a:t>c</a:t>
+              </a:r>
+              <a:endParaRPr lang="en-US" sz="1000" dirty="0"/>
+            </a:p>
+          </p:txBody>
+        </p:sp>
+        <p:sp>
+          <p:nvSpPr>
+            <p:cNvPr id="20" name="Rectangle 19"/>
+            <p:cNvSpPr/>
+            <p:nvPr/>
+          </p:nvSpPr>
+          <p:spPr>
+            <a:xfrm>
+              <a:off x="2253469" y="1420019"/>
+              <a:ext cx="252042" cy="246221"/>
+            </a:xfrm>
+            <a:prstGeom prst="rect">
+              <a:avLst/>
+            </a:prstGeom>
+          </p:spPr>
+          <p:txBody>
+            <a:bodyPr wrap="none">
+              <a:spAutoFit/>
+            </a:bodyPr>
+            <a:lstStyle/>
+            <a:p>
+              <a:r>
+                <a:rPr lang="en-US" sz="1000" dirty="0" smtClean="0"/>
+                <a:t>d</a:t>
+              </a:r>
+              <a:endParaRPr lang="en-US" sz="1000" dirty="0"/>
+            </a:p>
+          </p:txBody>
+        </p:sp>
+        <p:sp>
+          <p:nvSpPr>
+            <p:cNvPr id="27" name="Oval 26"/>
+            <p:cNvSpPr/>
+            <p:nvPr/>
+          </p:nvSpPr>
+          <p:spPr>
+            <a:xfrm>
+              <a:off x="1468433" y="4224173"/>
+              <a:ext cx="130340" cy="130340"/>
+            </a:xfrm>
+            <a:prstGeom prst="ellipse">
+              <a:avLst/>
+            </a:prstGeom>
+            <a:solidFill>
+              <a:schemeClr val="tx1"/>
+            </a:solidFill>
+            <a:ln>
+              <a:solidFill>
+                <a:schemeClr val="tx1"/>
+              </a:solidFill>
+            </a:ln>
+            <a:effectLst/>
+          </p:spPr>
+          <p:style>
+            <a:lnRef idx="1">
+              <a:schemeClr val="accent1"/>
+            </a:lnRef>
+            <a:fillRef idx="3">
+              <a:schemeClr val="accent1"/>
+            </a:fillRef>
+            <a:effectRef idx="2">
+              <a:schemeClr val="accent1"/>
+            </a:effectRef>
+            <a:fontRef idx="minor">
+              <a:schemeClr val="lt1"/>
+            </a:fontRef>
+          </p:style>
+          <p:txBody>
+            <a:bodyPr rtlCol="0" anchor="ctr"/>
+            <a:lstStyle/>
+            <a:p>
+              <a:pPr algn="ctr"/>
+              <a:endParaRPr lang="en-US"/>
+            </a:p>
+          </p:txBody>
+        </p:sp>
+        <p:sp>
+          <p:nvSpPr>
+            <p:cNvPr id="36" name="Oval 35"/>
+            <p:cNvSpPr/>
+            <p:nvPr/>
+          </p:nvSpPr>
+          <p:spPr>
+            <a:xfrm>
+              <a:off x="7505156" y="2722887"/>
+              <a:ext cx="130340" cy="130340"/>
+            </a:xfrm>
+            <a:prstGeom prst="ellipse">
+              <a:avLst/>
+            </a:prstGeom>
+            <a:solidFill>
+              <a:schemeClr val="tx1"/>
+            </a:solidFill>
+            <a:ln>
+              <a:solidFill>
+                <a:schemeClr val="tx1"/>
+              </a:solidFill>
+            </a:ln>
+            <a:effectLst/>
+          </p:spPr>
+          <p:style>
+            <a:lnRef idx="1">
+              <a:schemeClr val="accent1"/>
+            </a:lnRef>
+            <a:fillRef idx="3">
+              <a:schemeClr val="accent1"/>
+            </a:fillRef>
+            <a:effectRef idx="2">
+              <a:schemeClr val="accent1"/>
+            </a:effectRef>
+            <a:fontRef idx="minor">
+              <a:schemeClr val="lt1"/>
+            </a:fontRef>
+          </p:style>
+          <p:txBody>
+            <a:bodyPr rtlCol="0" anchor="ctr"/>
+            <a:lstStyle/>
+            <a:p>
+              <a:pPr algn="ctr"/>
+              <a:endParaRPr lang="en-US"/>
+            </a:p>
+          </p:txBody>
+        </p:sp>
+        <p:sp>
+          <p:nvSpPr>
+            <p:cNvPr id="37" name="Rectangle 36"/>
+            <p:cNvSpPr/>
+            <p:nvPr/>
+          </p:nvSpPr>
+          <p:spPr>
+            <a:xfrm>
+              <a:off x="1059217" y="4354513"/>
+              <a:ext cx="1034007" cy="246221"/>
+            </a:xfrm>
+            <a:prstGeom prst="rect">
+              <a:avLst/>
+            </a:prstGeom>
+          </p:spPr>
+          <p:txBody>
+            <a:bodyPr wrap="none">
+              <a:spAutoFit/>
+            </a:bodyPr>
+            <a:lstStyle/>
+            <a:p>
+              <a:r>
+                <a:rPr lang="en-US" sz="1000" dirty="0" smtClean="0"/>
+                <a:t>Current position</a:t>
+              </a:r>
+              <a:endParaRPr lang="en-US" sz="1000" dirty="0"/>
+            </a:p>
+          </p:txBody>
+        </p:sp>
+        <p:sp>
+          <p:nvSpPr>
+            <p:cNvPr id="39" name="Rectangle 38"/>
+            <p:cNvSpPr/>
+            <p:nvPr/>
+          </p:nvSpPr>
+          <p:spPr>
+            <a:xfrm>
+              <a:off x="7167263" y="2872948"/>
+              <a:ext cx="768698" cy="246221"/>
+            </a:xfrm>
+            <a:prstGeom prst="rect">
+              <a:avLst/>
+            </a:prstGeom>
+          </p:spPr>
+          <p:txBody>
+            <a:bodyPr wrap="none">
+              <a:spAutoFit/>
+            </a:bodyPr>
+            <a:lstStyle/>
+            <a:p>
+              <a:r>
+                <a:rPr lang="en-US" sz="1000" dirty="0" smtClean="0"/>
+                <a:t>Global goal</a:t>
+              </a:r>
+              <a:endParaRPr lang="en-US" sz="1000" dirty="0"/>
+            </a:p>
+          </p:txBody>
+        </p:sp>
+        <p:sp>
+          <p:nvSpPr>
+            <p:cNvPr id="40" name="Oval 39"/>
+            <p:cNvSpPr/>
+            <p:nvPr/>
+          </p:nvSpPr>
+          <p:spPr>
+            <a:xfrm>
+              <a:off x="4671374" y="4208038"/>
+              <a:ext cx="130340" cy="130340"/>
+            </a:xfrm>
+            <a:prstGeom prst="ellipse">
+              <a:avLst/>
+            </a:prstGeom>
+            <a:solidFill>
+              <a:schemeClr val="tx1"/>
+            </a:solidFill>
+            <a:ln>
+              <a:solidFill>
+                <a:schemeClr val="tx1"/>
+              </a:solidFill>
+            </a:ln>
+            <a:effectLst/>
+          </p:spPr>
+          <p:style>
+            <a:lnRef idx="1">
+              <a:schemeClr val="accent1"/>
+            </a:lnRef>
+            <a:fillRef idx="3">
+              <a:schemeClr val="accent1"/>
+            </a:fillRef>
+            <a:effectRef idx="2">
+              <a:schemeClr val="accent1"/>
+            </a:effectRef>
+            <a:fontRef idx="minor">
+              <a:schemeClr val="lt1"/>
+            </a:fontRef>
+          </p:style>
+          <p:txBody>
+            <a:bodyPr rtlCol="0" anchor="ctr"/>
+            <a:lstStyle/>
+            <a:p>
+              <a:pPr algn="ctr"/>
+              <a:endParaRPr lang="en-US"/>
+            </a:p>
+          </p:txBody>
+        </p:sp>
+        <p:sp>
+          <p:nvSpPr>
+            <p:cNvPr id="72" name="Rectangle 71"/>
+            <p:cNvSpPr/>
+            <p:nvPr/>
+          </p:nvSpPr>
+          <p:spPr>
+            <a:xfrm rot="19823108">
+              <a:off x="3905652" y="3034763"/>
+              <a:ext cx="133350" cy="133350"/>
+            </a:xfrm>
+            <a:prstGeom prst="rect">
+              <a:avLst/>
+            </a:prstGeom>
+            <a:noFill/>
+            <a:ln>
+              <a:solidFill>
+                <a:srgbClr val="000000"/>
+              </a:solidFill>
+            </a:ln>
+            <a:effectLst/>
+          </p:spPr>
+          <p:style>
+            <a:lnRef idx="1">
+              <a:schemeClr val="accent1"/>
+            </a:lnRef>
+            <a:fillRef idx="3">
+              <a:schemeClr val="accent1"/>
+            </a:fillRef>
+            <a:effectRef idx="2">
+              <a:schemeClr val="accent1"/>
+            </a:effectRef>
+            <a:fontRef idx="minor">
+              <a:schemeClr val="lt1"/>
+            </a:fontRef>
+          </p:style>
+          <p:txBody>
+            <a:bodyPr rtlCol="0" anchor="ctr"/>
+            <a:lstStyle/>
+            <a:p>
+              <a:pPr algn="ctr"/>
+              <a:endParaRPr lang="en-US"/>
+            </a:p>
+          </p:txBody>
+        </p:sp>
+        <p:sp>
+          <p:nvSpPr>
+            <p:cNvPr id="41" name="Rectangle 40"/>
+            <p:cNvSpPr/>
+            <p:nvPr/>
+          </p:nvSpPr>
+          <p:spPr>
+            <a:xfrm>
+              <a:off x="4275425" y="4308833"/>
+              <a:ext cx="638954" cy="246221"/>
+            </a:xfrm>
+            <a:prstGeom prst="rect">
+              <a:avLst/>
+            </a:prstGeom>
+          </p:spPr>
+          <p:txBody>
+            <a:bodyPr wrap="none">
+              <a:spAutoFit/>
+            </a:bodyPr>
+            <a:lstStyle/>
+            <a:p>
+              <a:r>
+                <a:rPr lang="en-US" sz="1000" dirty="0" smtClean="0"/>
+                <a:t>Obstacle</a:t>
+              </a:r>
+              <a:endParaRPr lang="en-US" sz="1000" dirty="0"/>
+            </a:p>
+          </p:txBody>
+        </p:sp>
+        <p:sp>
+          <p:nvSpPr>
+            <p:cNvPr id="51" name="Pie 50"/>
+            <p:cNvSpPr/>
+            <p:nvPr/>
+          </p:nvSpPr>
+          <p:spPr>
+            <a:xfrm>
+              <a:off x="4388749" y="3923243"/>
+              <a:ext cx="695590" cy="695590"/>
+            </a:xfrm>
+            <a:prstGeom prst="pie">
+              <a:avLst>
+                <a:gd name="adj1" fmla="val 10761624"/>
+                <a:gd name="adj2" fmla="val 14506145"/>
+              </a:avLst>
+            </a:prstGeom>
+            <a:noFill/>
+            <a:ln w="12700" cmpd="sng">
+              <a:solidFill>
+                <a:schemeClr val="tx1"/>
+              </a:solidFill>
+              <a:prstDash val="dash"/>
+            </a:ln>
+            <a:effectLst/>
+          </p:spPr>
+          <p:style>
+            <a:lnRef idx="1">
+              <a:schemeClr val="accent1"/>
+            </a:lnRef>
+            <a:fillRef idx="3">
+              <a:schemeClr val="accent1"/>
+            </a:fillRef>
+            <a:effectRef idx="2">
+              <a:schemeClr val="accent1"/>
+            </a:effectRef>
+            <a:fontRef idx="minor">
+              <a:schemeClr val="lt1"/>
+            </a:fontRef>
+          </p:style>
+          <p:txBody>
+            <a:bodyPr rtlCol="0" anchor="ctr"/>
+            <a:lstStyle/>
+            <a:p>
+              <a:pPr algn="ctr"/>
+              <a:endParaRPr lang="en-US">
+                <a:solidFill>
+                  <a:schemeClr val="tx1"/>
+                </a:solidFill>
+              </a:endParaRPr>
+            </a:p>
+          </p:txBody>
+        </p:sp>
+        <p:sp>
+          <p:nvSpPr>
+            <p:cNvPr id="49" name="Rectangle 48"/>
+            <p:cNvSpPr/>
+            <p:nvPr/>
+          </p:nvSpPr>
+          <p:spPr>
+            <a:xfrm>
+              <a:off x="4413947" y="4024817"/>
+              <a:ext cx="257427" cy="246221"/>
+            </a:xfrm>
+            <a:prstGeom prst="rect">
+              <a:avLst/>
+            </a:prstGeom>
+          </p:spPr>
+          <p:txBody>
+            <a:bodyPr wrap="none">
+              <a:spAutoFit/>
+            </a:bodyPr>
+            <a:lstStyle/>
+            <a:p>
+              <a:r>
+                <a:rPr lang="en-US" sz="1000" smtClean="0"/>
+                <a:t>θ</a:t>
+              </a:r>
+              <a:endParaRPr lang="en-US" sz="1000" dirty="0"/>
+            </a:p>
+          </p:txBody>
+        </p:sp>
+        <p:cxnSp>
+          <p:nvCxnSpPr>
+            <p:cNvPr id="21" name="Straight Connector 20"/>
+            <p:cNvCxnSpPr/>
+            <p:nvPr/>
+          </p:nvCxnSpPr>
+          <p:spPr>
+            <a:xfrm>
+              <a:off x="3107080" y="1541124"/>
+              <a:ext cx="1373480" cy="2279036"/>
+            </a:xfrm>
+            <a:prstGeom prst="line">
+              <a:avLst/>
+            </a:prstGeom>
+            <a:ln w="12700" cmpd="sng">
+              <a:solidFill>
+                <a:srgbClr val="000000"/>
+              </a:solidFill>
+              <a:prstDash val="dash"/>
+            </a:ln>
+            <a:effectLst/>
+          </p:spPr>
+          <p:style>
+            <a:lnRef idx="2">
+              <a:schemeClr val="accent1"/>
+            </a:lnRef>
+            <a:fillRef idx="0">
+              <a:schemeClr val="accent1"/>
+            </a:fillRef>
+            <a:effectRef idx="1">
+              <a:schemeClr val="accent1"/>
+            </a:effectRef>
+            <a:fontRef idx="minor">
+              <a:schemeClr val="tx1"/>
+            </a:fontRef>
+          </p:style>
+        </p:cxnSp>
+      </p:grpSp>
+      <p:sp>
+        <p:nvSpPr>
+          <p:cNvPr id="74" name="Rectangle 73"/>
+          <p:cNvSpPr/>
+          <p:nvPr/>
+        </p:nvSpPr>
+        <p:spPr>
+          <a:xfrm>
+            <a:off x="5389746" y="2200340"/>
+            <a:ext cx="992579" cy="246221"/>
+          </a:xfrm>
+          <a:prstGeom prst="rect">
+            <a:avLst/>
+          </a:prstGeom>
+        </p:spPr>
+        <p:txBody>
+          <a:bodyPr wrap="none">
+            <a:spAutoFit/>
+          </a:bodyPr>
+          <a:lstStyle/>
+          <a:p>
+            <a:r>
+              <a:rPr lang="en-US" sz="1000" dirty="0" smtClean="0"/>
+              <a:t>Local trajectory</a:t>
+            </a:r>
+            <a:endParaRPr lang="en-US" sz="1000" dirty="0"/>
+          </a:p>
+        </p:txBody>
+      </p:sp>
+      <p:sp>
+        <p:nvSpPr>
+          <p:cNvPr id="75" name="Oval 74"/>
+          <p:cNvSpPr/>
+          <p:nvPr/>
+        </p:nvSpPr>
+        <p:spPr>
+          <a:xfrm>
+            <a:off x="6524900" y="1601070"/>
+            <a:ext cx="130340" cy="130340"/>
+          </a:xfrm>
+          <a:prstGeom prst="ellipse">
+            <a:avLst/>
+          </a:prstGeom>
+          <a:solidFill>
+            <a:schemeClr val="tx1"/>
+          </a:solidFill>
+          <a:ln>
+            <a:solidFill>
+              <a:schemeClr val="tx1"/>
+            </a:solidFill>
+          </a:ln>
+          <a:effectLst/>
+        </p:spPr>
+        <p:style>
+          <a:lnRef idx="1">
+            <a:schemeClr val="accent1"/>
+          </a:lnRef>
+          <a:fillRef idx="3">
+            <a:schemeClr val="accent1"/>
+          </a:fillRef>
+          <a:effectRef idx="2">
+            <a:schemeClr val="accent1"/>
+          </a:effectRef>
+          <a:fontRef idx="minor">
+            <a:schemeClr val="lt1"/>
+          </a:fontRef>
+        </p:style>
+        <p:txBody>
+          <a:bodyPr rtlCol="0" anchor="ctr"/>
+          <a:lstStyle/>
+          <a:p>
+            <a:pPr algn="ctr"/>
+            <a:endParaRPr lang="en-US"/>
+          </a:p>
+        </p:txBody>
+      </p:sp>
+      <p:sp>
+        <p:nvSpPr>
+          <p:cNvPr id="76" name="Rectangle 75"/>
+          <p:cNvSpPr/>
+          <p:nvPr/>
+        </p:nvSpPr>
+        <p:spPr>
+          <a:xfrm>
+            <a:off x="6603973" y="1477959"/>
+            <a:ext cx="699130" cy="246221"/>
+          </a:xfrm>
+          <a:prstGeom prst="rect">
+            <a:avLst/>
+          </a:prstGeom>
+        </p:spPr>
+        <p:txBody>
+          <a:bodyPr wrap="none">
+            <a:spAutoFit/>
+          </a:bodyPr>
+          <a:lstStyle/>
+          <a:p>
+            <a:r>
+              <a:rPr lang="en-US" sz="1000" dirty="0" smtClean="0"/>
+              <a:t>Local goal</a:t>
+            </a:r>
+            <a:endParaRPr lang="en-US" sz="1000" dirty="0"/>
+          </a:p>
+        </p:txBody>
+      </p:sp>
+    </p:spTree>
+    <p:extLst>
+      <p:ext uri="{BB962C8B-B14F-4D97-AF65-F5344CB8AC3E}">
+        <p14:creationId xmlns:p14="http://schemas.microsoft.com/office/powerpoint/2010/main" val="1804943629"/>
+      </p:ext>
+    </p:extLst>
+  </p:cSld>
+  <p:clrMapOvr>
+    <a:masterClrMapping/>
+  </p:clrMapOvr>
+</p:sld>
+</file>
+
 <file path=ppt/slides/slide2.xml><?xml version="1.0" encoding="utf-8"?>
 <p:sld xmlns:a="http://schemas.openxmlformats.org/drawingml/2006/main" xmlns:r="http://schemas.openxmlformats.org/officeDocument/2006/relationships" xmlns:p="http://schemas.openxmlformats.org/presentationml/2006/main">
   <p:cSld>
@@ -8942,6 +10125,1659 @@
     <p:extLst>
       <p:ext uri="{BB962C8B-B14F-4D97-AF65-F5344CB8AC3E}">
         <p14:creationId xmlns:p14="http://schemas.microsoft.com/office/powerpoint/2010/main" val="3272980189"/>
+      </p:ext>
+    </p:extLst>
+  </p:cSld>
+  <p:clrMapOvr>
+    <a:masterClrMapping/>
+  </p:clrMapOvr>
+</p:sld>
+</file>
+
+<file path=ppt/slides/slide7.xml><?xml version="1.0" encoding="utf-8"?>
+<p:sld xmlns:a="http://schemas.openxmlformats.org/drawingml/2006/main" xmlns:r="http://schemas.openxmlformats.org/officeDocument/2006/relationships" xmlns:p="http://schemas.openxmlformats.org/presentationml/2006/main">
+  <p:cSld>
+    <p:spTree>
+      <p:nvGrpSpPr>
+        <p:cNvPr id="1" name=""/>
+        <p:cNvGrpSpPr/>
+        <p:nvPr/>
+      </p:nvGrpSpPr>
+      <p:grpSpPr>
+        <a:xfrm>
+          <a:off x="0" y="0"/>
+          <a:ext cx="0" cy="0"/>
+          <a:chOff x="0" y="0"/>
+          <a:chExt cx="0" cy="0"/>
+        </a:xfrm>
+      </p:grpSpPr>
+      <p:grpSp>
+        <p:nvGrpSpPr>
+          <p:cNvPr id="48" name="Group 47"/>
+          <p:cNvGrpSpPr/>
+          <p:nvPr/>
+        </p:nvGrpSpPr>
+        <p:grpSpPr>
+          <a:xfrm>
+            <a:off x="2869167" y="188136"/>
+            <a:ext cx="4510764" cy="5502858"/>
+            <a:chOff x="2869167" y="188136"/>
+            <a:chExt cx="4510764" cy="5502858"/>
+          </a:xfrm>
+        </p:grpSpPr>
+        <p:sp>
+          <p:nvSpPr>
+            <p:cNvPr id="17" name="Freeform 16"/>
+            <p:cNvSpPr/>
+            <p:nvPr/>
+          </p:nvSpPr>
+          <p:spPr>
+            <a:xfrm>
+              <a:off x="3870336" y="834835"/>
+              <a:ext cx="2511161" cy="3409893"/>
+            </a:xfrm>
+            <a:custGeom>
+              <a:avLst/>
+              <a:gdLst>
+                <a:gd name="connsiteX0" fmla="*/ 621556 w 2408906"/>
+                <a:gd name="connsiteY0" fmla="*/ 3304068 h 3304068"/>
+                <a:gd name="connsiteX1" fmla="*/ 174718 w 2408906"/>
+                <a:gd name="connsiteY1" fmla="*/ 2845497 h 3304068"/>
+                <a:gd name="connsiteX2" fmla="*/ 186477 w 2408906"/>
+                <a:gd name="connsiteY2" fmla="*/ 1363957 h 3304068"/>
+                <a:gd name="connsiteX3" fmla="*/ 2408906 w 2408906"/>
+                <a:gd name="connsiteY3" fmla="*/ 0 h 3304068"/>
+              </a:gdLst>
+              <a:ahLst/>
+              <a:cxnLst>
+                <a:cxn ang="0">
+                  <a:pos x="connsiteX0" y="connsiteY0"/>
+                </a:cxn>
+                <a:cxn ang="0">
+                  <a:pos x="connsiteX1" y="connsiteY1"/>
+                </a:cxn>
+                <a:cxn ang="0">
+                  <a:pos x="connsiteX2" y="connsiteY2"/>
+                </a:cxn>
+                <a:cxn ang="0">
+                  <a:pos x="connsiteX3" y="connsiteY3"/>
+                </a:cxn>
+              </a:cxnLst>
+              <a:rect l="l" t="t" r="r" b="b"/>
+              <a:pathLst>
+                <a:path w="2408906" h="3304068">
+                  <a:moveTo>
+                    <a:pt x="621556" y="3304068"/>
+                  </a:moveTo>
+                  <a:cubicBezTo>
+                    <a:pt x="434393" y="3236458"/>
+                    <a:pt x="247231" y="3168849"/>
+                    <a:pt x="174718" y="2845497"/>
+                  </a:cubicBezTo>
+                  <a:cubicBezTo>
+                    <a:pt x="102205" y="2522145"/>
+                    <a:pt x="-185888" y="1838206"/>
+                    <a:pt x="186477" y="1363957"/>
+                  </a:cubicBezTo>
+                  <a:cubicBezTo>
+                    <a:pt x="558842" y="889707"/>
+                    <a:pt x="1930712" y="84267"/>
+                    <a:pt x="2408906" y="0"/>
+                  </a:cubicBezTo>
+                </a:path>
+              </a:pathLst>
+            </a:custGeom>
+            <a:ln>
+              <a:solidFill>
+                <a:srgbClr val="BB0093"/>
+              </a:solidFill>
+            </a:ln>
+            <a:effectLst/>
+          </p:spPr>
+          <p:style>
+            <a:lnRef idx="2">
+              <a:schemeClr val="accent1"/>
+            </a:lnRef>
+            <a:fillRef idx="0">
+              <a:schemeClr val="accent1"/>
+            </a:fillRef>
+            <a:effectRef idx="1">
+              <a:schemeClr val="accent1"/>
+            </a:effectRef>
+            <a:fontRef idx="minor">
+              <a:schemeClr val="tx1"/>
+            </a:fontRef>
+          </p:style>
+          <p:txBody>
+            <a:bodyPr rtlCol="0" anchor="ctr"/>
+            <a:lstStyle/>
+            <a:p>
+              <a:pPr algn="ctr"/>
+              <a:endParaRPr lang="en-US"/>
+            </a:p>
+          </p:txBody>
+        </p:sp>
+        <p:sp>
+          <p:nvSpPr>
+            <p:cNvPr id="6" name="Rectangle 5"/>
+            <p:cNvSpPr/>
+            <p:nvPr/>
+          </p:nvSpPr>
+          <p:spPr>
+            <a:xfrm>
+              <a:off x="4307500" y="2373212"/>
+              <a:ext cx="2743698" cy="809943"/>
+            </a:xfrm>
+            <a:prstGeom prst="rect">
+              <a:avLst/>
+            </a:prstGeom>
+            <a:pattFill prst="ltDnDiag">
+              <a:fgClr>
+                <a:schemeClr val="tx1">
+                  <a:lumMod val="75000"/>
+                  <a:lumOff val="25000"/>
+                </a:schemeClr>
+              </a:fgClr>
+              <a:bgClr>
+                <a:schemeClr val="bg1">
+                  <a:lumMod val="85000"/>
+                </a:schemeClr>
+              </a:bgClr>
+            </a:pattFill>
+            <a:ln>
+              <a:solidFill>
+                <a:schemeClr val="tx1"/>
+              </a:solidFill>
+            </a:ln>
+            <a:effectLst/>
+          </p:spPr>
+          <p:style>
+            <a:lnRef idx="1">
+              <a:schemeClr val="accent1"/>
+            </a:lnRef>
+            <a:fillRef idx="3">
+              <a:schemeClr val="accent1"/>
+            </a:fillRef>
+            <a:effectRef idx="2">
+              <a:schemeClr val="accent1"/>
+            </a:effectRef>
+            <a:fontRef idx="minor">
+              <a:schemeClr val="lt1"/>
+            </a:fontRef>
+          </p:style>
+          <p:txBody>
+            <a:bodyPr rtlCol="0" anchor="ctr"/>
+            <a:lstStyle/>
+            <a:p>
+              <a:pPr algn="ctr"/>
+              <a:endParaRPr lang="en-US"/>
+            </a:p>
+          </p:txBody>
+        </p:sp>
+        <p:sp>
+          <p:nvSpPr>
+            <p:cNvPr id="34" name="Rectangle 33"/>
+            <p:cNvSpPr/>
+            <p:nvPr/>
+          </p:nvSpPr>
+          <p:spPr>
+            <a:xfrm>
+              <a:off x="2869167" y="1740220"/>
+              <a:ext cx="4182031" cy="3950774"/>
+            </a:xfrm>
+            <a:prstGeom prst="rect">
+              <a:avLst/>
+            </a:prstGeom>
+            <a:noFill/>
+            <a:ln>
+              <a:solidFill>
+                <a:srgbClr val="0D0D0D"/>
+              </a:solidFill>
+            </a:ln>
+          </p:spPr>
+          <p:style>
+            <a:lnRef idx="1">
+              <a:schemeClr val="accent1"/>
+            </a:lnRef>
+            <a:fillRef idx="3">
+              <a:schemeClr val="accent1"/>
+            </a:fillRef>
+            <a:effectRef idx="2">
+              <a:schemeClr val="accent1"/>
+            </a:effectRef>
+            <a:fontRef idx="minor">
+              <a:schemeClr val="lt1"/>
+            </a:fontRef>
+          </p:style>
+          <p:txBody>
+            <a:bodyPr rtlCol="0" anchor="ctr"/>
+            <a:lstStyle/>
+            <a:p>
+              <a:pPr algn="ctr"/>
+              <a:endParaRPr lang="en-US"/>
+            </a:p>
+          </p:txBody>
+        </p:sp>
+        <p:sp>
+          <p:nvSpPr>
+            <p:cNvPr id="4" name="Oval 3"/>
+            <p:cNvSpPr/>
+            <p:nvPr/>
+          </p:nvSpPr>
+          <p:spPr>
+            <a:xfrm>
+              <a:off x="4513315" y="3737530"/>
+              <a:ext cx="1049104" cy="1049104"/>
+            </a:xfrm>
+            <a:prstGeom prst="ellipse">
+              <a:avLst/>
+            </a:prstGeom>
+            <a:solidFill>
+              <a:schemeClr val="tx1">
+                <a:lumMod val="65000"/>
+                <a:lumOff val="35000"/>
+              </a:schemeClr>
+            </a:solidFill>
+            <a:ln>
+              <a:solidFill>
+                <a:srgbClr val="0D0D0D"/>
+              </a:solidFill>
+            </a:ln>
+          </p:spPr>
+          <p:style>
+            <a:lnRef idx="1">
+              <a:schemeClr val="accent1"/>
+            </a:lnRef>
+            <a:fillRef idx="3">
+              <a:schemeClr val="accent1"/>
+            </a:fillRef>
+            <a:effectRef idx="2">
+              <a:schemeClr val="accent1"/>
+            </a:effectRef>
+            <a:fontRef idx="minor">
+              <a:schemeClr val="lt1"/>
+            </a:fontRef>
+          </p:style>
+          <p:txBody>
+            <a:bodyPr rtlCol="0" anchor="ctr"/>
+            <a:lstStyle/>
+            <a:p>
+              <a:pPr algn="ctr"/>
+              <a:endParaRPr lang="en-US"/>
+            </a:p>
+          </p:txBody>
+        </p:sp>
+        <p:sp>
+          <p:nvSpPr>
+            <p:cNvPr id="32" name="Rectangle 31"/>
+            <p:cNvSpPr/>
+            <p:nvPr/>
+          </p:nvSpPr>
+          <p:spPr>
+            <a:xfrm>
+              <a:off x="6381498" y="2783045"/>
+              <a:ext cx="669700" cy="400110"/>
+            </a:xfrm>
+            <a:prstGeom prst="rect">
+              <a:avLst/>
+            </a:prstGeom>
+          </p:spPr>
+          <p:txBody>
+            <a:bodyPr wrap="none">
+              <a:spAutoFit/>
+            </a:bodyPr>
+            <a:lstStyle/>
+            <a:p>
+              <a:r>
+                <a:rPr lang="en-US" sz="2000" b="1" dirty="0" smtClean="0"/>
+                <a:t>Wall</a:t>
+              </a:r>
+              <a:endParaRPr lang="en-US" sz="2000" b="1" dirty="0"/>
+            </a:p>
+          </p:txBody>
+        </p:sp>
+        <p:sp>
+          <p:nvSpPr>
+            <p:cNvPr id="33" name="Rectangle 32"/>
+            <p:cNvSpPr/>
+            <p:nvPr/>
+          </p:nvSpPr>
+          <p:spPr>
+            <a:xfrm>
+              <a:off x="4622439" y="4775508"/>
+              <a:ext cx="829499" cy="400110"/>
+            </a:xfrm>
+            <a:prstGeom prst="rect">
+              <a:avLst/>
+            </a:prstGeom>
+          </p:spPr>
+          <p:txBody>
+            <a:bodyPr wrap="none">
+              <a:spAutoFit/>
+            </a:bodyPr>
+            <a:lstStyle/>
+            <a:p>
+              <a:r>
+                <a:rPr lang="en-US" sz="2000" dirty="0" smtClean="0"/>
+                <a:t>Drone</a:t>
+              </a:r>
+              <a:endParaRPr lang="en-US" sz="2000" dirty="0"/>
+            </a:p>
+          </p:txBody>
+        </p:sp>
+        <p:sp>
+          <p:nvSpPr>
+            <p:cNvPr id="20" name="Multiply 19"/>
+            <p:cNvSpPr/>
+            <p:nvPr/>
+          </p:nvSpPr>
+          <p:spPr>
+            <a:xfrm>
+              <a:off x="6112115" y="588246"/>
+              <a:ext cx="538763" cy="538763"/>
+            </a:xfrm>
+            <a:prstGeom prst="mathMultiply">
+              <a:avLst>
+                <a:gd name="adj1" fmla="val 9481"/>
+              </a:avLst>
+            </a:prstGeom>
+            <a:solidFill>
+              <a:srgbClr val="BB0093"/>
+            </a:solidFill>
+            <a:ln>
+              <a:solidFill>
+                <a:srgbClr val="BB0093"/>
+              </a:solidFill>
+            </a:ln>
+            <a:effectLst/>
+          </p:spPr>
+          <p:style>
+            <a:lnRef idx="1">
+              <a:schemeClr val="accent1"/>
+            </a:lnRef>
+            <a:fillRef idx="3">
+              <a:schemeClr val="accent1"/>
+            </a:fillRef>
+            <a:effectRef idx="2">
+              <a:schemeClr val="accent1"/>
+            </a:effectRef>
+            <a:fontRef idx="minor">
+              <a:schemeClr val="lt1"/>
+            </a:fontRef>
+          </p:style>
+          <p:txBody>
+            <a:bodyPr rtlCol="0" anchor="ctr"/>
+            <a:lstStyle/>
+            <a:p>
+              <a:pPr algn="ctr"/>
+              <a:endParaRPr lang="en-US"/>
+            </a:p>
+          </p:txBody>
+        </p:sp>
+        <p:sp>
+          <p:nvSpPr>
+            <p:cNvPr id="36" name="Rectangle 35"/>
+            <p:cNvSpPr/>
+            <p:nvPr/>
+          </p:nvSpPr>
+          <p:spPr>
+            <a:xfrm>
+              <a:off x="6027202" y="188136"/>
+              <a:ext cx="1352729" cy="400110"/>
+            </a:xfrm>
+            <a:prstGeom prst="rect">
+              <a:avLst/>
+            </a:prstGeom>
+          </p:spPr>
+          <p:txBody>
+            <a:bodyPr wrap="none">
+              <a:spAutoFit/>
+            </a:bodyPr>
+            <a:lstStyle/>
+            <a:p>
+              <a:r>
+                <a:rPr lang="en-US" sz="2000" dirty="0" smtClean="0"/>
+                <a:t>Global goal</a:t>
+              </a:r>
+              <a:endParaRPr lang="en-US" sz="2000" dirty="0"/>
+            </a:p>
+          </p:txBody>
+        </p:sp>
+        <p:cxnSp>
+          <p:nvCxnSpPr>
+            <p:cNvPr id="24" name="Straight Connector 23"/>
+            <p:cNvCxnSpPr/>
+            <p:nvPr/>
+          </p:nvCxnSpPr>
+          <p:spPr>
+            <a:xfrm flipH="1" flipV="1">
+              <a:off x="3870337" y="3183156"/>
+              <a:ext cx="1162464" cy="1061572"/>
+            </a:xfrm>
+            <a:prstGeom prst="line">
+              <a:avLst/>
+            </a:prstGeom>
+            <a:ln w="12700" cmpd="sng">
+              <a:solidFill>
+                <a:srgbClr val="000000"/>
+              </a:solidFill>
+              <a:prstDash val="dash"/>
+            </a:ln>
+            <a:effectLst/>
+          </p:spPr>
+          <p:style>
+            <a:lnRef idx="2">
+              <a:schemeClr val="accent1"/>
+            </a:lnRef>
+            <a:fillRef idx="0">
+              <a:schemeClr val="accent1"/>
+            </a:fillRef>
+            <a:effectRef idx="1">
+              <a:schemeClr val="accent1"/>
+            </a:effectRef>
+            <a:fontRef idx="minor">
+              <a:schemeClr val="tx1"/>
+            </a:fontRef>
+          </p:style>
+        </p:cxnSp>
+        <p:cxnSp>
+          <p:nvCxnSpPr>
+            <p:cNvPr id="27" name="Straight Connector 26"/>
+            <p:cNvCxnSpPr>
+              <a:endCxn id="17" idx="2"/>
+            </p:cNvCxnSpPr>
+            <p:nvPr/>
+          </p:nvCxnSpPr>
+          <p:spPr>
+            <a:xfrm flipH="1" flipV="1">
+              <a:off x="4064729" y="2242478"/>
+              <a:ext cx="968072" cy="2002251"/>
+            </a:xfrm>
+            <a:prstGeom prst="line">
+              <a:avLst/>
+            </a:prstGeom>
+            <a:ln w="12700" cmpd="sng">
+              <a:solidFill>
+                <a:srgbClr val="000000"/>
+              </a:solidFill>
+              <a:prstDash val="dash"/>
+            </a:ln>
+            <a:effectLst/>
+          </p:spPr>
+          <p:style>
+            <a:lnRef idx="2">
+              <a:schemeClr val="accent1"/>
+            </a:lnRef>
+            <a:fillRef idx="0">
+              <a:schemeClr val="accent1"/>
+            </a:fillRef>
+            <a:effectRef idx="1">
+              <a:schemeClr val="accent1"/>
+            </a:effectRef>
+            <a:fontRef idx="minor">
+              <a:schemeClr val="tx1"/>
+            </a:fontRef>
+          </p:style>
+        </p:cxnSp>
+        <p:cxnSp>
+          <p:nvCxnSpPr>
+            <p:cNvPr id="30" name="Straight Connector 29"/>
+            <p:cNvCxnSpPr/>
+            <p:nvPr/>
+          </p:nvCxnSpPr>
+          <p:spPr>
+            <a:xfrm flipH="1" flipV="1">
+              <a:off x="4715311" y="1740220"/>
+              <a:ext cx="317490" cy="2504508"/>
+            </a:xfrm>
+            <a:prstGeom prst="line">
+              <a:avLst/>
+            </a:prstGeom>
+            <a:ln w="12700" cmpd="sng">
+              <a:solidFill>
+                <a:srgbClr val="000000"/>
+              </a:solidFill>
+              <a:prstDash val="dash"/>
+            </a:ln>
+            <a:effectLst/>
+          </p:spPr>
+          <p:style>
+            <a:lnRef idx="2">
+              <a:schemeClr val="accent1"/>
+            </a:lnRef>
+            <a:fillRef idx="0">
+              <a:schemeClr val="accent1"/>
+            </a:fillRef>
+            <a:effectRef idx="1">
+              <a:schemeClr val="accent1"/>
+            </a:effectRef>
+            <a:fontRef idx="minor">
+              <a:schemeClr val="tx1"/>
+            </a:fontRef>
+          </p:style>
+        </p:cxnSp>
+        <p:sp>
+          <p:nvSpPr>
+            <p:cNvPr id="31" name="Up Arrow 30"/>
+            <p:cNvSpPr/>
+            <p:nvPr/>
+          </p:nvSpPr>
+          <p:spPr>
+            <a:xfrm rot="20866513">
+              <a:off x="4512998" y="1357986"/>
+              <a:ext cx="316291" cy="352746"/>
+            </a:xfrm>
+            <a:prstGeom prst="upArrow">
+              <a:avLst>
+                <a:gd name="adj1" fmla="val 14871"/>
+                <a:gd name="adj2" fmla="val 53718"/>
+              </a:avLst>
+            </a:prstGeom>
+            <a:solidFill>
+              <a:schemeClr val="tx1"/>
+            </a:solidFill>
+            <a:ln>
+              <a:solidFill>
+                <a:schemeClr val="tx1"/>
+              </a:solidFill>
+            </a:ln>
+            <a:effectLst/>
+          </p:spPr>
+          <p:style>
+            <a:lnRef idx="1">
+              <a:schemeClr val="accent1"/>
+            </a:lnRef>
+            <a:fillRef idx="3">
+              <a:schemeClr val="accent1"/>
+            </a:fillRef>
+            <a:effectRef idx="2">
+              <a:schemeClr val="accent1"/>
+            </a:effectRef>
+            <a:fontRef idx="minor">
+              <a:schemeClr val="lt1"/>
+            </a:fontRef>
+          </p:style>
+          <p:txBody>
+            <a:bodyPr rtlCol="0" anchor="ctr"/>
+            <a:lstStyle/>
+            <a:p>
+              <a:pPr algn="ctr"/>
+              <a:endParaRPr lang="en-US"/>
+            </a:p>
+          </p:txBody>
+        </p:sp>
+        <p:sp>
+          <p:nvSpPr>
+            <p:cNvPr id="37" name="Up Arrow 36"/>
+            <p:cNvSpPr/>
+            <p:nvPr/>
+          </p:nvSpPr>
+          <p:spPr>
+            <a:xfrm rot="20086854">
+              <a:off x="3831171" y="1897952"/>
+              <a:ext cx="316291" cy="352746"/>
+            </a:xfrm>
+            <a:prstGeom prst="upArrow">
+              <a:avLst>
+                <a:gd name="adj1" fmla="val 14871"/>
+                <a:gd name="adj2" fmla="val 53718"/>
+              </a:avLst>
+            </a:prstGeom>
+            <a:solidFill>
+              <a:schemeClr val="tx1"/>
+            </a:solidFill>
+            <a:ln>
+              <a:solidFill>
+                <a:schemeClr val="tx1"/>
+              </a:solidFill>
+            </a:ln>
+            <a:effectLst/>
+          </p:spPr>
+          <p:style>
+            <a:lnRef idx="1">
+              <a:schemeClr val="accent1"/>
+            </a:lnRef>
+            <a:fillRef idx="3">
+              <a:schemeClr val="accent1"/>
+            </a:fillRef>
+            <a:effectRef idx="2">
+              <a:schemeClr val="accent1"/>
+            </a:effectRef>
+            <a:fontRef idx="minor">
+              <a:schemeClr val="lt1"/>
+            </a:fontRef>
+          </p:style>
+          <p:txBody>
+            <a:bodyPr rtlCol="0" anchor="ctr"/>
+            <a:lstStyle/>
+            <a:p>
+              <a:pPr algn="ctr"/>
+              <a:endParaRPr lang="en-US"/>
+            </a:p>
+          </p:txBody>
+        </p:sp>
+        <p:sp>
+          <p:nvSpPr>
+            <p:cNvPr id="38" name="Up Arrow 37"/>
+            <p:cNvSpPr/>
+            <p:nvPr/>
+          </p:nvSpPr>
+          <p:spPr>
+            <a:xfrm rot="18531616">
+              <a:off x="3641636" y="2936235"/>
+              <a:ext cx="316291" cy="352746"/>
+            </a:xfrm>
+            <a:prstGeom prst="upArrow">
+              <a:avLst>
+                <a:gd name="adj1" fmla="val 14871"/>
+                <a:gd name="adj2" fmla="val 53718"/>
+              </a:avLst>
+            </a:prstGeom>
+            <a:solidFill>
+              <a:schemeClr val="tx1"/>
+            </a:solidFill>
+            <a:ln>
+              <a:solidFill>
+                <a:schemeClr val="tx1"/>
+              </a:solidFill>
+            </a:ln>
+            <a:effectLst/>
+          </p:spPr>
+          <p:style>
+            <a:lnRef idx="1">
+              <a:schemeClr val="accent1"/>
+            </a:lnRef>
+            <a:fillRef idx="3">
+              <a:schemeClr val="accent1"/>
+            </a:fillRef>
+            <a:effectRef idx="2">
+              <a:schemeClr val="accent1"/>
+            </a:effectRef>
+            <a:fontRef idx="minor">
+              <a:schemeClr val="lt1"/>
+            </a:fontRef>
+          </p:style>
+          <p:txBody>
+            <a:bodyPr rtlCol="0" anchor="ctr"/>
+            <a:lstStyle/>
+            <a:p>
+              <a:pPr algn="ctr"/>
+              <a:endParaRPr lang="en-US"/>
+            </a:p>
+          </p:txBody>
+        </p:sp>
+        <p:sp>
+          <p:nvSpPr>
+            <p:cNvPr id="39" name="Rectangle 38"/>
+            <p:cNvSpPr/>
+            <p:nvPr/>
+          </p:nvSpPr>
+          <p:spPr>
+            <a:xfrm>
+              <a:off x="3193970" y="940022"/>
+              <a:ext cx="1213593" cy="400110"/>
+            </a:xfrm>
+            <a:prstGeom prst="rect">
+              <a:avLst/>
+            </a:prstGeom>
+          </p:spPr>
+          <p:txBody>
+            <a:bodyPr wrap="none">
+              <a:spAutoFit/>
+            </a:bodyPr>
+            <a:lstStyle/>
+            <a:p>
+              <a:r>
+                <a:rPr lang="en-US" sz="2000" dirty="0" smtClean="0"/>
+                <a:t>Local goal</a:t>
+              </a:r>
+              <a:endParaRPr lang="en-US" sz="2000" dirty="0"/>
+            </a:p>
+          </p:txBody>
+        </p:sp>
+        <p:cxnSp>
+          <p:nvCxnSpPr>
+            <p:cNvPr id="40" name="Straight Connector 39"/>
+            <p:cNvCxnSpPr/>
+            <p:nvPr/>
+          </p:nvCxnSpPr>
+          <p:spPr>
+            <a:xfrm flipH="1" flipV="1">
+              <a:off x="4064729" y="3915498"/>
+              <a:ext cx="968072" cy="329232"/>
+            </a:xfrm>
+            <a:prstGeom prst="line">
+              <a:avLst/>
+            </a:prstGeom>
+            <a:ln w="12700" cmpd="sng">
+              <a:solidFill>
+                <a:srgbClr val="000000"/>
+              </a:solidFill>
+              <a:prstDash val="dash"/>
+            </a:ln>
+            <a:effectLst/>
+          </p:spPr>
+          <p:style>
+            <a:lnRef idx="2">
+              <a:schemeClr val="accent1"/>
+            </a:lnRef>
+            <a:fillRef idx="0">
+              <a:schemeClr val="accent1"/>
+            </a:fillRef>
+            <a:effectRef idx="1">
+              <a:schemeClr val="accent1"/>
+            </a:effectRef>
+            <a:fontRef idx="minor">
+              <a:schemeClr val="tx1"/>
+            </a:fontRef>
+          </p:style>
+        </p:cxnSp>
+        <p:sp>
+          <p:nvSpPr>
+            <p:cNvPr id="47" name="Up Arrow 46"/>
+            <p:cNvSpPr/>
+            <p:nvPr/>
+          </p:nvSpPr>
+          <p:spPr>
+            <a:xfrm rot="17413983">
+              <a:off x="3805796" y="3703852"/>
+              <a:ext cx="316291" cy="352746"/>
+            </a:xfrm>
+            <a:prstGeom prst="upArrow">
+              <a:avLst>
+                <a:gd name="adj1" fmla="val 14871"/>
+                <a:gd name="adj2" fmla="val 53718"/>
+              </a:avLst>
+            </a:prstGeom>
+            <a:solidFill>
+              <a:schemeClr val="tx1"/>
+            </a:solidFill>
+            <a:ln>
+              <a:solidFill>
+                <a:schemeClr val="tx1"/>
+              </a:solidFill>
+            </a:ln>
+            <a:effectLst/>
+          </p:spPr>
+          <p:style>
+            <a:lnRef idx="1">
+              <a:schemeClr val="accent1"/>
+            </a:lnRef>
+            <a:fillRef idx="3">
+              <a:schemeClr val="accent1"/>
+            </a:fillRef>
+            <a:effectRef idx="2">
+              <a:schemeClr val="accent1"/>
+            </a:effectRef>
+            <a:fontRef idx="minor">
+              <a:schemeClr val="lt1"/>
+            </a:fontRef>
+          </p:style>
+          <p:txBody>
+            <a:bodyPr rtlCol="0" anchor="ctr"/>
+            <a:lstStyle/>
+            <a:p>
+              <a:pPr algn="ctr"/>
+              <a:endParaRPr lang="en-US"/>
+            </a:p>
+          </p:txBody>
+        </p:sp>
+      </p:grpSp>
+    </p:spTree>
+    <p:extLst>
+      <p:ext uri="{BB962C8B-B14F-4D97-AF65-F5344CB8AC3E}">
+        <p14:creationId xmlns:p14="http://schemas.microsoft.com/office/powerpoint/2010/main" val="939857951"/>
+      </p:ext>
+    </p:extLst>
+  </p:cSld>
+  <p:clrMapOvr>
+    <a:masterClrMapping/>
+  </p:clrMapOvr>
+</p:sld>
+</file>
+
+<file path=ppt/slides/slide8.xml><?xml version="1.0" encoding="utf-8"?>
+<p:sld xmlns:a="http://schemas.openxmlformats.org/drawingml/2006/main" xmlns:r="http://schemas.openxmlformats.org/officeDocument/2006/relationships" xmlns:p="http://schemas.openxmlformats.org/presentationml/2006/main">
+  <p:cSld>
+    <p:spTree>
+      <p:nvGrpSpPr>
+        <p:cNvPr id="1" name=""/>
+        <p:cNvGrpSpPr/>
+        <p:nvPr/>
+      </p:nvGrpSpPr>
+      <p:grpSpPr>
+        <a:xfrm>
+          <a:off x="0" y="0"/>
+          <a:ext cx="0" cy="0"/>
+          <a:chOff x="0" y="0"/>
+          <a:chExt cx="0" cy="0"/>
+        </a:xfrm>
+      </p:grpSpPr>
+      <p:grpSp>
+        <p:nvGrpSpPr>
+          <p:cNvPr id="33" name="Group 32"/>
+          <p:cNvGrpSpPr/>
+          <p:nvPr/>
+        </p:nvGrpSpPr>
+        <p:grpSpPr>
+          <a:xfrm>
+            <a:off x="1821281" y="1086249"/>
+            <a:ext cx="5229917" cy="4111041"/>
+            <a:chOff x="1821281" y="1086249"/>
+            <a:chExt cx="5229917" cy="4111041"/>
+          </a:xfrm>
+        </p:grpSpPr>
+        <p:sp>
+          <p:nvSpPr>
+            <p:cNvPr id="21" name="Rectangle 20"/>
+            <p:cNvSpPr/>
+            <p:nvPr/>
+          </p:nvSpPr>
+          <p:spPr>
+            <a:xfrm flipH="1" flipV="1">
+              <a:off x="1838494" y="1086249"/>
+              <a:ext cx="2183041" cy="1665181"/>
+            </a:xfrm>
+            <a:prstGeom prst="rect">
+              <a:avLst/>
+            </a:prstGeom>
+            <a:pattFill prst="ltDnDiag">
+              <a:fgClr>
+                <a:schemeClr val="tx1">
+                  <a:lumMod val="75000"/>
+                  <a:lumOff val="25000"/>
+                </a:schemeClr>
+              </a:fgClr>
+              <a:bgClr>
+                <a:schemeClr val="bg1">
+                  <a:lumMod val="85000"/>
+                </a:schemeClr>
+              </a:bgClr>
+            </a:pattFill>
+            <a:ln>
+              <a:noFill/>
+            </a:ln>
+            <a:effectLst/>
+          </p:spPr>
+          <p:style>
+            <a:lnRef idx="1">
+              <a:schemeClr val="accent1"/>
+            </a:lnRef>
+            <a:fillRef idx="3">
+              <a:schemeClr val="accent1"/>
+            </a:fillRef>
+            <a:effectRef idx="2">
+              <a:schemeClr val="accent1"/>
+            </a:effectRef>
+            <a:fontRef idx="minor">
+              <a:schemeClr val="lt1"/>
+            </a:fontRef>
+          </p:style>
+          <p:txBody>
+            <a:bodyPr rtlCol="0" anchor="ctr"/>
+            <a:lstStyle/>
+            <a:p>
+              <a:pPr algn="ctr"/>
+              <a:endParaRPr lang="en-US"/>
+            </a:p>
+          </p:txBody>
+        </p:sp>
+        <p:sp>
+          <p:nvSpPr>
+            <p:cNvPr id="7" name="Rectangle 6"/>
+            <p:cNvSpPr/>
+            <p:nvPr/>
+          </p:nvSpPr>
+          <p:spPr>
+            <a:xfrm>
+              <a:off x="1821281" y="1086250"/>
+              <a:ext cx="5229917" cy="4111040"/>
+            </a:xfrm>
+            <a:prstGeom prst="rect">
+              <a:avLst/>
+            </a:prstGeom>
+            <a:noFill/>
+            <a:ln>
+              <a:solidFill>
+                <a:srgbClr val="0D0D0D"/>
+              </a:solidFill>
+            </a:ln>
+          </p:spPr>
+          <p:style>
+            <a:lnRef idx="1">
+              <a:schemeClr val="accent1"/>
+            </a:lnRef>
+            <a:fillRef idx="3">
+              <a:schemeClr val="accent1"/>
+            </a:fillRef>
+            <a:effectRef idx="2">
+              <a:schemeClr val="accent1"/>
+            </a:effectRef>
+            <a:fontRef idx="minor">
+              <a:schemeClr val="lt1"/>
+            </a:fontRef>
+          </p:style>
+          <p:txBody>
+            <a:bodyPr rtlCol="0" anchor="ctr"/>
+            <a:lstStyle/>
+            <a:p>
+              <a:pPr algn="ctr"/>
+              <a:endParaRPr lang="en-US"/>
+            </a:p>
+          </p:txBody>
+        </p:sp>
+        <p:sp>
+          <p:nvSpPr>
+            <p:cNvPr id="8" name="Oval 7"/>
+            <p:cNvSpPr/>
+            <p:nvPr/>
+          </p:nvSpPr>
+          <p:spPr>
+            <a:xfrm>
+              <a:off x="2636882" y="3748656"/>
+              <a:ext cx="1049104" cy="1049104"/>
+            </a:xfrm>
+            <a:prstGeom prst="ellipse">
+              <a:avLst/>
+            </a:prstGeom>
+            <a:solidFill>
+              <a:schemeClr val="tx1">
+                <a:lumMod val="65000"/>
+                <a:lumOff val="35000"/>
+              </a:schemeClr>
+            </a:solidFill>
+            <a:ln>
+              <a:solidFill>
+                <a:srgbClr val="0D0D0D"/>
+              </a:solidFill>
+            </a:ln>
+          </p:spPr>
+          <p:style>
+            <a:lnRef idx="1">
+              <a:schemeClr val="accent1"/>
+            </a:lnRef>
+            <a:fillRef idx="3">
+              <a:schemeClr val="accent1"/>
+            </a:fillRef>
+            <a:effectRef idx="2">
+              <a:schemeClr val="accent1"/>
+            </a:effectRef>
+            <a:fontRef idx="minor">
+              <a:schemeClr val="lt1"/>
+            </a:fontRef>
+          </p:style>
+          <p:txBody>
+            <a:bodyPr rtlCol="0" anchor="ctr"/>
+            <a:lstStyle/>
+            <a:p>
+              <a:pPr algn="ctr"/>
+              <a:endParaRPr lang="en-US"/>
+            </a:p>
+          </p:txBody>
+        </p:sp>
+        <p:cxnSp>
+          <p:nvCxnSpPr>
+            <p:cNvPr id="9" name="Straight Connector 8"/>
+            <p:cNvCxnSpPr/>
+            <p:nvPr/>
+          </p:nvCxnSpPr>
+          <p:spPr>
+            <a:xfrm flipV="1">
+              <a:off x="3186657" y="1086250"/>
+              <a:ext cx="3174898" cy="3229029"/>
+            </a:xfrm>
+            <a:prstGeom prst="line">
+              <a:avLst/>
+            </a:prstGeom>
+            <a:ln>
+              <a:solidFill>
+                <a:schemeClr val="tx1">
+                  <a:lumMod val="95000"/>
+                  <a:lumOff val="5000"/>
+                </a:schemeClr>
+              </a:solidFill>
+            </a:ln>
+            <a:effectLst/>
+          </p:spPr>
+          <p:style>
+            <a:lnRef idx="2">
+              <a:schemeClr val="accent1"/>
+            </a:lnRef>
+            <a:fillRef idx="0">
+              <a:schemeClr val="accent1"/>
+            </a:fillRef>
+            <a:effectRef idx="1">
+              <a:schemeClr val="accent1"/>
+            </a:effectRef>
+            <a:fontRef idx="minor">
+              <a:schemeClr val="tx1"/>
+            </a:fontRef>
+          </p:style>
+        </p:cxnSp>
+        <p:sp>
+          <p:nvSpPr>
+            <p:cNvPr id="16" name="Rectangle 15"/>
+            <p:cNvSpPr/>
+            <p:nvPr/>
+          </p:nvSpPr>
+          <p:spPr>
+            <a:xfrm>
+              <a:off x="2749050" y="4797180"/>
+              <a:ext cx="829499" cy="400110"/>
+            </a:xfrm>
+            <a:prstGeom prst="rect">
+              <a:avLst/>
+            </a:prstGeom>
+          </p:spPr>
+          <p:txBody>
+            <a:bodyPr wrap="none">
+              <a:spAutoFit/>
+            </a:bodyPr>
+            <a:lstStyle/>
+            <a:p>
+              <a:r>
+                <a:rPr lang="en-US" sz="2000" dirty="0" smtClean="0"/>
+                <a:t>Drone</a:t>
+              </a:r>
+              <a:endParaRPr lang="en-US" sz="2000" dirty="0"/>
+            </a:p>
+          </p:txBody>
+        </p:sp>
+        <p:sp>
+          <p:nvSpPr>
+            <p:cNvPr id="19" name="Oval 18"/>
+            <p:cNvSpPr/>
+            <p:nvPr/>
+          </p:nvSpPr>
+          <p:spPr>
+            <a:xfrm>
+              <a:off x="3894618" y="2567805"/>
+              <a:ext cx="1049104" cy="1049104"/>
+            </a:xfrm>
+            <a:prstGeom prst="ellipse">
+              <a:avLst/>
+            </a:prstGeom>
+            <a:noFill/>
+            <a:ln>
+              <a:solidFill>
+                <a:srgbClr val="0D0D0D"/>
+              </a:solidFill>
+              <a:prstDash val="dash"/>
+            </a:ln>
+          </p:spPr>
+          <p:style>
+            <a:lnRef idx="1">
+              <a:schemeClr val="accent1"/>
+            </a:lnRef>
+            <a:fillRef idx="3">
+              <a:schemeClr val="accent1"/>
+            </a:fillRef>
+            <a:effectRef idx="2">
+              <a:schemeClr val="accent1"/>
+            </a:effectRef>
+            <a:fontRef idx="minor">
+              <a:schemeClr val="lt1"/>
+            </a:fontRef>
+          </p:style>
+          <p:txBody>
+            <a:bodyPr rtlCol="0" anchor="ctr"/>
+            <a:lstStyle/>
+            <a:p>
+              <a:pPr algn="ctr"/>
+              <a:endParaRPr lang="en-US"/>
+            </a:p>
+          </p:txBody>
+        </p:sp>
+        <p:sp>
+          <p:nvSpPr>
+            <p:cNvPr id="26" name="Rectangle 25"/>
+            <p:cNvSpPr/>
+            <p:nvPr/>
+          </p:nvSpPr>
+          <p:spPr>
+            <a:xfrm>
+              <a:off x="3685986" y="4146002"/>
+              <a:ext cx="1563549" cy="338554"/>
+            </a:xfrm>
+            <a:prstGeom prst="rect">
+              <a:avLst/>
+            </a:prstGeom>
+          </p:spPr>
+          <p:txBody>
+            <a:bodyPr wrap="none">
+              <a:spAutoFit/>
+            </a:bodyPr>
+            <a:lstStyle/>
+            <a:p>
+              <a:r>
+                <a:rPr lang="en-US" sz="1600" dirty="0" smtClean="0"/>
+                <a:t>Start from origin</a:t>
+              </a:r>
+              <a:endParaRPr lang="en-US" sz="1600" dirty="0"/>
+            </a:p>
+          </p:txBody>
+        </p:sp>
+        <p:sp>
+          <p:nvSpPr>
+            <p:cNvPr id="27" name="Rectangle 26"/>
+            <p:cNvSpPr/>
+            <p:nvPr/>
+          </p:nvSpPr>
+          <p:spPr>
+            <a:xfrm>
+              <a:off x="4959111" y="2920916"/>
+              <a:ext cx="1357764" cy="584776"/>
+            </a:xfrm>
+            <a:prstGeom prst="rect">
+              <a:avLst/>
+            </a:prstGeom>
+          </p:spPr>
+          <p:txBody>
+            <a:bodyPr wrap="none">
+              <a:spAutoFit/>
+            </a:bodyPr>
+            <a:lstStyle/>
+            <a:p>
+              <a:r>
+                <a:rPr lang="en-US" sz="1600" dirty="0" smtClean="0"/>
+                <a:t>Superimposes</a:t>
+              </a:r>
+            </a:p>
+            <a:p>
+              <a:r>
+                <a:rPr lang="en-US" sz="1600" dirty="0" smtClean="0"/>
+                <a:t>footprint</a:t>
+              </a:r>
+              <a:endParaRPr lang="en-US" sz="1600" dirty="0"/>
+            </a:p>
+          </p:txBody>
+        </p:sp>
+        <p:sp>
+          <p:nvSpPr>
+            <p:cNvPr id="30" name="Rectangle 29"/>
+            <p:cNvSpPr/>
+            <p:nvPr/>
+          </p:nvSpPr>
+          <p:spPr>
+            <a:xfrm>
+              <a:off x="2957042" y="2825932"/>
+              <a:ext cx="937576" cy="338554"/>
+            </a:xfrm>
+            <a:prstGeom prst="rect">
+              <a:avLst/>
+            </a:prstGeom>
+          </p:spPr>
+          <p:txBody>
+            <a:bodyPr wrap="none">
+              <a:spAutoFit/>
+            </a:bodyPr>
+            <a:lstStyle/>
+            <a:p>
+              <a:r>
+                <a:rPr lang="en-US" sz="1600" dirty="0" smtClean="0"/>
+                <a:t>Max cost</a:t>
+              </a:r>
+              <a:endParaRPr lang="en-US" sz="1600" dirty="0"/>
+            </a:p>
+          </p:txBody>
+        </p:sp>
+        <p:sp>
+          <p:nvSpPr>
+            <p:cNvPr id="31" name="Rectangle 30"/>
+            <p:cNvSpPr/>
+            <p:nvPr/>
+          </p:nvSpPr>
+          <p:spPr>
+            <a:xfrm>
+              <a:off x="1821281" y="2351320"/>
+              <a:ext cx="669700" cy="400110"/>
+            </a:xfrm>
+            <a:prstGeom prst="rect">
+              <a:avLst/>
+            </a:prstGeom>
+          </p:spPr>
+          <p:txBody>
+            <a:bodyPr wrap="none">
+              <a:spAutoFit/>
+            </a:bodyPr>
+            <a:lstStyle/>
+            <a:p>
+              <a:r>
+                <a:rPr lang="en-US" sz="2000" b="1" dirty="0" smtClean="0"/>
+                <a:t>Wall</a:t>
+              </a:r>
+              <a:endParaRPr lang="en-US" sz="2000" b="1" dirty="0"/>
+            </a:p>
+          </p:txBody>
+        </p:sp>
+      </p:grpSp>
+    </p:spTree>
+    <p:extLst>
+      <p:ext uri="{BB962C8B-B14F-4D97-AF65-F5344CB8AC3E}">
+        <p14:creationId xmlns:p14="http://schemas.microsoft.com/office/powerpoint/2010/main" val="1171071756"/>
+      </p:ext>
+    </p:extLst>
+  </p:cSld>
+  <p:clrMapOvr>
+    <a:masterClrMapping/>
+  </p:clrMapOvr>
+</p:sld>
+</file>
+
+<file path=ppt/slides/slide9.xml><?xml version="1.0" encoding="utf-8"?>
+<p:sld xmlns:a="http://schemas.openxmlformats.org/drawingml/2006/main" xmlns:r="http://schemas.openxmlformats.org/officeDocument/2006/relationships" xmlns:p="http://schemas.openxmlformats.org/presentationml/2006/main">
+  <p:cSld>
+    <p:spTree>
+      <p:nvGrpSpPr>
+        <p:cNvPr id="1" name=""/>
+        <p:cNvGrpSpPr/>
+        <p:nvPr/>
+      </p:nvGrpSpPr>
+      <p:grpSpPr>
+        <a:xfrm>
+          <a:off x="0" y="0"/>
+          <a:ext cx="0" cy="0"/>
+          <a:chOff x="0" y="0"/>
+          <a:chExt cx="0" cy="0"/>
+        </a:xfrm>
+      </p:grpSpPr>
+      <p:grpSp>
+        <p:nvGrpSpPr>
+          <p:cNvPr id="4" name="Group 3"/>
+          <p:cNvGrpSpPr/>
+          <p:nvPr/>
+        </p:nvGrpSpPr>
+        <p:grpSpPr>
+          <a:xfrm>
+            <a:off x="1821281" y="1086249"/>
+            <a:ext cx="5229917" cy="4111041"/>
+            <a:chOff x="1821281" y="1086249"/>
+            <a:chExt cx="5229917" cy="4111041"/>
+          </a:xfrm>
+        </p:grpSpPr>
+        <p:sp>
+          <p:nvSpPr>
+            <p:cNvPr id="21" name="Rectangle 20"/>
+            <p:cNvSpPr/>
+            <p:nvPr/>
+          </p:nvSpPr>
+          <p:spPr>
+            <a:xfrm flipH="1" flipV="1">
+              <a:off x="1838494" y="1086249"/>
+              <a:ext cx="2183041" cy="1665181"/>
+            </a:xfrm>
+            <a:prstGeom prst="rect">
+              <a:avLst/>
+            </a:prstGeom>
+            <a:pattFill prst="ltDnDiag">
+              <a:fgClr>
+                <a:schemeClr val="tx1">
+                  <a:lumMod val="75000"/>
+                  <a:lumOff val="25000"/>
+                </a:schemeClr>
+              </a:fgClr>
+              <a:bgClr>
+                <a:schemeClr val="bg1">
+                  <a:lumMod val="85000"/>
+                </a:schemeClr>
+              </a:bgClr>
+            </a:pattFill>
+            <a:ln>
+              <a:noFill/>
+            </a:ln>
+            <a:effectLst/>
+          </p:spPr>
+          <p:style>
+            <a:lnRef idx="1">
+              <a:schemeClr val="accent1"/>
+            </a:lnRef>
+            <a:fillRef idx="3">
+              <a:schemeClr val="accent1"/>
+            </a:fillRef>
+            <a:effectRef idx="2">
+              <a:schemeClr val="accent1"/>
+            </a:effectRef>
+            <a:fontRef idx="minor">
+              <a:schemeClr val="lt1"/>
+            </a:fontRef>
+          </p:style>
+          <p:txBody>
+            <a:bodyPr rtlCol="0" anchor="ctr"/>
+            <a:lstStyle/>
+            <a:p>
+              <a:pPr algn="ctr"/>
+              <a:endParaRPr lang="en-US"/>
+            </a:p>
+          </p:txBody>
+        </p:sp>
+        <p:sp>
+          <p:nvSpPr>
+            <p:cNvPr id="7" name="Rectangle 6"/>
+            <p:cNvSpPr/>
+            <p:nvPr/>
+          </p:nvSpPr>
+          <p:spPr>
+            <a:xfrm>
+              <a:off x="1821281" y="1086250"/>
+              <a:ext cx="5229917" cy="4111040"/>
+            </a:xfrm>
+            <a:prstGeom prst="rect">
+              <a:avLst/>
+            </a:prstGeom>
+            <a:noFill/>
+            <a:ln>
+              <a:solidFill>
+                <a:srgbClr val="0D0D0D"/>
+              </a:solidFill>
+            </a:ln>
+          </p:spPr>
+          <p:style>
+            <a:lnRef idx="1">
+              <a:schemeClr val="accent1"/>
+            </a:lnRef>
+            <a:fillRef idx="3">
+              <a:schemeClr val="accent1"/>
+            </a:fillRef>
+            <a:effectRef idx="2">
+              <a:schemeClr val="accent1"/>
+            </a:effectRef>
+            <a:fontRef idx="minor">
+              <a:schemeClr val="lt1"/>
+            </a:fontRef>
+          </p:style>
+          <p:txBody>
+            <a:bodyPr rtlCol="0" anchor="ctr"/>
+            <a:lstStyle/>
+            <a:p>
+              <a:pPr algn="ctr"/>
+              <a:endParaRPr lang="en-US"/>
+            </a:p>
+          </p:txBody>
+        </p:sp>
+        <p:sp>
+          <p:nvSpPr>
+            <p:cNvPr id="8" name="Oval 7"/>
+            <p:cNvSpPr/>
+            <p:nvPr/>
+          </p:nvSpPr>
+          <p:spPr>
+            <a:xfrm>
+              <a:off x="2636882" y="3748656"/>
+              <a:ext cx="1049104" cy="1049104"/>
+            </a:xfrm>
+            <a:prstGeom prst="ellipse">
+              <a:avLst/>
+            </a:prstGeom>
+            <a:solidFill>
+              <a:schemeClr val="tx1">
+                <a:lumMod val="65000"/>
+                <a:lumOff val="35000"/>
+              </a:schemeClr>
+            </a:solidFill>
+            <a:ln>
+              <a:solidFill>
+                <a:srgbClr val="0D0D0D"/>
+              </a:solidFill>
+            </a:ln>
+          </p:spPr>
+          <p:style>
+            <a:lnRef idx="1">
+              <a:schemeClr val="accent1"/>
+            </a:lnRef>
+            <a:fillRef idx="3">
+              <a:schemeClr val="accent1"/>
+            </a:fillRef>
+            <a:effectRef idx="2">
+              <a:schemeClr val="accent1"/>
+            </a:effectRef>
+            <a:fontRef idx="minor">
+              <a:schemeClr val="lt1"/>
+            </a:fontRef>
+          </p:style>
+          <p:txBody>
+            <a:bodyPr rtlCol="0" anchor="ctr"/>
+            <a:lstStyle/>
+            <a:p>
+              <a:pPr algn="ctr"/>
+              <a:endParaRPr lang="en-US"/>
+            </a:p>
+          </p:txBody>
+        </p:sp>
+        <p:cxnSp>
+          <p:nvCxnSpPr>
+            <p:cNvPr id="9" name="Straight Connector 8"/>
+            <p:cNvCxnSpPr>
+              <a:stCxn id="8" idx="7"/>
+            </p:cNvCxnSpPr>
+            <p:nvPr/>
+          </p:nvCxnSpPr>
+          <p:spPr>
+            <a:xfrm flipV="1">
+              <a:off x="3532348" y="1086251"/>
+              <a:ext cx="2829207" cy="2816043"/>
+            </a:xfrm>
+            <a:prstGeom prst="line">
+              <a:avLst/>
+            </a:prstGeom>
+            <a:ln>
+              <a:solidFill>
+                <a:schemeClr val="tx1">
+                  <a:lumMod val="95000"/>
+                  <a:lumOff val="5000"/>
+                </a:schemeClr>
+              </a:solidFill>
+            </a:ln>
+            <a:effectLst/>
+          </p:spPr>
+          <p:style>
+            <a:lnRef idx="2">
+              <a:schemeClr val="accent1"/>
+            </a:lnRef>
+            <a:fillRef idx="0">
+              <a:schemeClr val="accent1"/>
+            </a:fillRef>
+            <a:effectRef idx="1">
+              <a:schemeClr val="accent1"/>
+            </a:effectRef>
+            <a:fontRef idx="minor">
+              <a:schemeClr val="tx1"/>
+            </a:fontRef>
+          </p:style>
+        </p:cxnSp>
+        <p:sp>
+          <p:nvSpPr>
+            <p:cNvPr id="16" name="Rectangle 15"/>
+            <p:cNvSpPr/>
+            <p:nvPr/>
+          </p:nvSpPr>
+          <p:spPr>
+            <a:xfrm>
+              <a:off x="2749050" y="4797180"/>
+              <a:ext cx="829499" cy="400110"/>
+            </a:xfrm>
+            <a:prstGeom prst="rect">
+              <a:avLst/>
+            </a:prstGeom>
+          </p:spPr>
+          <p:txBody>
+            <a:bodyPr wrap="none">
+              <a:spAutoFit/>
+            </a:bodyPr>
+            <a:lstStyle/>
+            <a:p>
+              <a:r>
+                <a:rPr lang="en-US" sz="2000" dirty="0" smtClean="0"/>
+                <a:t>Drone</a:t>
+              </a:r>
+              <a:endParaRPr lang="en-US" sz="2000" dirty="0"/>
+            </a:p>
+          </p:txBody>
+        </p:sp>
+        <p:sp>
+          <p:nvSpPr>
+            <p:cNvPr id="26" name="Rectangle 25"/>
+            <p:cNvSpPr/>
+            <p:nvPr/>
+          </p:nvSpPr>
+          <p:spPr>
+            <a:xfrm>
+              <a:off x="3685986" y="4146002"/>
+              <a:ext cx="1835959" cy="338554"/>
+            </a:xfrm>
+            <a:prstGeom prst="rect">
+              <a:avLst/>
+            </a:prstGeom>
+          </p:spPr>
+          <p:txBody>
+            <a:bodyPr wrap="none">
+              <a:spAutoFit/>
+            </a:bodyPr>
+            <a:lstStyle/>
+            <a:p>
+              <a:r>
+                <a:rPr lang="en-US" sz="1600" dirty="0" smtClean="0"/>
+                <a:t>Start from footprint</a:t>
+              </a:r>
+              <a:endParaRPr lang="en-US" sz="1600" dirty="0"/>
+            </a:p>
+          </p:txBody>
+        </p:sp>
+        <p:sp>
+          <p:nvSpPr>
+            <p:cNvPr id="27" name="Rectangle 26"/>
+            <p:cNvSpPr/>
+            <p:nvPr/>
+          </p:nvSpPr>
+          <p:spPr>
+            <a:xfrm>
+              <a:off x="4665139" y="2920916"/>
+              <a:ext cx="1931138" cy="338554"/>
+            </a:xfrm>
+            <a:prstGeom prst="rect">
+              <a:avLst/>
+            </a:prstGeom>
+          </p:spPr>
+          <p:txBody>
+            <a:bodyPr wrap="none">
+              <a:spAutoFit/>
+            </a:bodyPr>
+            <a:lstStyle/>
+            <a:p>
+              <a:r>
+                <a:rPr lang="en-US" sz="1600" dirty="0" smtClean="0"/>
+                <a:t>Only considers origin</a:t>
+              </a:r>
+              <a:endParaRPr lang="en-US" sz="1600" dirty="0"/>
+            </a:p>
+          </p:txBody>
+        </p:sp>
+        <p:sp>
+          <p:nvSpPr>
+            <p:cNvPr id="31" name="Rectangle 30"/>
+            <p:cNvSpPr/>
+            <p:nvPr/>
+          </p:nvSpPr>
+          <p:spPr>
+            <a:xfrm>
+              <a:off x="1821281" y="2351320"/>
+              <a:ext cx="669700" cy="400110"/>
+            </a:xfrm>
+            <a:prstGeom prst="rect">
+              <a:avLst/>
+            </a:prstGeom>
+          </p:spPr>
+          <p:txBody>
+            <a:bodyPr wrap="none">
+              <a:spAutoFit/>
+            </a:bodyPr>
+            <a:lstStyle/>
+            <a:p>
+              <a:r>
+                <a:rPr lang="en-US" sz="2000" b="1" dirty="0" smtClean="0"/>
+                <a:t>Wall</a:t>
+              </a:r>
+              <a:endParaRPr lang="en-US" sz="2000" b="1" dirty="0"/>
+            </a:p>
+          </p:txBody>
+        </p:sp>
+        <p:sp>
+          <p:nvSpPr>
+            <p:cNvPr id="3" name="Rectangle 2"/>
+            <p:cNvSpPr/>
+            <p:nvPr/>
+          </p:nvSpPr>
+          <p:spPr>
+            <a:xfrm>
+              <a:off x="4233196" y="2963073"/>
+              <a:ext cx="235178" cy="235178"/>
+            </a:xfrm>
+            <a:prstGeom prst="rect">
+              <a:avLst/>
+            </a:prstGeom>
+            <a:solidFill>
+              <a:schemeClr val="tx1"/>
+            </a:solidFill>
+            <a:ln>
+              <a:noFill/>
+            </a:ln>
+          </p:spPr>
+          <p:style>
+            <a:lnRef idx="1">
+              <a:schemeClr val="accent1"/>
+            </a:lnRef>
+            <a:fillRef idx="3">
+              <a:schemeClr val="accent1"/>
+            </a:fillRef>
+            <a:effectRef idx="2">
+              <a:schemeClr val="accent1"/>
+            </a:effectRef>
+            <a:fontRef idx="minor">
+              <a:schemeClr val="lt1"/>
+            </a:fontRef>
+          </p:style>
+          <p:txBody>
+            <a:bodyPr rtlCol="0" anchor="ctr"/>
+            <a:lstStyle/>
+            <a:p>
+              <a:pPr algn="ctr"/>
+              <a:endParaRPr lang="en-US"/>
+            </a:p>
+          </p:txBody>
+        </p:sp>
+        <p:sp>
+          <p:nvSpPr>
+            <p:cNvPr id="14" name="Rectangle 13"/>
+            <p:cNvSpPr/>
+            <p:nvPr/>
+          </p:nvSpPr>
+          <p:spPr>
+            <a:xfrm>
+              <a:off x="3217198" y="2859697"/>
+              <a:ext cx="937576" cy="338554"/>
+            </a:xfrm>
+            <a:prstGeom prst="rect">
+              <a:avLst/>
+            </a:prstGeom>
+          </p:spPr>
+          <p:txBody>
+            <a:bodyPr wrap="none">
+              <a:spAutoFit/>
+            </a:bodyPr>
+            <a:lstStyle/>
+            <a:p>
+              <a:r>
+                <a:rPr lang="en-US" sz="1600" dirty="0" smtClean="0"/>
+                <a:t>Max cost</a:t>
+              </a:r>
+              <a:endParaRPr lang="en-US" sz="1600" dirty="0"/>
+            </a:p>
+          </p:txBody>
+        </p:sp>
+      </p:grpSp>
+    </p:spTree>
+    <p:extLst>
+      <p:ext uri="{BB962C8B-B14F-4D97-AF65-F5344CB8AC3E}">
+        <p14:creationId xmlns:p14="http://schemas.microsoft.com/office/powerpoint/2010/main" val="3140856674"/>
       </p:ext>
     </p:extLst>
   </p:cSld>

</xml_diff>

<commit_message>
Aded measurement data and some additional testing
</commit_message>
<xml_diff>
--- a/imgs/created_images.pptx
+++ b/imgs/created_images.pptx
@@ -3929,7 +3929,7 @@
       </p:grpSpPr>
       <p:grpSp>
         <p:nvGrpSpPr>
-          <p:cNvPr id="73" name="Group 72"/>
+          <p:cNvPr id="77" name="Group 76"/>
           <p:cNvGrpSpPr/>
           <p:nvPr/>
         </p:nvGrpSpPr>
@@ -3941,369 +3941,892 @@
             <a:chExt cx="7131168" cy="6907683"/>
           </a:xfrm>
         </p:grpSpPr>
+        <p:grpSp>
+          <p:nvGrpSpPr>
+            <p:cNvPr id="73" name="Group 72"/>
+            <p:cNvGrpSpPr/>
+            <p:nvPr/>
+          </p:nvGrpSpPr>
+          <p:grpSpPr>
+            <a:xfrm>
+              <a:off x="1059217" y="819366"/>
+              <a:ext cx="7131168" cy="6907683"/>
+              <a:chOff x="1059217" y="819366"/>
+              <a:chExt cx="7131168" cy="6907683"/>
+            </a:xfrm>
+          </p:grpSpPr>
+          <p:sp>
+            <p:nvSpPr>
+              <p:cNvPr id="15" name="Pie 14"/>
+              <p:cNvSpPr/>
+              <p:nvPr/>
+            </p:nvSpPr>
+            <p:spPr>
+              <a:xfrm>
+                <a:off x="1282702" y="819366"/>
+                <a:ext cx="6907683" cy="6907683"/>
+              </a:xfrm>
+              <a:prstGeom prst="pie">
+                <a:avLst>
+                  <a:gd name="adj1" fmla="val 10791208"/>
+                  <a:gd name="adj2" fmla="val 18313480"/>
+                </a:avLst>
+              </a:prstGeom>
+              <a:noFill/>
+              <a:ln>
+                <a:solidFill>
+                  <a:srgbClr val="000000"/>
+                </a:solidFill>
+                <a:prstDash val="dash"/>
+              </a:ln>
+              <a:effectLst/>
+            </p:spPr>
+            <p:style>
+              <a:lnRef idx="1">
+                <a:schemeClr val="accent1"/>
+              </a:lnRef>
+              <a:fillRef idx="3">
+                <a:schemeClr val="accent1"/>
+              </a:fillRef>
+              <a:effectRef idx="2">
+                <a:schemeClr val="accent1"/>
+              </a:effectRef>
+              <a:fontRef idx="minor">
+                <a:schemeClr val="lt1"/>
+              </a:fontRef>
+            </p:style>
+            <p:txBody>
+              <a:bodyPr rtlCol="0" anchor="ctr"/>
+              <a:lstStyle/>
+              <a:p>
+                <a:pPr algn="ctr"/>
+                <a:endParaRPr lang="en-US">
+                  <a:solidFill>
+                    <a:schemeClr val="tx1"/>
+                  </a:solidFill>
+                </a:endParaRPr>
+              </a:p>
+            </p:txBody>
+          </p:sp>
+          <p:sp>
+            <p:nvSpPr>
+              <p:cNvPr id="30" name="Pie 29"/>
+              <p:cNvSpPr/>
+              <p:nvPr/>
+            </p:nvSpPr>
+            <p:spPr>
+              <a:xfrm>
+                <a:off x="1537126" y="1073790"/>
+                <a:ext cx="6398835" cy="6398835"/>
+              </a:xfrm>
+              <a:prstGeom prst="pie">
+                <a:avLst>
+                  <a:gd name="adj1" fmla="val 10801243"/>
+                  <a:gd name="adj2" fmla="val 19937626"/>
+                </a:avLst>
+              </a:prstGeom>
+              <a:noFill/>
+              <a:ln>
+                <a:solidFill>
+                  <a:srgbClr val="000000"/>
+                </a:solidFill>
+              </a:ln>
+              <a:effectLst/>
+            </p:spPr>
+            <p:style>
+              <a:lnRef idx="1">
+                <a:schemeClr val="accent1"/>
+              </a:lnRef>
+              <a:fillRef idx="3">
+                <a:schemeClr val="accent1"/>
+              </a:fillRef>
+              <a:effectRef idx="2">
+                <a:schemeClr val="accent1"/>
+              </a:effectRef>
+              <a:fontRef idx="minor">
+                <a:schemeClr val="lt1"/>
+              </a:fontRef>
+            </p:style>
+            <p:txBody>
+              <a:bodyPr rtlCol="0" anchor="ctr"/>
+              <a:lstStyle/>
+              <a:p>
+                <a:pPr algn="ctr"/>
+                <a:endParaRPr lang="en-US">
+                  <a:solidFill>
+                    <a:schemeClr val="tx1"/>
+                  </a:solidFill>
+                </a:endParaRPr>
+              </a:p>
+            </p:txBody>
+          </p:sp>
+          <p:sp>
+            <p:nvSpPr>
+              <p:cNvPr id="31" name="Pie 30"/>
+              <p:cNvSpPr/>
+              <p:nvPr/>
+            </p:nvSpPr>
+            <p:spPr>
+              <a:xfrm>
+                <a:off x="1537126" y="1155095"/>
+                <a:ext cx="6391957" cy="6398835"/>
+              </a:xfrm>
+              <a:prstGeom prst="pie">
+                <a:avLst>
+                  <a:gd name="adj1" fmla="val 9756807"/>
+                  <a:gd name="adj2" fmla="val 20953935"/>
+                </a:avLst>
+              </a:prstGeom>
+              <a:solidFill>
+                <a:srgbClr val="FFFFFF"/>
+              </a:solidFill>
+              <a:ln>
+                <a:noFill/>
+              </a:ln>
+              <a:effectLst/>
+            </p:spPr>
+            <p:style>
+              <a:lnRef idx="1">
+                <a:schemeClr val="accent1"/>
+              </a:lnRef>
+              <a:fillRef idx="3">
+                <a:schemeClr val="accent1"/>
+              </a:fillRef>
+              <a:effectRef idx="2">
+                <a:schemeClr val="accent1"/>
+              </a:effectRef>
+              <a:fontRef idx="minor">
+                <a:schemeClr val="lt1"/>
+              </a:fontRef>
+            </p:style>
+            <p:txBody>
+              <a:bodyPr rtlCol="0" anchor="ctr"/>
+              <a:lstStyle/>
+              <a:p>
+                <a:pPr algn="ctr"/>
+                <a:endParaRPr lang="en-US">
+                  <a:solidFill>
+                    <a:schemeClr val="tx1"/>
+                  </a:solidFill>
+                </a:endParaRPr>
+              </a:p>
+            </p:txBody>
+          </p:sp>
+          <p:sp>
+            <p:nvSpPr>
+              <p:cNvPr id="4" name="Oval 3"/>
+              <p:cNvSpPr/>
+              <p:nvPr/>
+            </p:nvSpPr>
+            <p:spPr>
+              <a:xfrm>
+                <a:off x="4212572" y="3748656"/>
+                <a:ext cx="1049104" cy="1049104"/>
+              </a:xfrm>
+              <a:prstGeom prst="ellipse">
+                <a:avLst/>
+              </a:prstGeom>
+              <a:solidFill>
+                <a:srgbClr val="FFFFFF"/>
+              </a:solidFill>
+              <a:ln>
+                <a:solidFill>
+                  <a:srgbClr val="0D0D0D"/>
+                </a:solidFill>
+              </a:ln>
+              <a:effectLst/>
+            </p:spPr>
+            <p:style>
+              <a:lnRef idx="1">
+                <a:schemeClr val="accent1"/>
+              </a:lnRef>
+              <a:fillRef idx="3">
+                <a:schemeClr val="accent1"/>
+              </a:fillRef>
+              <a:effectRef idx="2">
+                <a:schemeClr val="accent1"/>
+              </a:effectRef>
+              <a:fontRef idx="minor">
+                <a:schemeClr val="lt1"/>
+              </a:fontRef>
+            </p:style>
+            <p:txBody>
+              <a:bodyPr rtlCol="0" anchor="ctr"/>
+              <a:lstStyle/>
+              <a:p>
+                <a:pPr algn="ctr"/>
+                <a:endParaRPr lang="en-US"/>
+              </a:p>
+            </p:txBody>
+          </p:sp>
+          <p:cxnSp>
+            <p:nvCxnSpPr>
+              <p:cNvPr id="19" name="Straight Connector 18"/>
+              <p:cNvCxnSpPr/>
+              <p:nvPr/>
+            </p:nvCxnSpPr>
+            <p:spPr>
+              <a:xfrm flipV="1">
+                <a:off x="1544004" y="1666240"/>
+                <a:ext cx="5045507" cy="2623103"/>
+              </a:xfrm>
+              <a:prstGeom prst="line">
+                <a:avLst/>
+              </a:prstGeom>
+              <a:ln w="12700" cmpd="sng">
+                <a:solidFill>
+                  <a:schemeClr val="tx1"/>
+                </a:solidFill>
+              </a:ln>
+              <a:effectLst/>
+            </p:spPr>
+            <p:style>
+              <a:lnRef idx="2">
+                <a:schemeClr val="accent1"/>
+              </a:lnRef>
+              <a:fillRef idx="0">
+                <a:schemeClr val="accent1"/>
+              </a:fillRef>
+              <a:effectRef idx="1">
+                <a:schemeClr val="accent1"/>
+              </a:effectRef>
+              <a:fontRef idx="minor">
+                <a:schemeClr val="tx1"/>
+              </a:fontRef>
+            </p:style>
+          </p:cxnSp>
+          <p:cxnSp>
+            <p:nvCxnSpPr>
+              <p:cNvPr id="29" name="Straight Connector 28"/>
+              <p:cNvCxnSpPr>
+                <a:stCxn id="4" idx="6"/>
+              </p:cNvCxnSpPr>
+              <p:nvPr/>
+            </p:nvCxnSpPr>
+            <p:spPr>
+              <a:xfrm flipH="1">
+                <a:off x="4736544" y="4273208"/>
+                <a:ext cx="525132" cy="0"/>
+              </a:xfrm>
+              <a:prstGeom prst="line">
+                <a:avLst/>
+              </a:prstGeom>
+              <a:ln w="12700" cmpd="sng">
+                <a:solidFill>
+                  <a:srgbClr val="000000"/>
+                </a:solidFill>
+                <a:prstDash val="dash"/>
+              </a:ln>
+              <a:effectLst/>
+            </p:spPr>
+            <p:style>
+              <a:lnRef idx="2">
+                <a:schemeClr val="accent1"/>
+              </a:lnRef>
+              <a:fillRef idx="0">
+                <a:schemeClr val="accent1"/>
+              </a:fillRef>
+              <a:effectRef idx="1">
+                <a:schemeClr val="accent1"/>
+              </a:effectRef>
+              <a:fontRef idx="minor">
+                <a:schemeClr val="tx1"/>
+              </a:fontRef>
+            </p:style>
+          </p:cxnSp>
+          <p:cxnSp>
+            <p:nvCxnSpPr>
+              <p:cNvPr id="35" name="Straight Connector 34"/>
+              <p:cNvCxnSpPr/>
+              <p:nvPr/>
+            </p:nvCxnSpPr>
+            <p:spPr>
+              <a:xfrm flipH="1" flipV="1">
+                <a:off x="3744366" y="3119169"/>
+                <a:ext cx="517878" cy="830531"/>
+              </a:xfrm>
+              <a:prstGeom prst="line">
+                <a:avLst/>
+              </a:prstGeom>
+              <a:ln w="12700" cmpd="sng">
+                <a:solidFill>
+                  <a:srgbClr val="000000"/>
+                </a:solidFill>
+                <a:prstDash val="dash"/>
+              </a:ln>
+              <a:effectLst/>
+            </p:spPr>
+            <p:style>
+              <a:lnRef idx="2">
+                <a:schemeClr val="accent1"/>
+              </a:lnRef>
+              <a:fillRef idx="0">
+                <a:schemeClr val="accent1"/>
+              </a:fillRef>
+              <a:effectRef idx="1">
+                <a:schemeClr val="accent1"/>
+              </a:effectRef>
+              <a:fontRef idx="minor">
+                <a:schemeClr val="tx1"/>
+              </a:fontRef>
+            </p:style>
+          </p:cxnSp>
+          <p:cxnSp>
+            <p:nvCxnSpPr>
+              <p:cNvPr id="38" name="Straight Connector 37"/>
+              <p:cNvCxnSpPr/>
+              <p:nvPr/>
+            </p:nvCxnSpPr>
+            <p:spPr>
+              <a:xfrm flipH="1">
+                <a:off x="4262244" y="3820160"/>
+                <a:ext cx="202720" cy="129540"/>
+              </a:xfrm>
+              <a:prstGeom prst="line">
+                <a:avLst/>
+              </a:prstGeom>
+              <a:ln w="12700" cmpd="sng">
+                <a:solidFill>
+                  <a:srgbClr val="000000"/>
+                </a:solidFill>
+                <a:prstDash val="solid"/>
+              </a:ln>
+              <a:effectLst/>
+            </p:spPr>
+            <p:style>
+              <a:lnRef idx="2">
+                <a:schemeClr val="accent1"/>
+              </a:lnRef>
+              <a:fillRef idx="0">
+                <a:schemeClr val="accent1"/>
+              </a:fillRef>
+              <a:effectRef idx="1">
+                <a:schemeClr val="accent1"/>
+              </a:effectRef>
+              <a:fontRef idx="minor">
+                <a:schemeClr val="tx1"/>
+              </a:fontRef>
+            </p:style>
+          </p:cxnSp>
+          <p:sp>
+            <p:nvSpPr>
+              <p:cNvPr id="13" name="Rectangle 12"/>
+              <p:cNvSpPr/>
+              <p:nvPr/>
+            </p:nvSpPr>
+            <p:spPr>
+              <a:xfrm>
+                <a:off x="4212572" y="3119169"/>
+                <a:ext cx="969574" cy="246221"/>
+              </a:xfrm>
+              <a:prstGeom prst="rect">
+                <a:avLst/>
+              </a:prstGeom>
+            </p:spPr>
+            <p:txBody>
+              <a:bodyPr wrap="none">
+                <a:spAutoFit/>
+              </a:bodyPr>
+              <a:lstStyle/>
+              <a:p>
+                <a:r>
+                  <a:rPr lang="en-US" sz="1000" dirty="0" smtClean="0"/>
+                  <a:t>Inflation radius</a:t>
+                </a:r>
+                <a:endParaRPr lang="en-US" sz="1000" dirty="0"/>
+              </a:p>
+            </p:txBody>
+          </p:sp>
+          <p:sp>
+            <p:nvSpPr>
+              <p:cNvPr id="16" name="Rectangle 15"/>
+              <p:cNvSpPr/>
+              <p:nvPr/>
+            </p:nvSpPr>
+            <p:spPr>
+              <a:xfrm>
+                <a:off x="4883250" y="4205815"/>
+                <a:ext cx="257427" cy="246221"/>
+              </a:xfrm>
+              <a:prstGeom prst="rect">
+                <a:avLst/>
+              </a:prstGeom>
+            </p:spPr>
+            <p:txBody>
+              <a:bodyPr wrap="none">
+                <a:spAutoFit/>
+              </a:bodyPr>
+              <a:lstStyle/>
+              <a:p>
+                <a:r>
+                  <a:rPr lang="en-US" sz="1000" dirty="0" smtClean="0"/>
+                  <a:t>α</a:t>
+                </a:r>
+                <a:endParaRPr lang="en-US" sz="1000" dirty="0"/>
+              </a:p>
+            </p:txBody>
+          </p:sp>
+          <p:sp>
+            <p:nvSpPr>
+              <p:cNvPr id="18" name="Rectangle 17"/>
+              <p:cNvSpPr/>
+              <p:nvPr/>
+            </p:nvSpPr>
+            <p:spPr>
+              <a:xfrm>
+                <a:off x="3824878" y="3503170"/>
+                <a:ext cx="238893" cy="246221"/>
+              </a:xfrm>
+              <a:prstGeom prst="rect">
+                <a:avLst/>
+              </a:prstGeom>
+            </p:spPr>
+            <p:txBody>
+              <a:bodyPr wrap="none">
+                <a:spAutoFit/>
+              </a:bodyPr>
+              <a:lstStyle/>
+              <a:p>
+                <a:r>
+                  <a:rPr lang="en-US" sz="1000" dirty="0"/>
+                  <a:t>c</a:t>
+                </a:r>
+                <a:endParaRPr lang="en-US" sz="1000" dirty="0"/>
+              </a:p>
+            </p:txBody>
+          </p:sp>
+          <p:sp>
+            <p:nvSpPr>
+              <p:cNvPr id="20" name="Rectangle 19"/>
+              <p:cNvSpPr/>
+              <p:nvPr/>
+            </p:nvSpPr>
+            <p:spPr>
+              <a:xfrm>
+                <a:off x="2253469" y="1420019"/>
+                <a:ext cx="252042" cy="246221"/>
+              </a:xfrm>
+              <a:prstGeom prst="rect">
+                <a:avLst/>
+              </a:prstGeom>
+            </p:spPr>
+            <p:txBody>
+              <a:bodyPr wrap="none">
+                <a:spAutoFit/>
+              </a:bodyPr>
+              <a:lstStyle/>
+              <a:p>
+                <a:r>
+                  <a:rPr lang="en-US" sz="1000" dirty="0" smtClean="0"/>
+                  <a:t>d</a:t>
+                </a:r>
+                <a:endParaRPr lang="en-US" sz="1000" dirty="0"/>
+              </a:p>
+            </p:txBody>
+          </p:sp>
+          <p:sp>
+            <p:nvSpPr>
+              <p:cNvPr id="27" name="Oval 26"/>
+              <p:cNvSpPr/>
+              <p:nvPr/>
+            </p:nvSpPr>
+            <p:spPr>
+              <a:xfrm>
+                <a:off x="1468433" y="4224173"/>
+                <a:ext cx="130340" cy="130340"/>
+              </a:xfrm>
+              <a:prstGeom prst="ellipse">
+                <a:avLst/>
+              </a:prstGeom>
+              <a:solidFill>
+                <a:schemeClr val="tx1"/>
+              </a:solidFill>
+              <a:ln>
+                <a:solidFill>
+                  <a:schemeClr val="tx1"/>
+                </a:solidFill>
+              </a:ln>
+              <a:effectLst/>
+            </p:spPr>
+            <p:style>
+              <a:lnRef idx="1">
+                <a:schemeClr val="accent1"/>
+              </a:lnRef>
+              <a:fillRef idx="3">
+                <a:schemeClr val="accent1"/>
+              </a:fillRef>
+              <a:effectRef idx="2">
+                <a:schemeClr val="accent1"/>
+              </a:effectRef>
+              <a:fontRef idx="minor">
+                <a:schemeClr val="lt1"/>
+              </a:fontRef>
+            </p:style>
+            <p:txBody>
+              <a:bodyPr rtlCol="0" anchor="ctr"/>
+              <a:lstStyle/>
+              <a:p>
+                <a:pPr algn="ctr"/>
+                <a:endParaRPr lang="en-US"/>
+              </a:p>
+            </p:txBody>
+          </p:sp>
+          <p:sp>
+            <p:nvSpPr>
+              <p:cNvPr id="36" name="Oval 35"/>
+              <p:cNvSpPr/>
+              <p:nvPr/>
+            </p:nvSpPr>
+            <p:spPr>
+              <a:xfrm>
+                <a:off x="7505156" y="2722887"/>
+                <a:ext cx="130340" cy="130340"/>
+              </a:xfrm>
+              <a:prstGeom prst="ellipse">
+                <a:avLst/>
+              </a:prstGeom>
+              <a:solidFill>
+                <a:schemeClr val="tx1"/>
+              </a:solidFill>
+              <a:ln>
+                <a:solidFill>
+                  <a:schemeClr val="tx1"/>
+                </a:solidFill>
+              </a:ln>
+              <a:effectLst/>
+            </p:spPr>
+            <p:style>
+              <a:lnRef idx="1">
+                <a:schemeClr val="accent1"/>
+              </a:lnRef>
+              <a:fillRef idx="3">
+                <a:schemeClr val="accent1"/>
+              </a:fillRef>
+              <a:effectRef idx="2">
+                <a:schemeClr val="accent1"/>
+              </a:effectRef>
+              <a:fontRef idx="minor">
+                <a:schemeClr val="lt1"/>
+              </a:fontRef>
+            </p:style>
+            <p:txBody>
+              <a:bodyPr rtlCol="0" anchor="ctr"/>
+              <a:lstStyle/>
+              <a:p>
+                <a:pPr algn="ctr"/>
+                <a:endParaRPr lang="en-US"/>
+              </a:p>
+            </p:txBody>
+          </p:sp>
+          <p:sp>
+            <p:nvSpPr>
+              <p:cNvPr id="37" name="Rectangle 36"/>
+              <p:cNvSpPr/>
+              <p:nvPr/>
+            </p:nvSpPr>
+            <p:spPr>
+              <a:xfrm>
+                <a:off x="1059217" y="4354513"/>
+                <a:ext cx="1034007" cy="246221"/>
+              </a:xfrm>
+              <a:prstGeom prst="rect">
+                <a:avLst/>
+              </a:prstGeom>
+            </p:spPr>
+            <p:txBody>
+              <a:bodyPr wrap="none">
+                <a:spAutoFit/>
+              </a:bodyPr>
+              <a:lstStyle/>
+              <a:p>
+                <a:r>
+                  <a:rPr lang="en-US" sz="1000" dirty="0" smtClean="0"/>
+                  <a:t>Current position</a:t>
+                </a:r>
+                <a:endParaRPr lang="en-US" sz="1000" dirty="0"/>
+              </a:p>
+            </p:txBody>
+          </p:sp>
+          <p:sp>
+            <p:nvSpPr>
+              <p:cNvPr id="39" name="Rectangle 38"/>
+              <p:cNvSpPr/>
+              <p:nvPr/>
+            </p:nvSpPr>
+            <p:spPr>
+              <a:xfrm>
+                <a:off x="7167263" y="2872948"/>
+                <a:ext cx="768698" cy="246221"/>
+              </a:xfrm>
+              <a:prstGeom prst="rect">
+                <a:avLst/>
+              </a:prstGeom>
+            </p:spPr>
+            <p:txBody>
+              <a:bodyPr wrap="none">
+                <a:spAutoFit/>
+              </a:bodyPr>
+              <a:lstStyle/>
+              <a:p>
+                <a:r>
+                  <a:rPr lang="en-US" sz="1000" dirty="0" smtClean="0"/>
+                  <a:t>Global goal</a:t>
+                </a:r>
+                <a:endParaRPr lang="en-US" sz="1000" dirty="0"/>
+              </a:p>
+            </p:txBody>
+          </p:sp>
+          <p:sp>
+            <p:nvSpPr>
+              <p:cNvPr id="40" name="Oval 39"/>
+              <p:cNvSpPr/>
+              <p:nvPr/>
+            </p:nvSpPr>
+            <p:spPr>
+              <a:xfrm>
+                <a:off x="4671374" y="4208038"/>
+                <a:ext cx="130340" cy="130340"/>
+              </a:xfrm>
+              <a:prstGeom prst="ellipse">
+                <a:avLst/>
+              </a:prstGeom>
+              <a:solidFill>
+                <a:schemeClr val="tx1"/>
+              </a:solidFill>
+              <a:ln>
+                <a:solidFill>
+                  <a:schemeClr val="tx1"/>
+                </a:solidFill>
+              </a:ln>
+              <a:effectLst/>
+            </p:spPr>
+            <p:style>
+              <a:lnRef idx="1">
+                <a:schemeClr val="accent1"/>
+              </a:lnRef>
+              <a:fillRef idx="3">
+                <a:schemeClr val="accent1"/>
+              </a:fillRef>
+              <a:effectRef idx="2">
+                <a:schemeClr val="accent1"/>
+              </a:effectRef>
+              <a:fontRef idx="minor">
+                <a:schemeClr val="lt1"/>
+              </a:fontRef>
+            </p:style>
+            <p:txBody>
+              <a:bodyPr rtlCol="0" anchor="ctr"/>
+              <a:lstStyle/>
+              <a:p>
+                <a:pPr algn="ctr"/>
+                <a:endParaRPr lang="en-US"/>
+              </a:p>
+            </p:txBody>
+          </p:sp>
+          <p:sp>
+            <p:nvSpPr>
+              <p:cNvPr id="72" name="Rectangle 71"/>
+              <p:cNvSpPr/>
+              <p:nvPr/>
+            </p:nvSpPr>
+            <p:spPr>
+              <a:xfrm rot="19823108">
+                <a:off x="3905652" y="3034763"/>
+                <a:ext cx="133350" cy="133350"/>
+              </a:xfrm>
+              <a:prstGeom prst="rect">
+                <a:avLst/>
+              </a:prstGeom>
+              <a:noFill/>
+              <a:ln>
+                <a:solidFill>
+                  <a:srgbClr val="000000"/>
+                </a:solidFill>
+              </a:ln>
+              <a:effectLst/>
+            </p:spPr>
+            <p:style>
+              <a:lnRef idx="1">
+                <a:schemeClr val="accent1"/>
+              </a:lnRef>
+              <a:fillRef idx="3">
+                <a:schemeClr val="accent1"/>
+              </a:fillRef>
+              <a:effectRef idx="2">
+                <a:schemeClr val="accent1"/>
+              </a:effectRef>
+              <a:fontRef idx="minor">
+                <a:schemeClr val="lt1"/>
+              </a:fontRef>
+            </p:style>
+            <p:txBody>
+              <a:bodyPr rtlCol="0" anchor="ctr"/>
+              <a:lstStyle/>
+              <a:p>
+                <a:pPr algn="ctr"/>
+                <a:endParaRPr lang="en-US"/>
+              </a:p>
+            </p:txBody>
+          </p:sp>
+          <p:sp>
+            <p:nvSpPr>
+              <p:cNvPr id="41" name="Rectangle 40"/>
+              <p:cNvSpPr/>
+              <p:nvPr/>
+            </p:nvSpPr>
+            <p:spPr>
+              <a:xfrm>
+                <a:off x="4275425" y="4308833"/>
+                <a:ext cx="638954" cy="246221"/>
+              </a:xfrm>
+              <a:prstGeom prst="rect">
+                <a:avLst/>
+              </a:prstGeom>
+            </p:spPr>
+            <p:txBody>
+              <a:bodyPr wrap="none">
+                <a:spAutoFit/>
+              </a:bodyPr>
+              <a:lstStyle/>
+              <a:p>
+                <a:r>
+                  <a:rPr lang="en-US" sz="1000" dirty="0" smtClean="0"/>
+                  <a:t>Obstacle</a:t>
+                </a:r>
+                <a:endParaRPr lang="en-US" sz="1000" dirty="0"/>
+              </a:p>
+            </p:txBody>
+          </p:sp>
+          <p:sp>
+            <p:nvSpPr>
+              <p:cNvPr id="51" name="Pie 50"/>
+              <p:cNvSpPr/>
+              <p:nvPr/>
+            </p:nvSpPr>
+            <p:spPr>
+              <a:xfrm>
+                <a:off x="4388749" y="3923243"/>
+                <a:ext cx="695590" cy="695590"/>
+              </a:xfrm>
+              <a:prstGeom prst="pie">
+                <a:avLst>
+                  <a:gd name="adj1" fmla="val 10761624"/>
+                  <a:gd name="adj2" fmla="val 14506145"/>
+                </a:avLst>
+              </a:prstGeom>
+              <a:noFill/>
+              <a:ln w="12700" cmpd="sng">
+                <a:solidFill>
+                  <a:schemeClr val="tx1"/>
+                </a:solidFill>
+                <a:prstDash val="dash"/>
+              </a:ln>
+              <a:effectLst/>
+            </p:spPr>
+            <p:style>
+              <a:lnRef idx="1">
+                <a:schemeClr val="accent1"/>
+              </a:lnRef>
+              <a:fillRef idx="3">
+                <a:schemeClr val="accent1"/>
+              </a:fillRef>
+              <a:effectRef idx="2">
+                <a:schemeClr val="accent1"/>
+              </a:effectRef>
+              <a:fontRef idx="minor">
+                <a:schemeClr val="lt1"/>
+              </a:fontRef>
+            </p:style>
+            <p:txBody>
+              <a:bodyPr rtlCol="0" anchor="ctr"/>
+              <a:lstStyle/>
+              <a:p>
+                <a:pPr algn="ctr"/>
+                <a:endParaRPr lang="en-US">
+                  <a:solidFill>
+                    <a:schemeClr val="tx1"/>
+                  </a:solidFill>
+                </a:endParaRPr>
+              </a:p>
+            </p:txBody>
+          </p:sp>
+          <p:sp>
+            <p:nvSpPr>
+              <p:cNvPr id="49" name="Rectangle 48"/>
+              <p:cNvSpPr/>
+              <p:nvPr/>
+            </p:nvSpPr>
+            <p:spPr>
+              <a:xfrm>
+                <a:off x="4413947" y="4024817"/>
+                <a:ext cx="257427" cy="246221"/>
+              </a:xfrm>
+              <a:prstGeom prst="rect">
+                <a:avLst/>
+              </a:prstGeom>
+            </p:spPr>
+            <p:txBody>
+              <a:bodyPr wrap="none">
+                <a:spAutoFit/>
+              </a:bodyPr>
+              <a:lstStyle/>
+              <a:p>
+                <a:r>
+                  <a:rPr lang="en-US" sz="1000" smtClean="0"/>
+                  <a:t>θ</a:t>
+                </a:r>
+                <a:endParaRPr lang="en-US" sz="1000" dirty="0"/>
+              </a:p>
+            </p:txBody>
+          </p:sp>
+          <p:cxnSp>
+            <p:nvCxnSpPr>
+              <p:cNvPr id="21" name="Straight Connector 20"/>
+              <p:cNvCxnSpPr/>
+              <p:nvPr/>
+            </p:nvCxnSpPr>
+            <p:spPr>
+              <a:xfrm>
+                <a:off x="3107080" y="1541124"/>
+                <a:ext cx="1373480" cy="2279036"/>
+              </a:xfrm>
+              <a:prstGeom prst="line">
+                <a:avLst/>
+              </a:prstGeom>
+              <a:ln w="12700" cmpd="sng">
+                <a:solidFill>
+                  <a:srgbClr val="000000"/>
+                </a:solidFill>
+                <a:prstDash val="dash"/>
+              </a:ln>
+              <a:effectLst/>
+            </p:spPr>
+            <p:style>
+              <a:lnRef idx="2">
+                <a:schemeClr val="accent1"/>
+              </a:lnRef>
+              <a:fillRef idx="0">
+                <a:schemeClr val="accent1"/>
+              </a:fillRef>
+              <a:effectRef idx="1">
+                <a:schemeClr val="accent1"/>
+              </a:effectRef>
+              <a:fontRef idx="minor">
+                <a:schemeClr val="tx1"/>
+              </a:fontRef>
+            </p:style>
+          </p:cxnSp>
+        </p:grpSp>
         <p:sp>
           <p:nvSpPr>
-            <p:cNvPr id="15" name="Pie 14"/>
+            <p:cNvPr id="74" name="Rectangle 73"/>
             <p:cNvSpPr/>
             <p:nvPr/>
           </p:nvSpPr>
           <p:spPr>
             <a:xfrm>
-              <a:off x="1282702" y="819366"/>
-              <a:ext cx="6907683" cy="6907683"/>
-            </a:xfrm>
-            <a:prstGeom prst="pie">
-              <a:avLst>
-                <a:gd name="adj1" fmla="val 10791208"/>
-                <a:gd name="adj2" fmla="val 18313480"/>
-              </a:avLst>
-            </a:prstGeom>
-            <a:noFill/>
-            <a:ln>
-              <a:solidFill>
-                <a:srgbClr val="000000"/>
-              </a:solidFill>
-              <a:prstDash val="dash"/>
-            </a:ln>
-            <a:effectLst/>
-          </p:spPr>
-          <p:style>
-            <a:lnRef idx="1">
-              <a:schemeClr val="accent1"/>
-            </a:lnRef>
-            <a:fillRef idx="3">
-              <a:schemeClr val="accent1"/>
-            </a:fillRef>
-            <a:effectRef idx="2">
-              <a:schemeClr val="accent1"/>
-            </a:effectRef>
-            <a:fontRef idx="minor">
-              <a:schemeClr val="lt1"/>
-            </a:fontRef>
-          </p:style>
-          <p:txBody>
-            <a:bodyPr rtlCol="0" anchor="ctr"/>
-            <a:lstStyle/>
-            <a:p>
-              <a:pPr algn="ctr"/>
-              <a:endParaRPr lang="en-US">
-                <a:solidFill>
-                  <a:schemeClr val="tx1"/>
-                </a:solidFill>
-              </a:endParaRPr>
-            </a:p>
-          </p:txBody>
-        </p:sp>
-        <p:sp>
-          <p:nvSpPr>
-            <p:cNvPr id="30" name="Pie 29"/>
-            <p:cNvSpPr/>
-            <p:nvPr/>
-          </p:nvSpPr>
-          <p:spPr>
-            <a:xfrm>
-              <a:off x="1537126" y="1073790"/>
-              <a:ext cx="6398835" cy="6398835"/>
-            </a:xfrm>
-            <a:prstGeom prst="pie">
-              <a:avLst>
-                <a:gd name="adj1" fmla="val 10801243"/>
-                <a:gd name="adj2" fmla="val 19937626"/>
-              </a:avLst>
-            </a:prstGeom>
-            <a:noFill/>
-            <a:ln>
-              <a:solidFill>
-                <a:srgbClr val="000000"/>
-              </a:solidFill>
-            </a:ln>
-            <a:effectLst/>
-          </p:spPr>
-          <p:style>
-            <a:lnRef idx="1">
-              <a:schemeClr val="accent1"/>
-            </a:lnRef>
-            <a:fillRef idx="3">
-              <a:schemeClr val="accent1"/>
-            </a:fillRef>
-            <a:effectRef idx="2">
-              <a:schemeClr val="accent1"/>
-            </a:effectRef>
-            <a:fontRef idx="minor">
-              <a:schemeClr val="lt1"/>
-            </a:fontRef>
-          </p:style>
-          <p:txBody>
-            <a:bodyPr rtlCol="0" anchor="ctr"/>
-            <a:lstStyle/>
-            <a:p>
-              <a:pPr algn="ctr"/>
-              <a:endParaRPr lang="en-US">
-                <a:solidFill>
-                  <a:schemeClr val="tx1"/>
-                </a:solidFill>
-              </a:endParaRPr>
-            </a:p>
-          </p:txBody>
-        </p:sp>
-        <p:sp>
-          <p:nvSpPr>
-            <p:cNvPr id="31" name="Pie 30"/>
-            <p:cNvSpPr/>
-            <p:nvPr/>
-          </p:nvSpPr>
-          <p:spPr>
-            <a:xfrm>
-              <a:off x="1537126" y="1155095"/>
-              <a:ext cx="6391957" cy="6398835"/>
-            </a:xfrm>
-            <a:prstGeom prst="pie">
-              <a:avLst>
-                <a:gd name="adj1" fmla="val 9756807"/>
-                <a:gd name="adj2" fmla="val 20953935"/>
-              </a:avLst>
-            </a:prstGeom>
-            <a:solidFill>
-              <a:srgbClr val="FFFFFF"/>
-            </a:solidFill>
-            <a:ln>
-              <a:noFill/>
-            </a:ln>
-            <a:effectLst/>
-          </p:spPr>
-          <p:style>
-            <a:lnRef idx="1">
-              <a:schemeClr val="accent1"/>
-            </a:lnRef>
-            <a:fillRef idx="3">
-              <a:schemeClr val="accent1"/>
-            </a:fillRef>
-            <a:effectRef idx="2">
-              <a:schemeClr val="accent1"/>
-            </a:effectRef>
-            <a:fontRef idx="minor">
-              <a:schemeClr val="lt1"/>
-            </a:fontRef>
-          </p:style>
-          <p:txBody>
-            <a:bodyPr rtlCol="0" anchor="ctr"/>
-            <a:lstStyle/>
-            <a:p>
-              <a:pPr algn="ctr"/>
-              <a:endParaRPr lang="en-US">
-                <a:solidFill>
-                  <a:schemeClr val="tx1"/>
-                </a:solidFill>
-              </a:endParaRPr>
-            </a:p>
-          </p:txBody>
-        </p:sp>
-        <p:sp>
-          <p:nvSpPr>
-            <p:cNvPr id="4" name="Oval 3"/>
-            <p:cNvSpPr/>
-            <p:nvPr/>
-          </p:nvSpPr>
-          <p:spPr>
-            <a:xfrm>
-              <a:off x="4212572" y="3748656"/>
-              <a:ext cx="1049104" cy="1049104"/>
-            </a:xfrm>
-            <a:prstGeom prst="ellipse">
-              <a:avLst/>
-            </a:prstGeom>
-            <a:solidFill>
-              <a:srgbClr val="FFFFFF"/>
-            </a:solidFill>
-            <a:ln>
-              <a:solidFill>
-                <a:srgbClr val="0D0D0D"/>
-              </a:solidFill>
-            </a:ln>
-            <a:effectLst/>
-          </p:spPr>
-          <p:style>
-            <a:lnRef idx="1">
-              <a:schemeClr val="accent1"/>
-            </a:lnRef>
-            <a:fillRef idx="3">
-              <a:schemeClr val="accent1"/>
-            </a:fillRef>
-            <a:effectRef idx="2">
-              <a:schemeClr val="accent1"/>
-            </a:effectRef>
-            <a:fontRef idx="minor">
-              <a:schemeClr val="lt1"/>
-            </a:fontRef>
-          </p:style>
-          <p:txBody>
-            <a:bodyPr rtlCol="0" anchor="ctr"/>
-            <a:lstStyle/>
-            <a:p>
-              <a:pPr algn="ctr"/>
-              <a:endParaRPr lang="en-US"/>
-            </a:p>
-          </p:txBody>
-        </p:sp>
-        <p:cxnSp>
-          <p:nvCxnSpPr>
-            <p:cNvPr id="19" name="Straight Connector 18"/>
-            <p:cNvCxnSpPr/>
-            <p:nvPr/>
-          </p:nvCxnSpPr>
-          <p:spPr>
-            <a:xfrm flipV="1">
-              <a:off x="1544004" y="1666240"/>
-              <a:ext cx="5045507" cy="2623103"/>
-            </a:xfrm>
-            <a:prstGeom prst="line">
-              <a:avLst/>
-            </a:prstGeom>
-            <a:ln w="12700" cmpd="sng">
-              <a:solidFill>
-                <a:schemeClr val="tx1"/>
-              </a:solidFill>
-            </a:ln>
-            <a:effectLst/>
-          </p:spPr>
-          <p:style>
-            <a:lnRef idx="2">
-              <a:schemeClr val="accent1"/>
-            </a:lnRef>
-            <a:fillRef idx="0">
-              <a:schemeClr val="accent1"/>
-            </a:fillRef>
-            <a:effectRef idx="1">
-              <a:schemeClr val="accent1"/>
-            </a:effectRef>
-            <a:fontRef idx="minor">
-              <a:schemeClr val="tx1"/>
-            </a:fontRef>
-          </p:style>
-        </p:cxnSp>
-        <p:cxnSp>
-          <p:nvCxnSpPr>
-            <p:cNvPr id="29" name="Straight Connector 28"/>
-            <p:cNvCxnSpPr>
-              <a:stCxn id="4" idx="6"/>
-            </p:cNvCxnSpPr>
-            <p:nvPr/>
-          </p:nvCxnSpPr>
-          <p:spPr>
-            <a:xfrm flipH="1">
-              <a:off x="4736544" y="4273208"/>
-              <a:ext cx="525132" cy="0"/>
-            </a:xfrm>
-            <a:prstGeom prst="line">
-              <a:avLst/>
-            </a:prstGeom>
-            <a:ln w="12700" cmpd="sng">
-              <a:solidFill>
-                <a:srgbClr val="000000"/>
-              </a:solidFill>
-              <a:prstDash val="dash"/>
-            </a:ln>
-            <a:effectLst/>
-          </p:spPr>
-          <p:style>
-            <a:lnRef idx="2">
-              <a:schemeClr val="accent1"/>
-            </a:lnRef>
-            <a:fillRef idx="0">
-              <a:schemeClr val="accent1"/>
-            </a:fillRef>
-            <a:effectRef idx="1">
-              <a:schemeClr val="accent1"/>
-            </a:effectRef>
-            <a:fontRef idx="minor">
-              <a:schemeClr val="tx1"/>
-            </a:fontRef>
-          </p:style>
-        </p:cxnSp>
-        <p:cxnSp>
-          <p:nvCxnSpPr>
-            <p:cNvPr id="35" name="Straight Connector 34"/>
-            <p:cNvCxnSpPr/>
-            <p:nvPr/>
-          </p:nvCxnSpPr>
-          <p:spPr>
-            <a:xfrm flipH="1" flipV="1">
-              <a:off x="3744366" y="3119169"/>
-              <a:ext cx="517878" cy="830531"/>
-            </a:xfrm>
-            <a:prstGeom prst="line">
-              <a:avLst/>
-            </a:prstGeom>
-            <a:ln w="12700" cmpd="sng">
-              <a:solidFill>
-                <a:srgbClr val="000000"/>
-              </a:solidFill>
-              <a:prstDash val="dash"/>
-            </a:ln>
-            <a:effectLst/>
-          </p:spPr>
-          <p:style>
-            <a:lnRef idx="2">
-              <a:schemeClr val="accent1"/>
-            </a:lnRef>
-            <a:fillRef idx="0">
-              <a:schemeClr val="accent1"/>
-            </a:fillRef>
-            <a:effectRef idx="1">
-              <a:schemeClr val="accent1"/>
-            </a:effectRef>
-            <a:fontRef idx="minor">
-              <a:schemeClr val="tx1"/>
-            </a:fontRef>
-          </p:style>
-        </p:cxnSp>
-        <p:cxnSp>
-          <p:nvCxnSpPr>
-            <p:cNvPr id="38" name="Straight Connector 37"/>
-            <p:cNvCxnSpPr/>
-            <p:nvPr/>
-          </p:nvCxnSpPr>
-          <p:spPr>
-            <a:xfrm flipH="1">
-              <a:off x="4262244" y="3820160"/>
-              <a:ext cx="202720" cy="129540"/>
-            </a:xfrm>
-            <a:prstGeom prst="line">
-              <a:avLst/>
-            </a:prstGeom>
-            <a:ln w="12700" cmpd="sng">
-              <a:solidFill>
-                <a:srgbClr val="000000"/>
-              </a:solidFill>
-              <a:prstDash val="solid"/>
-            </a:ln>
-            <a:effectLst/>
-          </p:spPr>
-          <p:style>
-            <a:lnRef idx="2">
-              <a:schemeClr val="accent1"/>
-            </a:lnRef>
-            <a:fillRef idx="0">
-              <a:schemeClr val="accent1"/>
-            </a:fillRef>
-            <a:effectRef idx="1">
-              <a:schemeClr val="accent1"/>
-            </a:effectRef>
-            <a:fontRef idx="minor">
-              <a:schemeClr val="tx1"/>
-            </a:fontRef>
-          </p:style>
-        </p:cxnSp>
-        <p:sp>
-          <p:nvSpPr>
-            <p:cNvPr id="13" name="Rectangle 12"/>
-            <p:cNvSpPr/>
-            <p:nvPr/>
-          </p:nvSpPr>
-          <p:spPr>
-            <a:xfrm>
-              <a:off x="4212572" y="3119169"/>
-              <a:ext cx="969574" cy="246221"/>
+              <a:off x="5389746" y="2200340"/>
+              <a:ext cx="992579" cy="246221"/>
             </a:xfrm>
             <a:prstGeom prst="rect">
               <a:avLst/>
@@ -4317,7 +4840,7 @@
             <a:p>
               <a:r>
                 <a:rPr lang="en-US" sz="1000" dirty="0" smtClean="0"/>
-                <a:t>Inflation radius</a:t>
+                <a:t>Local trajectory</a:t>
               </a:r>
               <a:endParaRPr lang="en-US" sz="1000" dirty="0"/>
             </a:p>
@@ -4325,100 +4848,13 @@
         </p:sp>
         <p:sp>
           <p:nvSpPr>
-            <p:cNvPr id="16" name="Rectangle 15"/>
+            <p:cNvPr id="75" name="Oval 74"/>
             <p:cNvSpPr/>
             <p:nvPr/>
           </p:nvSpPr>
           <p:spPr>
             <a:xfrm>
-              <a:off x="4883250" y="4205815"/>
-              <a:ext cx="257427" cy="246221"/>
-            </a:xfrm>
-            <a:prstGeom prst="rect">
-              <a:avLst/>
-            </a:prstGeom>
-          </p:spPr>
-          <p:txBody>
-            <a:bodyPr wrap="none">
-              <a:spAutoFit/>
-            </a:bodyPr>
-            <a:lstStyle/>
-            <a:p>
-              <a:r>
-                <a:rPr lang="en-US" sz="1000" dirty="0" smtClean="0"/>
-                <a:t>α</a:t>
-              </a:r>
-              <a:endParaRPr lang="en-US" sz="1000" dirty="0"/>
-            </a:p>
-          </p:txBody>
-        </p:sp>
-        <p:sp>
-          <p:nvSpPr>
-            <p:cNvPr id="18" name="Rectangle 17"/>
-            <p:cNvSpPr/>
-            <p:nvPr/>
-          </p:nvSpPr>
-          <p:spPr>
-            <a:xfrm>
-              <a:off x="3824878" y="3503170"/>
-              <a:ext cx="238893" cy="246221"/>
-            </a:xfrm>
-            <a:prstGeom prst="rect">
-              <a:avLst/>
-            </a:prstGeom>
-          </p:spPr>
-          <p:txBody>
-            <a:bodyPr wrap="none">
-              <a:spAutoFit/>
-            </a:bodyPr>
-            <a:lstStyle/>
-            <a:p>
-              <a:r>
-                <a:rPr lang="en-US" sz="1000" dirty="0"/>
-                <a:t>c</a:t>
-              </a:r>
-              <a:endParaRPr lang="en-US" sz="1000" dirty="0"/>
-            </a:p>
-          </p:txBody>
-        </p:sp>
-        <p:sp>
-          <p:nvSpPr>
-            <p:cNvPr id="20" name="Rectangle 19"/>
-            <p:cNvSpPr/>
-            <p:nvPr/>
-          </p:nvSpPr>
-          <p:spPr>
-            <a:xfrm>
-              <a:off x="2253469" y="1420019"/>
-              <a:ext cx="252042" cy="246221"/>
-            </a:xfrm>
-            <a:prstGeom prst="rect">
-              <a:avLst/>
-            </a:prstGeom>
-          </p:spPr>
-          <p:txBody>
-            <a:bodyPr wrap="none">
-              <a:spAutoFit/>
-            </a:bodyPr>
-            <a:lstStyle/>
-            <a:p>
-              <a:r>
-                <a:rPr lang="en-US" sz="1000" dirty="0" smtClean="0"/>
-                <a:t>d</a:t>
-              </a:r>
-              <a:endParaRPr lang="en-US" sz="1000" dirty="0"/>
-            </a:p>
-          </p:txBody>
-        </p:sp>
-        <p:sp>
-          <p:nvSpPr>
-            <p:cNvPr id="27" name="Oval 26"/>
-            <p:cNvSpPr/>
-            <p:nvPr/>
-          </p:nvSpPr>
-          <p:spPr>
-            <a:xfrm>
-              <a:off x="1468433" y="4224173"/>
+              <a:off x="6524900" y="1601070"/>
               <a:ext cx="130340" cy="130340"/>
             </a:xfrm>
             <a:prstGeom prst="ellipse">
@@ -4459,61 +4895,14 @@
         </p:sp>
         <p:sp>
           <p:nvSpPr>
-            <p:cNvPr id="36" name="Oval 35"/>
+            <p:cNvPr id="76" name="Rectangle 75"/>
             <p:cNvSpPr/>
             <p:nvPr/>
           </p:nvSpPr>
           <p:spPr>
             <a:xfrm>
-              <a:off x="7505156" y="2722887"/>
-              <a:ext cx="130340" cy="130340"/>
-            </a:xfrm>
-            <a:prstGeom prst="ellipse">
-              <a:avLst/>
-            </a:prstGeom>
-            <a:solidFill>
-              <a:schemeClr val="tx1"/>
-            </a:solidFill>
-            <a:ln>
-              <a:solidFill>
-                <a:schemeClr val="tx1"/>
-              </a:solidFill>
-            </a:ln>
-            <a:effectLst/>
-          </p:spPr>
-          <p:style>
-            <a:lnRef idx="1">
-              <a:schemeClr val="accent1"/>
-            </a:lnRef>
-            <a:fillRef idx="3">
-              <a:schemeClr val="accent1"/>
-            </a:fillRef>
-            <a:effectRef idx="2">
-              <a:schemeClr val="accent1"/>
-            </a:effectRef>
-            <a:fontRef idx="minor">
-              <a:schemeClr val="lt1"/>
-            </a:fontRef>
-          </p:style>
-          <p:txBody>
-            <a:bodyPr rtlCol="0" anchor="ctr"/>
-            <a:lstStyle/>
-            <a:p>
-              <a:pPr algn="ctr"/>
-              <a:endParaRPr lang="en-US"/>
-            </a:p>
-          </p:txBody>
-        </p:sp>
-        <p:sp>
-          <p:nvSpPr>
-            <p:cNvPr id="37" name="Rectangle 36"/>
-            <p:cNvSpPr/>
-            <p:nvPr/>
-          </p:nvSpPr>
-          <p:spPr>
-            <a:xfrm>
-              <a:off x="1059217" y="4354513"/>
-              <a:ext cx="1034007" cy="246221"/>
+              <a:off x="6603973" y="1477959"/>
+              <a:ext cx="699130" cy="246221"/>
             </a:xfrm>
             <a:prstGeom prst="rect">
               <a:avLst/>
@@ -4527,387 +4916,13 @@
             <a:p>
               <a:r>
                 <a:rPr lang="en-US" sz="1000" dirty="0" smtClean="0"/>
-                <a:t>Current position</a:t>
+                <a:t>Local goal</a:t>
               </a:r>
               <a:endParaRPr lang="en-US" sz="1000" dirty="0"/>
             </a:p>
           </p:txBody>
         </p:sp>
-        <p:sp>
-          <p:nvSpPr>
-            <p:cNvPr id="39" name="Rectangle 38"/>
-            <p:cNvSpPr/>
-            <p:nvPr/>
-          </p:nvSpPr>
-          <p:spPr>
-            <a:xfrm>
-              <a:off x="7167263" y="2872948"/>
-              <a:ext cx="768698" cy="246221"/>
-            </a:xfrm>
-            <a:prstGeom prst="rect">
-              <a:avLst/>
-            </a:prstGeom>
-          </p:spPr>
-          <p:txBody>
-            <a:bodyPr wrap="none">
-              <a:spAutoFit/>
-            </a:bodyPr>
-            <a:lstStyle/>
-            <a:p>
-              <a:r>
-                <a:rPr lang="en-US" sz="1000" dirty="0" smtClean="0"/>
-                <a:t>Global goal</a:t>
-              </a:r>
-              <a:endParaRPr lang="en-US" sz="1000" dirty="0"/>
-            </a:p>
-          </p:txBody>
-        </p:sp>
-        <p:sp>
-          <p:nvSpPr>
-            <p:cNvPr id="40" name="Oval 39"/>
-            <p:cNvSpPr/>
-            <p:nvPr/>
-          </p:nvSpPr>
-          <p:spPr>
-            <a:xfrm>
-              <a:off x="4671374" y="4208038"/>
-              <a:ext cx="130340" cy="130340"/>
-            </a:xfrm>
-            <a:prstGeom prst="ellipse">
-              <a:avLst/>
-            </a:prstGeom>
-            <a:solidFill>
-              <a:schemeClr val="tx1"/>
-            </a:solidFill>
-            <a:ln>
-              <a:solidFill>
-                <a:schemeClr val="tx1"/>
-              </a:solidFill>
-            </a:ln>
-            <a:effectLst/>
-          </p:spPr>
-          <p:style>
-            <a:lnRef idx="1">
-              <a:schemeClr val="accent1"/>
-            </a:lnRef>
-            <a:fillRef idx="3">
-              <a:schemeClr val="accent1"/>
-            </a:fillRef>
-            <a:effectRef idx="2">
-              <a:schemeClr val="accent1"/>
-            </a:effectRef>
-            <a:fontRef idx="minor">
-              <a:schemeClr val="lt1"/>
-            </a:fontRef>
-          </p:style>
-          <p:txBody>
-            <a:bodyPr rtlCol="0" anchor="ctr"/>
-            <a:lstStyle/>
-            <a:p>
-              <a:pPr algn="ctr"/>
-              <a:endParaRPr lang="en-US"/>
-            </a:p>
-          </p:txBody>
-        </p:sp>
-        <p:sp>
-          <p:nvSpPr>
-            <p:cNvPr id="72" name="Rectangle 71"/>
-            <p:cNvSpPr/>
-            <p:nvPr/>
-          </p:nvSpPr>
-          <p:spPr>
-            <a:xfrm rot="19823108">
-              <a:off x="3905652" y="3034763"/>
-              <a:ext cx="133350" cy="133350"/>
-            </a:xfrm>
-            <a:prstGeom prst="rect">
-              <a:avLst/>
-            </a:prstGeom>
-            <a:noFill/>
-            <a:ln>
-              <a:solidFill>
-                <a:srgbClr val="000000"/>
-              </a:solidFill>
-            </a:ln>
-            <a:effectLst/>
-          </p:spPr>
-          <p:style>
-            <a:lnRef idx="1">
-              <a:schemeClr val="accent1"/>
-            </a:lnRef>
-            <a:fillRef idx="3">
-              <a:schemeClr val="accent1"/>
-            </a:fillRef>
-            <a:effectRef idx="2">
-              <a:schemeClr val="accent1"/>
-            </a:effectRef>
-            <a:fontRef idx="minor">
-              <a:schemeClr val="lt1"/>
-            </a:fontRef>
-          </p:style>
-          <p:txBody>
-            <a:bodyPr rtlCol="0" anchor="ctr"/>
-            <a:lstStyle/>
-            <a:p>
-              <a:pPr algn="ctr"/>
-              <a:endParaRPr lang="en-US"/>
-            </a:p>
-          </p:txBody>
-        </p:sp>
-        <p:sp>
-          <p:nvSpPr>
-            <p:cNvPr id="41" name="Rectangle 40"/>
-            <p:cNvSpPr/>
-            <p:nvPr/>
-          </p:nvSpPr>
-          <p:spPr>
-            <a:xfrm>
-              <a:off x="4275425" y="4308833"/>
-              <a:ext cx="638954" cy="246221"/>
-            </a:xfrm>
-            <a:prstGeom prst="rect">
-              <a:avLst/>
-            </a:prstGeom>
-          </p:spPr>
-          <p:txBody>
-            <a:bodyPr wrap="none">
-              <a:spAutoFit/>
-            </a:bodyPr>
-            <a:lstStyle/>
-            <a:p>
-              <a:r>
-                <a:rPr lang="en-US" sz="1000" dirty="0" smtClean="0"/>
-                <a:t>Obstacle</a:t>
-              </a:r>
-              <a:endParaRPr lang="en-US" sz="1000" dirty="0"/>
-            </a:p>
-          </p:txBody>
-        </p:sp>
-        <p:sp>
-          <p:nvSpPr>
-            <p:cNvPr id="51" name="Pie 50"/>
-            <p:cNvSpPr/>
-            <p:nvPr/>
-          </p:nvSpPr>
-          <p:spPr>
-            <a:xfrm>
-              <a:off x="4388749" y="3923243"/>
-              <a:ext cx="695590" cy="695590"/>
-            </a:xfrm>
-            <a:prstGeom prst="pie">
-              <a:avLst>
-                <a:gd name="adj1" fmla="val 10761624"/>
-                <a:gd name="adj2" fmla="val 14506145"/>
-              </a:avLst>
-            </a:prstGeom>
-            <a:noFill/>
-            <a:ln w="12700" cmpd="sng">
-              <a:solidFill>
-                <a:schemeClr val="tx1"/>
-              </a:solidFill>
-              <a:prstDash val="dash"/>
-            </a:ln>
-            <a:effectLst/>
-          </p:spPr>
-          <p:style>
-            <a:lnRef idx="1">
-              <a:schemeClr val="accent1"/>
-            </a:lnRef>
-            <a:fillRef idx="3">
-              <a:schemeClr val="accent1"/>
-            </a:fillRef>
-            <a:effectRef idx="2">
-              <a:schemeClr val="accent1"/>
-            </a:effectRef>
-            <a:fontRef idx="minor">
-              <a:schemeClr val="lt1"/>
-            </a:fontRef>
-          </p:style>
-          <p:txBody>
-            <a:bodyPr rtlCol="0" anchor="ctr"/>
-            <a:lstStyle/>
-            <a:p>
-              <a:pPr algn="ctr"/>
-              <a:endParaRPr lang="en-US">
-                <a:solidFill>
-                  <a:schemeClr val="tx1"/>
-                </a:solidFill>
-              </a:endParaRPr>
-            </a:p>
-          </p:txBody>
-        </p:sp>
-        <p:sp>
-          <p:nvSpPr>
-            <p:cNvPr id="49" name="Rectangle 48"/>
-            <p:cNvSpPr/>
-            <p:nvPr/>
-          </p:nvSpPr>
-          <p:spPr>
-            <a:xfrm>
-              <a:off x="4413947" y="4024817"/>
-              <a:ext cx="257427" cy="246221"/>
-            </a:xfrm>
-            <a:prstGeom prst="rect">
-              <a:avLst/>
-            </a:prstGeom>
-          </p:spPr>
-          <p:txBody>
-            <a:bodyPr wrap="none">
-              <a:spAutoFit/>
-            </a:bodyPr>
-            <a:lstStyle/>
-            <a:p>
-              <a:r>
-                <a:rPr lang="en-US" sz="1000" smtClean="0"/>
-                <a:t>θ</a:t>
-              </a:r>
-              <a:endParaRPr lang="en-US" sz="1000" dirty="0"/>
-            </a:p>
-          </p:txBody>
-        </p:sp>
-        <p:cxnSp>
-          <p:nvCxnSpPr>
-            <p:cNvPr id="21" name="Straight Connector 20"/>
-            <p:cNvCxnSpPr/>
-            <p:nvPr/>
-          </p:nvCxnSpPr>
-          <p:spPr>
-            <a:xfrm>
-              <a:off x="3107080" y="1541124"/>
-              <a:ext cx="1373480" cy="2279036"/>
-            </a:xfrm>
-            <a:prstGeom prst="line">
-              <a:avLst/>
-            </a:prstGeom>
-            <a:ln w="12700" cmpd="sng">
-              <a:solidFill>
-                <a:srgbClr val="000000"/>
-              </a:solidFill>
-              <a:prstDash val="dash"/>
-            </a:ln>
-            <a:effectLst/>
-          </p:spPr>
-          <p:style>
-            <a:lnRef idx="2">
-              <a:schemeClr val="accent1"/>
-            </a:lnRef>
-            <a:fillRef idx="0">
-              <a:schemeClr val="accent1"/>
-            </a:fillRef>
-            <a:effectRef idx="1">
-              <a:schemeClr val="accent1"/>
-            </a:effectRef>
-            <a:fontRef idx="minor">
-              <a:schemeClr val="tx1"/>
-            </a:fontRef>
-          </p:style>
-        </p:cxnSp>
       </p:grpSp>
-      <p:sp>
-        <p:nvSpPr>
-          <p:cNvPr id="74" name="Rectangle 73"/>
-          <p:cNvSpPr/>
-          <p:nvPr/>
-        </p:nvSpPr>
-        <p:spPr>
-          <a:xfrm>
-            <a:off x="5389746" y="2200340"/>
-            <a:ext cx="992579" cy="246221"/>
-          </a:xfrm>
-          <a:prstGeom prst="rect">
-            <a:avLst/>
-          </a:prstGeom>
-        </p:spPr>
-        <p:txBody>
-          <a:bodyPr wrap="none">
-            <a:spAutoFit/>
-          </a:bodyPr>
-          <a:lstStyle/>
-          <a:p>
-            <a:r>
-              <a:rPr lang="en-US" sz="1000" dirty="0" smtClean="0"/>
-              <a:t>Local trajectory</a:t>
-            </a:r>
-            <a:endParaRPr lang="en-US" sz="1000" dirty="0"/>
-          </a:p>
-        </p:txBody>
-      </p:sp>
-      <p:sp>
-        <p:nvSpPr>
-          <p:cNvPr id="75" name="Oval 74"/>
-          <p:cNvSpPr/>
-          <p:nvPr/>
-        </p:nvSpPr>
-        <p:spPr>
-          <a:xfrm>
-            <a:off x="6524900" y="1601070"/>
-            <a:ext cx="130340" cy="130340"/>
-          </a:xfrm>
-          <a:prstGeom prst="ellipse">
-            <a:avLst/>
-          </a:prstGeom>
-          <a:solidFill>
-            <a:schemeClr val="tx1"/>
-          </a:solidFill>
-          <a:ln>
-            <a:solidFill>
-              <a:schemeClr val="tx1"/>
-            </a:solidFill>
-          </a:ln>
-          <a:effectLst/>
-        </p:spPr>
-        <p:style>
-          <a:lnRef idx="1">
-            <a:schemeClr val="accent1"/>
-          </a:lnRef>
-          <a:fillRef idx="3">
-            <a:schemeClr val="accent1"/>
-          </a:fillRef>
-          <a:effectRef idx="2">
-            <a:schemeClr val="accent1"/>
-          </a:effectRef>
-          <a:fontRef idx="minor">
-            <a:schemeClr val="lt1"/>
-          </a:fontRef>
-        </p:style>
-        <p:txBody>
-          <a:bodyPr rtlCol="0" anchor="ctr"/>
-          <a:lstStyle/>
-          <a:p>
-            <a:pPr algn="ctr"/>
-            <a:endParaRPr lang="en-US"/>
-          </a:p>
-        </p:txBody>
-      </p:sp>
-      <p:sp>
-        <p:nvSpPr>
-          <p:cNvPr id="76" name="Rectangle 75"/>
-          <p:cNvSpPr/>
-          <p:nvPr/>
-        </p:nvSpPr>
-        <p:spPr>
-          <a:xfrm>
-            <a:off x="6603973" y="1477959"/>
-            <a:ext cx="699130" cy="246221"/>
-          </a:xfrm>
-          <a:prstGeom prst="rect">
-            <a:avLst/>
-          </a:prstGeom>
-        </p:spPr>
-        <p:txBody>
-          <a:bodyPr wrap="none">
-            <a:spAutoFit/>
-          </a:bodyPr>
-          <a:lstStyle/>
-          <a:p>
-            <a:r>
-              <a:rPr lang="en-US" sz="1000" dirty="0" smtClean="0"/>
-              <a:t>Local goal</a:t>
-            </a:r>
-            <a:endParaRPr lang="en-US" sz="1000" dirty="0"/>
-          </a:p>
-        </p:txBody>
-      </p:sp>
     </p:spTree>
     <p:extLst>
       <p:ext uri="{BB962C8B-B14F-4D97-AF65-F5344CB8AC3E}">

</xml_diff>